<commit_message>
Updated Diagrams and Developer guide based on v1.1 updated objects.
Updated Diagrams and Developer guide based on place, rating and description objects.
</commit_message>
<xml_diff>
--- a/docs/diagrams/HighLevelSequenceDiagrams.pptx
+++ b/docs/diagrams/HighLevelSequenceDiagrams.pptx
@@ -107,6 +107,22 @@
       </a:defRPr>
     </a:lvl9pPr>
   </p:defaultTextStyle>
+  <p:extLst>
+    <p:ext uri="{EFAFB233-063F-42B5-8137-9DF3F51BA10A}">
+      <p15:sldGuideLst xmlns:p15="http://schemas.microsoft.com/office/powerpoint/2012/main">
+        <p15:guide id="1" orient="horz" pos="1488">
+          <p15:clr>
+            <a:srgbClr val="A4A3A4"/>
+          </p15:clr>
+        </p15:guide>
+        <p15:guide id="2" pos="2880">
+          <p15:clr>
+            <a:srgbClr val="A4A3A4"/>
+          </p15:clr>
+        </p15:guide>
+      </p15:sldGuideLst>
+    </p:ext>
+  </p:extLst>
 </p:presentation>
 </file>
 
@@ -192,7 +208,7 @@
           <a:p>
             <a:fld id="{F5CC4B3F-88C1-4FFA-B1B6-F41C21DC6924}" type="datetimeFigureOut">
               <a:rPr lang="en-US" smtClean="0"/>
-              <a:t>10/16/2016</a:t>
+              <a:t>3/12/2019</a:t>
             </a:fld>
             <a:endParaRPr lang="en-US"/>
           </a:p>
@@ -256,38 +272,37 @@
           <a:p>
             <a:pPr lvl="0"/>
             <a:r>
-              <a:rPr lang="en-US" smtClean="0"/>
+              <a:rPr lang="en-US"/>
               <a:t>Click to edit Master text styles</a:t>
             </a:r>
           </a:p>
           <a:p>
             <a:pPr lvl="1"/>
             <a:r>
-              <a:rPr lang="en-US" smtClean="0"/>
+              <a:rPr lang="en-US"/>
               <a:t>Second level</a:t>
             </a:r>
           </a:p>
           <a:p>
             <a:pPr lvl="2"/>
             <a:r>
-              <a:rPr lang="en-US" smtClean="0"/>
+              <a:rPr lang="en-US"/>
               <a:t>Third level</a:t>
             </a:r>
           </a:p>
           <a:p>
             <a:pPr lvl="3"/>
             <a:r>
-              <a:rPr lang="en-US" smtClean="0"/>
+              <a:rPr lang="en-US"/>
               <a:t>Fourth level</a:t>
             </a:r>
           </a:p>
           <a:p>
             <a:pPr lvl="4"/>
             <a:r>
-              <a:rPr lang="en-US" smtClean="0"/>
+              <a:rPr lang="en-US"/>
               <a:t>Fifth level</a:t>
             </a:r>
-            <a:endParaRPr lang="en-US"/>
           </a:p>
         </p:txBody>
       </p:sp>
@@ -498,10 +513,9 @@
           <a:lstStyle/>
           <a:p>
             <a:r>
-              <a:rPr lang="en-US" smtClean="0"/>
+              <a:rPr lang="en-US"/>
               <a:t>Click to edit Master title style</a:t>
             </a:r>
-            <a:endParaRPr lang="en-US"/>
           </a:p>
         </p:txBody>
       </p:sp>
@@ -617,10 +631,9 @@
           </a:lstStyle>
           <a:p>
             <a:r>
-              <a:rPr lang="en-US" smtClean="0"/>
+              <a:rPr lang="en-US"/>
               <a:t>Click to edit Master subtitle style</a:t>
             </a:r>
-            <a:endParaRPr lang="en-US"/>
           </a:p>
         </p:txBody>
       </p:sp>
@@ -641,7 +654,7 @@
           <a:p>
             <a:fld id="{78C97017-6FC3-485B-9764-EAC9E56C1D49}" type="datetimeFigureOut">
               <a:rPr lang="en-US" smtClean="0"/>
-              <a:t>10/16/2016</a:t>
+              <a:t>3/12/2019</a:t>
             </a:fld>
             <a:endParaRPr lang="en-US"/>
           </a:p>
@@ -735,10 +748,9 @@
           <a:lstStyle/>
           <a:p>
             <a:r>
-              <a:rPr lang="en-US" smtClean="0"/>
+              <a:rPr lang="en-US"/>
               <a:t>Click to edit Master title style</a:t>
             </a:r>
-            <a:endParaRPr lang="en-US"/>
           </a:p>
         </p:txBody>
       </p:sp>
@@ -759,38 +771,37 @@
           <a:p>
             <a:pPr lvl="0"/>
             <a:r>
-              <a:rPr lang="en-US" smtClean="0"/>
+              <a:rPr lang="en-US"/>
               <a:t>Click to edit Master text styles</a:t>
             </a:r>
           </a:p>
           <a:p>
             <a:pPr lvl="1"/>
             <a:r>
-              <a:rPr lang="en-US" smtClean="0"/>
+              <a:rPr lang="en-US"/>
               <a:t>Second level</a:t>
             </a:r>
           </a:p>
           <a:p>
             <a:pPr lvl="2"/>
             <a:r>
-              <a:rPr lang="en-US" smtClean="0"/>
+              <a:rPr lang="en-US"/>
               <a:t>Third level</a:t>
             </a:r>
           </a:p>
           <a:p>
             <a:pPr lvl="3"/>
             <a:r>
-              <a:rPr lang="en-US" smtClean="0"/>
+              <a:rPr lang="en-US"/>
               <a:t>Fourth level</a:t>
             </a:r>
           </a:p>
           <a:p>
             <a:pPr lvl="4"/>
             <a:r>
-              <a:rPr lang="en-US" smtClean="0"/>
+              <a:rPr lang="en-US"/>
               <a:t>Fifth level</a:t>
             </a:r>
-            <a:endParaRPr lang="en-US"/>
           </a:p>
         </p:txBody>
       </p:sp>
@@ -811,7 +822,7 @@
           <a:p>
             <a:fld id="{78C97017-6FC3-485B-9764-EAC9E56C1D49}" type="datetimeFigureOut">
               <a:rPr lang="en-US" smtClean="0"/>
-              <a:t>10/16/2016</a:t>
+              <a:t>3/12/2019</a:t>
             </a:fld>
             <a:endParaRPr lang="en-US"/>
           </a:p>
@@ -910,10 +921,9 @@
           <a:lstStyle/>
           <a:p>
             <a:r>
-              <a:rPr lang="en-US" smtClean="0"/>
+              <a:rPr lang="en-US"/>
               <a:t>Click to edit Master title style</a:t>
             </a:r>
-            <a:endParaRPr lang="en-US"/>
           </a:p>
         </p:txBody>
       </p:sp>
@@ -939,38 +949,37 @@
           <a:p>
             <a:pPr lvl="0"/>
             <a:r>
-              <a:rPr lang="en-US" smtClean="0"/>
+              <a:rPr lang="en-US"/>
               <a:t>Click to edit Master text styles</a:t>
             </a:r>
           </a:p>
           <a:p>
             <a:pPr lvl="1"/>
             <a:r>
-              <a:rPr lang="en-US" smtClean="0"/>
+              <a:rPr lang="en-US"/>
               <a:t>Second level</a:t>
             </a:r>
           </a:p>
           <a:p>
             <a:pPr lvl="2"/>
             <a:r>
-              <a:rPr lang="en-US" smtClean="0"/>
+              <a:rPr lang="en-US"/>
               <a:t>Third level</a:t>
             </a:r>
           </a:p>
           <a:p>
             <a:pPr lvl="3"/>
             <a:r>
-              <a:rPr lang="en-US" smtClean="0"/>
+              <a:rPr lang="en-US"/>
               <a:t>Fourth level</a:t>
             </a:r>
           </a:p>
           <a:p>
             <a:pPr lvl="4"/>
             <a:r>
-              <a:rPr lang="en-US" smtClean="0"/>
+              <a:rPr lang="en-US"/>
               <a:t>Fifth level</a:t>
             </a:r>
-            <a:endParaRPr lang="en-US"/>
           </a:p>
         </p:txBody>
       </p:sp>
@@ -991,7 +1000,7 @@
           <a:p>
             <a:fld id="{78C97017-6FC3-485B-9764-EAC9E56C1D49}" type="datetimeFigureOut">
               <a:rPr lang="en-US" smtClean="0"/>
-              <a:t>10/16/2016</a:t>
+              <a:t>3/12/2019</a:t>
             </a:fld>
             <a:endParaRPr lang="en-US"/>
           </a:p>
@@ -1085,10 +1094,9 @@
           <a:lstStyle/>
           <a:p>
             <a:r>
-              <a:rPr lang="en-US" smtClean="0"/>
+              <a:rPr lang="en-US"/>
               <a:t>Click to edit Master title style</a:t>
             </a:r>
-            <a:endParaRPr lang="en-US"/>
           </a:p>
         </p:txBody>
       </p:sp>
@@ -1109,38 +1117,37 @@
           <a:p>
             <a:pPr lvl="0"/>
             <a:r>
-              <a:rPr lang="en-US" smtClean="0"/>
+              <a:rPr lang="en-US"/>
               <a:t>Click to edit Master text styles</a:t>
             </a:r>
           </a:p>
           <a:p>
             <a:pPr lvl="1"/>
             <a:r>
-              <a:rPr lang="en-US" smtClean="0"/>
+              <a:rPr lang="en-US"/>
               <a:t>Second level</a:t>
             </a:r>
           </a:p>
           <a:p>
             <a:pPr lvl="2"/>
             <a:r>
-              <a:rPr lang="en-US" smtClean="0"/>
+              <a:rPr lang="en-US"/>
               <a:t>Third level</a:t>
             </a:r>
           </a:p>
           <a:p>
             <a:pPr lvl="3"/>
             <a:r>
-              <a:rPr lang="en-US" smtClean="0"/>
+              <a:rPr lang="en-US"/>
               <a:t>Fourth level</a:t>
             </a:r>
           </a:p>
           <a:p>
             <a:pPr lvl="4"/>
             <a:r>
-              <a:rPr lang="en-US" smtClean="0"/>
+              <a:rPr lang="en-US"/>
               <a:t>Fifth level</a:t>
             </a:r>
-            <a:endParaRPr lang="en-US"/>
           </a:p>
         </p:txBody>
       </p:sp>
@@ -1161,7 +1168,7 @@
           <a:p>
             <a:fld id="{78C97017-6FC3-485B-9764-EAC9E56C1D49}" type="datetimeFigureOut">
               <a:rPr lang="en-US" smtClean="0"/>
-              <a:t>10/16/2016</a:t>
+              <a:t>3/12/2019</a:t>
             </a:fld>
             <a:endParaRPr lang="en-US"/>
           </a:p>
@@ -1264,10 +1271,9 @@
           </a:lstStyle>
           <a:p>
             <a:r>
-              <a:rPr lang="en-US" smtClean="0"/>
+              <a:rPr lang="en-US"/>
               <a:t>Click to edit Master title style</a:t>
             </a:r>
-            <a:endParaRPr lang="en-US"/>
           </a:p>
         </p:txBody>
       </p:sp>
@@ -1384,7 +1390,7 @@
           <a:p>
             <a:pPr lvl="0"/>
             <a:r>
-              <a:rPr lang="en-US" smtClean="0"/>
+              <a:rPr lang="en-US"/>
               <a:t>Click to edit Master text styles</a:t>
             </a:r>
           </a:p>
@@ -1407,7 +1413,7 @@
           <a:p>
             <a:fld id="{78C97017-6FC3-485B-9764-EAC9E56C1D49}" type="datetimeFigureOut">
               <a:rPr lang="en-US" smtClean="0"/>
-              <a:t>10/16/2016</a:t>
+              <a:t>3/12/2019</a:t>
             </a:fld>
             <a:endParaRPr lang="en-US"/>
           </a:p>
@@ -1501,10 +1507,9 @@
           <a:lstStyle/>
           <a:p>
             <a:r>
-              <a:rPr lang="en-US" smtClean="0"/>
+              <a:rPr lang="en-US"/>
               <a:t>Click to edit Master title style</a:t>
             </a:r>
-            <a:endParaRPr lang="en-US"/>
           </a:p>
         </p:txBody>
       </p:sp>
@@ -1558,38 +1563,37 @@
           <a:p>
             <a:pPr lvl="0"/>
             <a:r>
-              <a:rPr lang="en-US" smtClean="0"/>
+              <a:rPr lang="en-US"/>
               <a:t>Click to edit Master text styles</a:t>
             </a:r>
           </a:p>
           <a:p>
             <a:pPr lvl="1"/>
             <a:r>
-              <a:rPr lang="en-US" smtClean="0"/>
+              <a:rPr lang="en-US"/>
               <a:t>Second level</a:t>
             </a:r>
           </a:p>
           <a:p>
             <a:pPr lvl="2"/>
             <a:r>
-              <a:rPr lang="en-US" smtClean="0"/>
+              <a:rPr lang="en-US"/>
               <a:t>Third level</a:t>
             </a:r>
           </a:p>
           <a:p>
             <a:pPr lvl="3"/>
             <a:r>
-              <a:rPr lang="en-US" smtClean="0"/>
+              <a:rPr lang="en-US"/>
               <a:t>Fourth level</a:t>
             </a:r>
           </a:p>
           <a:p>
             <a:pPr lvl="4"/>
             <a:r>
-              <a:rPr lang="en-US" smtClean="0"/>
+              <a:rPr lang="en-US"/>
               <a:t>Fifth level</a:t>
             </a:r>
-            <a:endParaRPr lang="en-US"/>
           </a:p>
         </p:txBody>
       </p:sp>
@@ -1643,38 +1647,37 @@
           <a:p>
             <a:pPr lvl="0"/>
             <a:r>
-              <a:rPr lang="en-US" smtClean="0"/>
+              <a:rPr lang="en-US"/>
               <a:t>Click to edit Master text styles</a:t>
             </a:r>
           </a:p>
           <a:p>
             <a:pPr lvl="1"/>
             <a:r>
-              <a:rPr lang="en-US" smtClean="0"/>
+              <a:rPr lang="en-US"/>
               <a:t>Second level</a:t>
             </a:r>
           </a:p>
           <a:p>
             <a:pPr lvl="2"/>
             <a:r>
-              <a:rPr lang="en-US" smtClean="0"/>
+              <a:rPr lang="en-US"/>
               <a:t>Third level</a:t>
             </a:r>
           </a:p>
           <a:p>
             <a:pPr lvl="3"/>
             <a:r>
-              <a:rPr lang="en-US" smtClean="0"/>
+              <a:rPr lang="en-US"/>
               <a:t>Fourth level</a:t>
             </a:r>
           </a:p>
           <a:p>
             <a:pPr lvl="4"/>
             <a:r>
-              <a:rPr lang="en-US" smtClean="0"/>
+              <a:rPr lang="en-US"/>
               <a:t>Fifth level</a:t>
             </a:r>
-            <a:endParaRPr lang="en-US"/>
           </a:p>
         </p:txBody>
       </p:sp>
@@ -1695,7 +1698,7 @@
           <a:p>
             <a:fld id="{78C97017-6FC3-485B-9764-EAC9E56C1D49}" type="datetimeFigureOut">
               <a:rPr lang="en-US" smtClean="0"/>
-              <a:t>10/16/2016</a:t>
+              <a:t>3/12/2019</a:t>
             </a:fld>
             <a:endParaRPr lang="en-US"/>
           </a:p>
@@ -1793,10 +1796,9 @@
           </a:lstStyle>
           <a:p>
             <a:r>
-              <a:rPr lang="en-US" smtClean="0"/>
+              <a:rPr lang="en-US"/>
               <a:t>Click to edit Master title style</a:t>
             </a:r>
-            <a:endParaRPr lang="en-US"/>
           </a:p>
         </p:txBody>
       </p:sp>
@@ -1859,7 +1861,7 @@
           <a:p>
             <a:pPr lvl="0"/>
             <a:r>
-              <a:rPr lang="en-US" smtClean="0"/>
+              <a:rPr lang="en-US"/>
               <a:t>Click to edit Master text styles</a:t>
             </a:r>
           </a:p>
@@ -1915,38 +1917,37 @@
           <a:p>
             <a:pPr lvl="0"/>
             <a:r>
-              <a:rPr lang="en-US" smtClean="0"/>
+              <a:rPr lang="en-US"/>
               <a:t>Click to edit Master text styles</a:t>
             </a:r>
           </a:p>
           <a:p>
             <a:pPr lvl="1"/>
             <a:r>
-              <a:rPr lang="en-US" smtClean="0"/>
+              <a:rPr lang="en-US"/>
               <a:t>Second level</a:t>
             </a:r>
           </a:p>
           <a:p>
             <a:pPr lvl="2"/>
             <a:r>
-              <a:rPr lang="en-US" smtClean="0"/>
+              <a:rPr lang="en-US"/>
               <a:t>Third level</a:t>
             </a:r>
           </a:p>
           <a:p>
             <a:pPr lvl="3"/>
             <a:r>
-              <a:rPr lang="en-US" smtClean="0"/>
+              <a:rPr lang="en-US"/>
               <a:t>Fourth level</a:t>
             </a:r>
           </a:p>
           <a:p>
             <a:pPr lvl="4"/>
             <a:r>
-              <a:rPr lang="en-US" smtClean="0"/>
+              <a:rPr lang="en-US"/>
               <a:t>Fifth level</a:t>
             </a:r>
-            <a:endParaRPr lang="en-US"/>
           </a:p>
         </p:txBody>
       </p:sp>
@@ -2009,7 +2010,7 @@
           <a:p>
             <a:pPr lvl="0"/>
             <a:r>
-              <a:rPr lang="en-US" smtClean="0"/>
+              <a:rPr lang="en-US"/>
               <a:t>Click to edit Master text styles</a:t>
             </a:r>
           </a:p>
@@ -2065,38 +2066,37 @@
           <a:p>
             <a:pPr lvl="0"/>
             <a:r>
-              <a:rPr lang="en-US" smtClean="0"/>
+              <a:rPr lang="en-US"/>
               <a:t>Click to edit Master text styles</a:t>
             </a:r>
           </a:p>
           <a:p>
             <a:pPr lvl="1"/>
             <a:r>
-              <a:rPr lang="en-US" smtClean="0"/>
+              <a:rPr lang="en-US"/>
               <a:t>Second level</a:t>
             </a:r>
           </a:p>
           <a:p>
             <a:pPr lvl="2"/>
             <a:r>
-              <a:rPr lang="en-US" smtClean="0"/>
+              <a:rPr lang="en-US"/>
               <a:t>Third level</a:t>
             </a:r>
           </a:p>
           <a:p>
             <a:pPr lvl="3"/>
             <a:r>
-              <a:rPr lang="en-US" smtClean="0"/>
+              <a:rPr lang="en-US"/>
               <a:t>Fourth level</a:t>
             </a:r>
           </a:p>
           <a:p>
             <a:pPr lvl="4"/>
             <a:r>
-              <a:rPr lang="en-US" smtClean="0"/>
+              <a:rPr lang="en-US"/>
               <a:t>Fifth level</a:t>
             </a:r>
-            <a:endParaRPr lang="en-US"/>
           </a:p>
         </p:txBody>
       </p:sp>
@@ -2117,7 +2117,7 @@
           <a:p>
             <a:fld id="{78C97017-6FC3-485B-9764-EAC9E56C1D49}" type="datetimeFigureOut">
               <a:rPr lang="en-US" smtClean="0"/>
-              <a:t>10/16/2016</a:t>
+              <a:t>3/12/2019</a:t>
             </a:fld>
             <a:endParaRPr lang="en-US"/>
           </a:p>
@@ -2211,10 +2211,9 @@
           <a:lstStyle/>
           <a:p>
             <a:r>
-              <a:rPr lang="en-US" smtClean="0"/>
+              <a:rPr lang="en-US"/>
               <a:t>Click to edit Master title style</a:t>
             </a:r>
-            <a:endParaRPr lang="en-US"/>
           </a:p>
         </p:txBody>
       </p:sp>
@@ -2235,7 +2234,7 @@
           <a:p>
             <a:fld id="{78C97017-6FC3-485B-9764-EAC9E56C1D49}" type="datetimeFigureOut">
               <a:rPr lang="en-US" smtClean="0"/>
-              <a:t>10/16/2016</a:t>
+              <a:t>3/12/2019</a:t>
             </a:fld>
             <a:endParaRPr lang="en-US"/>
           </a:p>
@@ -2330,7 +2329,7 @@
           <a:p>
             <a:fld id="{78C97017-6FC3-485B-9764-EAC9E56C1D49}" type="datetimeFigureOut">
               <a:rPr lang="en-US" smtClean="0"/>
-              <a:t>10/16/2016</a:t>
+              <a:t>3/12/2019</a:t>
             </a:fld>
             <a:endParaRPr lang="en-US"/>
           </a:p>
@@ -2433,10 +2432,9 @@
           </a:lstStyle>
           <a:p>
             <a:r>
-              <a:rPr lang="en-US" smtClean="0"/>
+              <a:rPr lang="en-US"/>
               <a:t>Click to edit Master title style</a:t>
             </a:r>
-            <a:endParaRPr lang="en-US"/>
           </a:p>
         </p:txBody>
       </p:sp>
@@ -2490,38 +2488,37 @@
           <a:p>
             <a:pPr lvl="0"/>
             <a:r>
-              <a:rPr lang="en-US" smtClean="0"/>
+              <a:rPr lang="en-US"/>
               <a:t>Click to edit Master text styles</a:t>
             </a:r>
           </a:p>
           <a:p>
             <a:pPr lvl="1"/>
             <a:r>
-              <a:rPr lang="en-US" smtClean="0"/>
+              <a:rPr lang="en-US"/>
               <a:t>Second level</a:t>
             </a:r>
           </a:p>
           <a:p>
             <a:pPr lvl="2"/>
             <a:r>
-              <a:rPr lang="en-US" smtClean="0"/>
+              <a:rPr lang="en-US"/>
               <a:t>Third level</a:t>
             </a:r>
           </a:p>
           <a:p>
             <a:pPr lvl="3"/>
             <a:r>
-              <a:rPr lang="en-US" smtClean="0"/>
+              <a:rPr lang="en-US"/>
               <a:t>Fourth level</a:t>
             </a:r>
           </a:p>
           <a:p>
             <a:pPr lvl="4"/>
             <a:r>
-              <a:rPr lang="en-US" smtClean="0"/>
+              <a:rPr lang="en-US"/>
               <a:t>Fifth level</a:t>
             </a:r>
-            <a:endParaRPr lang="en-US"/>
           </a:p>
         </p:txBody>
       </p:sp>
@@ -2584,7 +2581,7 @@
           <a:p>
             <a:pPr lvl="0"/>
             <a:r>
-              <a:rPr lang="en-US" smtClean="0"/>
+              <a:rPr lang="en-US"/>
               <a:t>Click to edit Master text styles</a:t>
             </a:r>
           </a:p>
@@ -2607,7 +2604,7 @@
           <a:p>
             <a:fld id="{78C97017-6FC3-485B-9764-EAC9E56C1D49}" type="datetimeFigureOut">
               <a:rPr lang="en-US" smtClean="0"/>
-              <a:t>10/16/2016</a:t>
+              <a:t>3/12/2019</a:t>
             </a:fld>
             <a:endParaRPr lang="en-US"/>
           </a:p>
@@ -2710,10 +2707,9 @@
           </a:lstStyle>
           <a:p>
             <a:r>
-              <a:rPr lang="en-US" smtClean="0"/>
+              <a:rPr lang="en-US"/>
               <a:t>Click to edit Master title style</a:t>
             </a:r>
-            <a:endParaRPr lang="en-US"/>
           </a:p>
         </p:txBody>
       </p:sp>
@@ -2837,7 +2833,7 @@
           <a:p>
             <a:pPr lvl="0"/>
             <a:r>
-              <a:rPr lang="en-US" smtClean="0"/>
+              <a:rPr lang="en-US"/>
               <a:t>Click to edit Master text styles</a:t>
             </a:r>
           </a:p>
@@ -2860,7 +2856,7 @@
           <a:p>
             <a:fld id="{78C97017-6FC3-485B-9764-EAC9E56C1D49}" type="datetimeFigureOut">
               <a:rPr lang="en-US" smtClean="0"/>
-              <a:t>10/16/2016</a:t>
+              <a:t>3/12/2019</a:t>
             </a:fld>
             <a:endParaRPr lang="en-US"/>
           </a:p>
@@ -2969,10 +2965,9 @@
           <a:lstStyle/>
           <a:p>
             <a:r>
-              <a:rPr lang="en-US" smtClean="0"/>
+              <a:rPr lang="en-US"/>
               <a:t>Click to edit Master title style</a:t>
             </a:r>
-            <a:endParaRPr lang="en-US"/>
           </a:p>
         </p:txBody>
       </p:sp>
@@ -3003,38 +2998,37 @@
           <a:p>
             <a:pPr lvl="0"/>
             <a:r>
-              <a:rPr lang="en-US" smtClean="0"/>
+              <a:rPr lang="en-US"/>
               <a:t>Click to edit Master text styles</a:t>
             </a:r>
           </a:p>
           <a:p>
             <a:pPr lvl="1"/>
             <a:r>
-              <a:rPr lang="en-US" smtClean="0"/>
+              <a:rPr lang="en-US"/>
               <a:t>Second level</a:t>
             </a:r>
           </a:p>
           <a:p>
             <a:pPr lvl="2"/>
             <a:r>
-              <a:rPr lang="en-US" smtClean="0"/>
+              <a:rPr lang="en-US"/>
               <a:t>Third level</a:t>
             </a:r>
           </a:p>
           <a:p>
             <a:pPr lvl="3"/>
             <a:r>
-              <a:rPr lang="en-US" smtClean="0"/>
+              <a:rPr lang="en-US"/>
               <a:t>Fourth level</a:t>
             </a:r>
           </a:p>
           <a:p>
             <a:pPr lvl="4"/>
             <a:r>
-              <a:rPr lang="en-US" smtClean="0"/>
+              <a:rPr lang="en-US"/>
               <a:t>Fifth level</a:t>
             </a:r>
-            <a:endParaRPr lang="en-US"/>
           </a:p>
         </p:txBody>
       </p:sp>
@@ -3073,7 +3067,7 @@
           <a:p>
             <a:fld id="{78C97017-6FC3-485B-9764-EAC9E56C1D49}" type="datetimeFigureOut">
               <a:rPr lang="en-US" smtClean="0"/>
-              <a:t>10/16/2016</a:t>
+              <a:t>3/12/2019</a:t>
             </a:fld>
             <a:endParaRPr lang="en-US"/>
           </a:p>
@@ -3492,7 +3486,7 @@
           <a:p>
             <a:pPr algn="ctr"/>
             <a:r>
-              <a:rPr lang="en-US" sz="1600" dirty="0" smtClean="0">
+              <a:rPr lang="en-US" sz="1600" dirty="0">
                 <a:solidFill>
                   <a:schemeClr val="bg1"/>
                 </a:solidFill>
@@ -3856,7 +3850,7 @@
           <a:p>
             <a:pPr algn="ctr"/>
             <a:r>
-              <a:rPr lang="en-US" sz="1600" dirty="0" smtClean="0">
+              <a:rPr lang="en-US" sz="1600" dirty="0">
                 <a:solidFill>
                   <a:schemeClr val="bg1"/>
                 </a:solidFill>
@@ -4003,7 +3997,7 @@
           <a:p>
             <a:pPr algn="ctr"/>
             <a:r>
-              <a:rPr lang="en-US" sz="1600" dirty="0" smtClean="0">
+              <a:rPr lang="en-US" sz="1600" dirty="0">
                 <a:solidFill>
                   <a:schemeClr val="bg1"/>
                 </a:solidFill>
@@ -4165,10 +4159,9 @@
           <a:lstStyle/>
           <a:p>
             <a:r>
-              <a:rPr lang="en-US" sz="1400" dirty="0" smtClean="0"/>
+              <a:rPr lang="en-US" sz="1400" dirty="0"/>
               <a:t>delete 1</a:t>
             </a:r>
-            <a:endParaRPr lang="en-US" sz="1400" dirty="0"/>
           </a:p>
         </p:txBody>
       </p:sp>
@@ -4231,18 +4224,13 @@
           <a:lstStyle/>
           <a:p>
             <a:r>
-              <a:rPr lang="en-US" sz="1400" dirty="0" smtClean="0">
+              <a:rPr lang="en-US" sz="1400" dirty="0">
                 <a:solidFill>
                   <a:srgbClr val="0070C0"/>
                 </a:solidFill>
               </a:rPr>
               <a:t>execute(“delete 1”)</a:t>
             </a:r>
-            <a:endParaRPr lang="en-US" sz="1400" dirty="0">
-              <a:solidFill>
-                <a:srgbClr val="0070C0"/>
-              </a:solidFill>
-            </a:endParaRPr>
           </a:p>
         </p:txBody>
       </p:sp>
@@ -4305,26 +4293,21 @@
           <a:lstStyle/>
           <a:p>
             <a:r>
-              <a:rPr lang="en-US" sz="1400" dirty="0" err="1" smtClean="0">
+              <a:rPr lang="en-US" sz="1400" dirty="0" err="1">
                 <a:solidFill>
                   <a:srgbClr val="7030A0"/>
                 </a:solidFill>
               </a:rPr>
-              <a:t>deletePerson</a:t>
-            </a:r>
-            <a:r>
-              <a:rPr lang="en-US" sz="1400" dirty="0" smtClean="0">
+              <a:t>deletePlace</a:t>
+            </a:r>
+            <a:r>
+              <a:rPr lang="en-US" sz="1400" dirty="0">
                 <a:solidFill>
                   <a:srgbClr val="7030A0"/>
                 </a:solidFill>
               </a:rPr>
               <a:t>(p)</a:t>
             </a:r>
-            <a:endParaRPr lang="en-US" sz="1400" dirty="0">
-              <a:solidFill>
-                <a:srgbClr val="7030A0"/>
-              </a:solidFill>
-            </a:endParaRPr>
           </a:p>
         </p:txBody>
       </p:sp>
@@ -4351,7 +4334,7 @@
           <a:lstStyle/>
           <a:p>
             <a:r>
-              <a:rPr lang="en-US" sz="1400" dirty="0" smtClean="0">
+              <a:rPr lang="en-US" sz="1400" dirty="0">
                 <a:solidFill>
                   <a:schemeClr val="accent5">
                     <a:lumMod val="75000"/>
@@ -4361,7 +4344,7 @@
               <a:t>post(</a:t>
             </a:r>
             <a:r>
-              <a:rPr lang="en-US" sz="1400" dirty="0" err="1" smtClean="0">
+              <a:rPr lang="en-US" sz="1400" dirty="0" err="1">
                 <a:solidFill>
                   <a:schemeClr val="accent5">
                     <a:lumMod val="75000"/>
@@ -4371,7 +4354,7 @@
               <a:t>AddressBookChangedEvent</a:t>
             </a:r>
             <a:r>
-              <a:rPr lang="en-US" sz="1400" dirty="0" smtClean="0">
+              <a:rPr lang="en-US" sz="1400" dirty="0">
                 <a:solidFill>
                   <a:schemeClr val="accent5">
                     <a:lumMod val="75000"/>
@@ -4380,13 +4363,6 @@
               </a:rPr>
               <a:t>)</a:t>
             </a:r>
-            <a:endParaRPr lang="en-US" sz="1400" dirty="0">
-              <a:solidFill>
-                <a:schemeClr val="accent5">
-                  <a:lumMod val="75000"/>
-                </a:schemeClr>
-              </a:solidFill>
-            </a:endParaRPr>
           </a:p>
         </p:txBody>
       </p:sp>
@@ -4552,7 +4528,7 @@
           <a:p>
             <a:pPr algn="ctr"/>
             <a:r>
-              <a:rPr lang="en-US" sz="1600" dirty="0" smtClean="0">
+              <a:rPr lang="en-US" sz="1600" dirty="0">
                 <a:solidFill>
                   <a:schemeClr val="bg1"/>
                 </a:solidFill>
@@ -4560,7 +4536,7 @@
               <a:t>:</a:t>
             </a:r>
             <a:r>
-              <a:rPr lang="en-US" sz="1600" dirty="0" err="1" smtClean="0">
+              <a:rPr lang="en-US" sz="1600" dirty="0" err="1">
                 <a:solidFill>
                   <a:schemeClr val="bg1"/>
                 </a:solidFill>
@@ -4793,7 +4769,7 @@
           <a:p>
             <a:pPr algn="ctr"/>
             <a:r>
-              <a:rPr lang="en-US" sz="1600" dirty="0" smtClean="0">
+              <a:rPr lang="en-US" sz="1600" dirty="0">
                 <a:solidFill>
                   <a:schemeClr val="bg1"/>
                 </a:solidFill>
@@ -4925,7 +4901,7 @@
           <a:lstStyle/>
           <a:p>
             <a:r>
-              <a:rPr lang="en-US" sz="1400" dirty="0" smtClean="0">
+              <a:rPr lang="en-US" sz="1400" dirty="0">
                 <a:solidFill>
                   <a:schemeClr val="accent5">
                     <a:lumMod val="75000"/>
@@ -4935,7 +4911,7 @@
               <a:t>post(</a:t>
             </a:r>
             <a:r>
-              <a:rPr lang="en-US" sz="1400" dirty="0" err="1" smtClean="0">
+              <a:rPr lang="en-US" sz="1400" dirty="0" err="1">
                 <a:solidFill>
                   <a:schemeClr val="accent5">
                     <a:lumMod val="75000"/>
@@ -4945,7 +4921,7 @@
               <a:t>AddressBookChangedEvent</a:t>
             </a:r>
             <a:r>
-              <a:rPr lang="en-US" sz="1400" dirty="0" smtClean="0">
+              <a:rPr lang="en-US" sz="1400" dirty="0">
                 <a:solidFill>
                   <a:schemeClr val="accent5">
                     <a:lumMod val="75000"/>
@@ -4954,13 +4930,6 @@
               </a:rPr>
               <a:t>)</a:t>
             </a:r>
-            <a:endParaRPr lang="en-US" sz="1400" dirty="0">
-              <a:solidFill>
-                <a:schemeClr val="accent5">
-                  <a:lumMod val="75000"/>
-                </a:schemeClr>
-              </a:solidFill>
-            </a:endParaRPr>
           </a:p>
         </p:txBody>
       </p:sp>
@@ -5052,7 +5021,7 @@
           <a:p>
             <a:pPr algn="ctr"/>
             <a:r>
-              <a:rPr lang="en-US" sz="1600" dirty="0" smtClean="0">
+              <a:rPr lang="en-US" sz="1600" dirty="0">
                 <a:solidFill>
                   <a:schemeClr val="bg1"/>
                 </a:solidFill>
@@ -5060,7 +5029,7 @@
               <a:t>:</a:t>
             </a:r>
             <a:r>
-              <a:rPr lang="en-US" sz="1600" dirty="0" err="1" smtClean="0">
+              <a:rPr lang="en-US" sz="1600" dirty="0" err="1">
                 <a:solidFill>
                   <a:schemeClr val="bg1"/>
                 </a:solidFill>
@@ -5307,7 +5276,7 @@
           <a:lstStyle/>
           <a:p>
             <a:r>
-              <a:rPr lang="en-US" sz="1400" dirty="0" err="1" smtClean="0">
+              <a:rPr lang="en-US" sz="1400" dirty="0" err="1">
                 <a:solidFill>
                   <a:schemeClr val="accent6">
                     <a:lumMod val="75000"/>
@@ -5317,7 +5286,7 @@
               <a:t>handleAddresssBookChangedEvent</a:t>
             </a:r>
             <a:r>
-              <a:rPr lang="en-US" sz="1400" dirty="0" smtClean="0">
+              <a:rPr lang="en-US" sz="1400" dirty="0">
                 <a:solidFill>
                   <a:schemeClr val="accent6">
                     <a:lumMod val="75000"/>
@@ -5326,13 +5295,6 @@
               </a:rPr>
               <a:t>()</a:t>
             </a:r>
-            <a:endParaRPr lang="en-US" sz="1400" dirty="0">
-              <a:solidFill>
-                <a:schemeClr val="accent6">
-                  <a:lumMod val="75000"/>
-                </a:schemeClr>
-              </a:solidFill>
-            </a:endParaRPr>
           </a:p>
         </p:txBody>
       </p:sp>
@@ -5417,7 +5379,7 @@
           <a:p>
             <a:pPr algn="ctr"/>
             <a:r>
-              <a:rPr lang="en-US" sz="1600" dirty="0" smtClean="0">
+              <a:rPr lang="en-US" sz="1600" dirty="0">
                 <a:solidFill>
                   <a:schemeClr val="bg1"/>
                 </a:solidFill>
@@ -5620,7 +5582,7 @@
           <a:lstStyle/>
           <a:p>
             <a:r>
-              <a:rPr lang="en-US" sz="1400" dirty="0" err="1" smtClean="0">
+              <a:rPr lang="en-US" sz="1400" dirty="0" err="1">
                 <a:solidFill>
                   <a:srgbClr val="00B050"/>
                 </a:solidFill>
@@ -5628,18 +5590,13 @@
               <a:t>handleAddresssBookChangedEvent</a:t>
             </a:r>
             <a:r>
-              <a:rPr lang="en-US" sz="1400" dirty="0" smtClean="0">
+              <a:rPr lang="en-US" sz="1400" dirty="0">
                 <a:solidFill>
                   <a:srgbClr val="00B050"/>
                 </a:solidFill>
               </a:rPr>
               <a:t>()</a:t>
             </a:r>
-            <a:endParaRPr lang="en-US" sz="1400" dirty="0">
-              <a:solidFill>
-                <a:srgbClr val="00B050"/>
-              </a:solidFill>
-            </a:endParaRPr>
           </a:p>
         </p:txBody>
       </p:sp>
@@ -5826,18 +5783,13 @@
           <a:p>
             <a:pPr algn="r"/>
             <a:r>
-              <a:rPr lang="en-US" sz="1400" dirty="0" smtClean="0">
+              <a:rPr lang="en-US" sz="1400" dirty="0">
                 <a:solidFill>
                   <a:srgbClr val="00B050"/>
                 </a:solidFill>
               </a:rPr>
               <a:t>Update status bar</a:t>
             </a:r>
-            <a:endParaRPr lang="en-US" sz="1400" dirty="0">
-              <a:solidFill>
-                <a:srgbClr val="00B050"/>
-              </a:solidFill>
-            </a:endParaRPr>
           </a:p>
         </p:txBody>
       </p:sp>
@@ -6027,7 +5979,7 @@
           <a:lstStyle/>
           <a:p>
             <a:r>
-              <a:rPr lang="en-US" sz="1400" dirty="0" smtClean="0">
+              <a:rPr lang="en-US" sz="1400" dirty="0">
                 <a:solidFill>
                   <a:schemeClr val="accent6">
                     <a:lumMod val="75000"/>
@@ -6037,7 +5989,7 @@
               <a:t>Save </a:t>
             </a:r>
             <a:br>
-              <a:rPr lang="en-US" sz="1400" dirty="0" smtClean="0">
+              <a:rPr lang="en-US" sz="1400" dirty="0">
                 <a:solidFill>
                   <a:schemeClr val="accent6">
                     <a:lumMod val="75000"/>
@@ -6046,7 +5998,7 @@
               </a:rPr>
             </a:br>
             <a:r>
-              <a:rPr lang="en-US" sz="1400" dirty="0" smtClean="0">
+              <a:rPr lang="en-US" sz="1400" dirty="0">
                 <a:solidFill>
                   <a:schemeClr val="accent6">
                     <a:lumMod val="75000"/>
@@ -6055,13 +6007,6 @@
               </a:rPr>
               <a:t>to file</a:t>
             </a:r>
-            <a:endParaRPr lang="en-US" sz="1400" dirty="0">
-              <a:solidFill>
-                <a:schemeClr val="accent6">
-                  <a:lumMod val="75000"/>
-                </a:schemeClr>
-              </a:solidFill>
-            </a:endParaRPr>
           </a:p>
         </p:txBody>
       </p:sp>

</xml_diff>

<commit_message>
Update fig 3, 5, 6 in DG
</commit_message>
<xml_diff>
--- a/docs/diagrams/HighLevelSequenceDiagrams.pptx
+++ b/docs/diagrams/HighLevelSequenceDiagrams.pptx
@@ -107,6 +107,22 @@
       </a:defRPr>
     </a:lvl9pPr>
   </p:defaultTextStyle>
+  <p:extLst>
+    <p:ext uri="{EFAFB233-063F-42B5-8137-9DF3F51BA10A}">
+      <p15:sldGuideLst xmlns:p15="http://schemas.microsoft.com/office/powerpoint/2012/main">
+        <p15:guide id="1" orient="horz" pos="1488">
+          <p15:clr>
+            <a:srgbClr val="A4A3A4"/>
+          </p15:clr>
+        </p15:guide>
+        <p15:guide id="2" pos="2880">
+          <p15:clr>
+            <a:srgbClr val="A4A3A4"/>
+          </p15:clr>
+        </p15:guide>
+      </p15:sldGuideLst>
+    </p:ext>
+  </p:extLst>
 </p:presentation>
 </file>
 
@@ -192,7 +208,7 @@
           <a:p>
             <a:fld id="{F5CC4B3F-88C1-4FFA-B1B6-F41C21DC6924}" type="datetimeFigureOut">
               <a:rPr lang="en-US" smtClean="0"/>
-              <a:t>10/16/2016</a:t>
+              <a:t>3/26/2019</a:t>
             </a:fld>
             <a:endParaRPr lang="en-US"/>
           </a:p>
@@ -256,38 +272,37 @@
           <a:p>
             <a:pPr lvl="0"/>
             <a:r>
-              <a:rPr lang="en-US" smtClean="0"/>
+              <a:rPr lang="en-US"/>
               <a:t>Click to edit Master text styles</a:t>
             </a:r>
           </a:p>
           <a:p>
             <a:pPr lvl="1"/>
             <a:r>
-              <a:rPr lang="en-US" smtClean="0"/>
+              <a:rPr lang="en-US"/>
               <a:t>Second level</a:t>
             </a:r>
           </a:p>
           <a:p>
             <a:pPr lvl="2"/>
             <a:r>
-              <a:rPr lang="en-US" smtClean="0"/>
+              <a:rPr lang="en-US"/>
               <a:t>Third level</a:t>
             </a:r>
           </a:p>
           <a:p>
             <a:pPr lvl="3"/>
             <a:r>
-              <a:rPr lang="en-US" smtClean="0"/>
+              <a:rPr lang="en-US"/>
               <a:t>Fourth level</a:t>
             </a:r>
           </a:p>
           <a:p>
             <a:pPr lvl="4"/>
             <a:r>
-              <a:rPr lang="en-US" smtClean="0"/>
+              <a:rPr lang="en-US"/>
               <a:t>Fifth level</a:t>
             </a:r>
-            <a:endParaRPr lang="en-US"/>
           </a:p>
         </p:txBody>
       </p:sp>
@@ -498,10 +513,9 @@
           <a:lstStyle/>
           <a:p>
             <a:r>
-              <a:rPr lang="en-US" smtClean="0"/>
+              <a:rPr lang="en-US"/>
               <a:t>Click to edit Master title style</a:t>
             </a:r>
-            <a:endParaRPr lang="en-US"/>
           </a:p>
         </p:txBody>
       </p:sp>
@@ -617,10 +631,9 @@
           </a:lstStyle>
           <a:p>
             <a:r>
-              <a:rPr lang="en-US" smtClean="0"/>
+              <a:rPr lang="en-US"/>
               <a:t>Click to edit Master subtitle style</a:t>
             </a:r>
-            <a:endParaRPr lang="en-US"/>
           </a:p>
         </p:txBody>
       </p:sp>
@@ -641,7 +654,7 @@
           <a:p>
             <a:fld id="{78C97017-6FC3-485B-9764-EAC9E56C1D49}" type="datetimeFigureOut">
               <a:rPr lang="en-US" smtClean="0"/>
-              <a:t>10/16/2016</a:t>
+              <a:t>3/26/2019</a:t>
             </a:fld>
             <a:endParaRPr lang="en-US"/>
           </a:p>
@@ -735,10 +748,9 @@
           <a:lstStyle/>
           <a:p>
             <a:r>
-              <a:rPr lang="en-US" smtClean="0"/>
+              <a:rPr lang="en-US"/>
               <a:t>Click to edit Master title style</a:t>
             </a:r>
-            <a:endParaRPr lang="en-US"/>
           </a:p>
         </p:txBody>
       </p:sp>
@@ -759,38 +771,37 @@
           <a:p>
             <a:pPr lvl="0"/>
             <a:r>
-              <a:rPr lang="en-US" smtClean="0"/>
+              <a:rPr lang="en-US"/>
               <a:t>Click to edit Master text styles</a:t>
             </a:r>
           </a:p>
           <a:p>
             <a:pPr lvl="1"/>
             <a:r>
-              <a:rPr lang="en-US" smtClean="0"/>
+              <a:rPr lang="en-US"/>
               <a:t>Second level</a:t>
             </a:r>
           </a:p>
           <a:p>
             <a:pPr lvl="2"/>
             <a:r>
-              <a:rPr lang="en-US" smtClean="0"/>
+              <a:rPr lang="en-US"/>
               <a:t>Third level</a:t>
             </a:r>
           </a:p>
           <a:p>
             <a:pPr lvl="3"/>
             <a:r>
-              <a:rPr lang="en-US" smtClean="0"/>
+              <a:rPr lang="en-US"/>
               <a:t>Fourth level</a:t>
             </a:r>
           </a:p>
           <a:p>
             <a:pPr lvl="4"/>
             <a:r>
-              <a:rPr lang="en-US" smtClean="0"/>
+              <a:rPr lang="en-US"/>
               <a:t>Fifth level</a:t>
             </a:r>
-            <a:endParaRPr lang="en-US"/>
           </a:p>
         </p:txBody>
       </p:sp>
@@ -811,7 +822,7 @@
           <a:p>
             <a:fld id="{78C97017-6FC3-485B-9764-EAC9E56C1D49}" type="datetimeFigureOut">
               <a:rPr lang="en-US" smtClean="0"/>
-              <a:t>10/16/2016</a:t>
+              <a:t>3/26/2019</a:t>
             </a:fld>
             <a:endParaRPr lang="en-US"/>
           </a:p>
@@ -910,10 +921,9 @@
           <a:lstStyle/>
           <a:p>
             <a:r>
-              <a:rPr lang="en-US" smtClean="0"/>
+              <a:rPr lang="en-US"/>
               <a:t>Click to edit Master title style</a:t>
             </a:r>
-            <a:endParaRPr lang="en-US"/>
           </a:p>
         </p:txBody>
       </p:sp>
@@ -939,38 +949,37 @@
           <a:p>
             <a:pPr lvl="0"/>
             <a:r>
-              <a:rPr lang="en-US" smtClean="0"/>
+              <a:rPr lang="en-US"/>
               <a:t>Click to edit Master text styles</a:t>
             </a:r>
           </a:p>
           <a:p>
             <a:pPr lvl="1"/>
             <a:r>
-              <a:rPr lang="en-US" smtClean="0"/>
+              <a:rPr lang="en-US"/>
               <a:t>Second level</a:t>
             </a:r>
           </a:p>
           <a:p>
             <a:pPr lvl="2"/>
             <a:r>
-              <a:rPr lang="en-US" smtClean="0"/>
+              <a:rPr lang="en-US"/>
               <a:t>Third level</a:t>
             </a:r>
           </a:p>
           <a:p>
             <a:pPr lvl="3"/>
             <a:r>
-              <a:rPr lang="en-US" smtClean="0"/>
+              <a:rPr lang="en-US"/>
               <a:t>Fourth level</a:t>
             </a:r>
           </a:p>
           <a:p>
             <a:pPr lvl="4"/>
             <a:r>
-              <a:rPr lang="en-US" smtClean="0"/>
+              <a:rPr lang="en-US"/>
               <a:t>Fifth level</a:t>
             </a:r>
-            <a:endParaRPr lang="en-US"/>
           </a:p>
         </p:txBody>
       </p:sp>
@@ -991,7 +1000,7 @@
           <a:p>
             <a:fld id="{78C97017-6FC3-485B-9764-EAC9E56C1D49}" type="datetimeFigureOut">
               <a:rPr lang="en-US" smtClean="0"/>
-              <a:t>10/16/2016</a:t>
+              <a:t>3/26/2019</a:t>
             </a:fld>
             <a:endParaRPr lang="en-US"/>
           </a:p>
@@ -1085,10 +1094,9 @@
           <a:lstStyle/>
           <a:p>
             <a:r>
-              <a:rPr lang="en-US" smtClean="0"/>
+              <a:rPr lang="en-US"/>
               <a:t>Click to edit Master title style</a:t>
             </a:r>
-            <a:endParaRPr lang="en-US"/>
           </a:p>
         </p:txBody>
       </p:sp>
@@ -1109,38 +1117,37 @@
           <a:p>
             <a:pPr lvl="0"/>
             <a:r>
-              <a:rPr lang="en-US" smtClean="0"/>
+              <a:rPr lang="en-US"/>
               <a:t>Click to edit Master text styles</a:t>
             </a:r>
           </a:p>
           <a:p>
             <a:pPr lvl="1"/>
             <a:r>
-              <a:rPr lang="en-US" smtClean="0"/>
+              <a:rPr lang="en-US"/>
               <a:t>Second level</a:t>
             </a:r>
           </a:p>
           <a:p>
             <a:pPr lvl="2"/>
             <a:r>
-              <a:rPr lang="en-US" smtClean="0"/>
+              <a:rPr lang="en-US"/>
               <a:t>Third level</a:t>
             </a:r>
           </a:p>
           <a:p>
             <a:pPr lvl="3"/>
             <a:r>
-              <a:rPr lang="en-US" smtClean="0"/>
+              <a:rPr lang="en-US"/>
               <a:t>Fourth level</a:t>
             </a:r>
           </a:p>
           <a:p>
             <a:pPr lvl="4"/>
             <a:r>
-              <a:rPr lang="en-US" smtClean="0"/>
+              <a:rPr lang="en-US"/>
               <a:t>Fifth level</a:t>
             </a:r>
-            <a:endParaRPr lang="en-US"/>
           </a:p>
         </p:txBody>
       </p:sp>
@@ -1161,7 +1168,7 @@
           <a:p>
             <a:fld id="{78C97017-6FC3-485B-9764-EAC9E56C1D49}" type="datetimeFigureOut">
               <a:rPr lang="en-US" smtClean="0"/>
-              <a:t>10/16/2016</a:t>
+              <a:t>3/26/2019</a:t>
             </a:fld>
             <a:endParaRPr lang="en-US"/>
           </a:p>
@@ -1264,10 +1271,9 @@
           </a:lstStyle>
           <a:p>
             <a:r>
-              <a:rPr lang="en-US" smtClean="0"/>
+              <a:rPr lang="en-US"/>
               <a:t>Click to edit Master title style</a:t>
             </a:r>
-            <a:endParaRPr lang="en-US"/>
           </a:p>
         </p:txBody>
       </p:sp>
@@ -1384,7 +1390,7 @@
           <a:p>
             <a:pPr lvl="0"/>
             <a:r>
-              <a:rPr lang="en-US" smtClean="0"/>
+              <a:rPr lang="en-US"/>
               <a:t>Click to edit Master text styles</a:t>
             </a:r>
           </a:p>
@@ -1407,7 +1413,7 @@
           <a:p>
             <a:fld id="{78C97017-6FC3-485B-9764-EAC9E56C1D49}" type="datetimeFigureOut">
               <a:rPr lang="en-US" smtClean="0"/>
-              <a:t>10/16/2016</a:t>
+              <a:t>3/26/2019</a:t>
             </a:fld>
             <a:endParaRPr lang="en-US"/>
           </a:p>
@@ -1501,10 +1507,9 @@
           <a:lstStyle/>
           <a:p>
             <a:r>
-              <a:rPr lang="en-US" smtClean="0"/>
+              <a:rPr lang="en-US"/>
               <a:t>Click to edit Master title style</a:t>
             </a:r>
-            <a:endParaRPr lang="en-US"/>
           </a:p>
         </p:txBody>
       </p:sp>
@@ -1558,38 +1563,37 @@
           <a:p>
             <a:pPr lvl="0"/>
             <a:r>
-              <a:rPr lang="en-US" smtClean="0"/>
+              <a:rPr lang="en-US"/>
               <a:t>Click to edit Master text styles</a:t>
             </a:r>
           </a:p>
           <a:p>
             <a:pPr lvl="1"/>
             <a:r>
-              <a:rPr lang="en-US" smtClean="0"/>
+              <a:rPr lang="en-US"/>
               <a:t>Second level</a:t>
             </a:r>
           </a:p>
           <a:p>
             <a:pPr lvl="2"/>
             <a:r>
-              <a:rPr lang="en-US" smtClean="0"/>
+              <a:rPr lang="en-US"/>
               <a:t>Third level</a:t>
             </a:r>
           </a:p>
           <a:p>
             <a:pPr lvl="3"/>
             <a:r>
-              <a:rPr lang="en-US" smtClean="0"/>
+              <a:rPr lang="en-US"/>
               <a:t>Fourth level</a:t>
             </a:r>
           </a:p>
           <a:p>
             <a:pPr lvl="4"/>
             <a:r>
-              <a:rPr lang="en-US" smtClean="0"/>
+              <a:rPr lang="en-US"/>
               <a:t>Fifth level</a:t>
             </a:r>
-            <a:endParaRPr lang="en-US"/>
           </a:p>
         </p:txBody>
       </p:sp>
@@ -1643,38 +1647,37 @@
           <a:p>
             <a:pPr lvl="0"/>
             <a:r>
-              <a:rPr lang="en-US" smtClean="0"/>
+              <a:rPr lang="en-US"/>
               <a:t>Click to edit Master text styles</a:t>
             </a:r>
           </a:p>
           <a:p>
             <a:pPr lvl="1"/>
             <a:r>
-              <a:rPr lang="en-US" smtClean="0"/>
+              <a:rPr lang="en-US"/>
               <a:t>Second level</a:t>
             </a:r>
           </a:p>
           <a:p>
             <a:pPr lvl="2"/>
             <a:r>
-              <a:rPr lang="en-US" smtClean="0"/>
+              <a:rPr lang="en-US"/>
               <a:t>Third level</a:t>
             </a:r>
           </a:p>
           <a:p>
             <a:pPr lvl="3"/>
             <a:r>
-              <a:rPr lang="en-US" smtClean="0"/>
+              <a:rPr lang="en-US"/>
               <a:t>Fourth level</a:t>
             </a:r>
           </a:p>
           <a:p>
             <a:pPr lvl="4"/>
             <a:r>
-              <a:rPr lang="en-US" smtClean="0"/>
+              <a:rPr lang="en-US"/>
               <a:t>Fifth level</a:t>
             </a:r>
-            <a:endParaRPr lang="en-US"/>
           </a:p>
         </p:txBody>
       </p:sp>
@@ -1695,7 +1698,7 @@
           <a:p>
             <a:fld id="{78C97017-6FC3-485B-9764-EAC9E56C1D49}" type="datetimeFigureOut">
               <a:rPr lang="en-US" smtClean="0"/>
-              <a:t>10/16/2016</a:t>
+              <a:t>3/26/2019</a:t>
             </a:fld>
             <a:endParaRPr lang="en-US"/>
           </a:p>
@@ -1793,10 +1796,9 @@
           </a:lstStyle>
           <a:p>
             <a:r>
-              <a:rPr lang="en-US" smtClean="0"/>
+              <a:rPr lang="en-US"/>
               <a:t>Click to edit Master title style</a:t>
             </a:r>
-            <a:endParaRPr lang="en-US"/>
           </a:p>
         </p:txBody>
       </p:sp>
@@ -1859,7 +1861,7 @@
           <a:p>
             <a:pPr lvl="0"/>
             <a:r>
-              <a:rPr lang="en-US" smtClean="0"/>
+              <a:rPr lang="en-US"/>
               <a:t>Click to edit Master text styles</a:t>
             </a:r>
           </a:p>
@@ -1915,38 +1917,37 @@
           <a:p>
             <a:pPr lvl="0"/>
             <a:r>
-              <a:rPr lang="en-US" smtClean="0"/>
+              <a:rPr lang="en-US"/>
               <a:t>Click to edit Master text styles</a:t>
             </a:r>
           </a:p>
           <a:p>
             <a:pPr lvl="1"/>
             <a:r>
-              <a:rPr lang="en-US" smtClean="0"/>
+              <a:rPr lang="en-US"/>
               <a:t>Second level</a:t>
             </a:r>
           </a:p>
           <a:p>
             <a:pPr lvl="2"/>
             <a:r>
-              <a:rPr lang="en-US" smtClean="0"/>
+              <a:rPr lang="en-US"/>
               <a:t>Third level</a:t>
             </a:r>
           </a:p>
           <a:p>
             <a:pPr lvl="3"/>
             <a:r>
-              <a:rPr lang="en-US" smtClean="0"/>
+              <a:rPr lang="en-US"/>
               <a:t>Fourth level</a:t>
             </a:r>
           </a:p>
           <a:p>
             <a:pPr lvl="4"/>
             <a:r>
-              <a:rPr lang="en-US" smtClean="0"/>
+              <a:rPr lang="en-US"/>
               <a:t>Fifth level</a:t>
             </a:r>
-            <a:endParaRPr lang="en-US"/>
           </a:p>
         </p:txBody>
       </p:sp>
@@ -2009,7 +2010,7 @@
           <a:p>
             <a:pPr lvl="0"/>
             <a:r>
-              <a:rPr lang="en-US" smtClean="0"/>
+              <a:rPr lang="en-US"/>
               <a:t>Click to edit Master text styles</a:t>
             </a:r>
           </a:p>
@@ -2065,38 +2066,37 @@
           <a:p>
             <a:pPr lvl="0"/>
             <a:r>
-              <a:rPr lang="en-US" smtClean="0"/>
+              <a:rPr lang="en-US"/>
               <a:t>Click to edit Master text styles</a:t>
             </a:r>
           </a:p>
           <a:p>
             <a:pPr lvl="1"/>
             <a:r>
-              <a:rPr lang="en-US" smtClean="0"/>
+              <a:rPr lang="en-US"/>
               <a:t>Second level</a:t>
             </a:r>
           </a:p>
           <a:p>
             <a:pPr lvl="2"/>
             <a:r>
-              <a:rPr lang="en-US" smtClean="0"/>
+              <a:rPr lang="en-US"/>
               <a:t>Third level</a:t>
             </a:r>
           </a:p>
           <a:p>
             <a:pPr lvl="3"/>
             <a:r>
-              <a:rPr lang="en-US" smtClean="0"/>
+              <a:rPr lang="en-US"/>
               <a:t>Fourth level</a:t>
             </a:r>
           </a:p>
           <a:p>
             <a:pPr lvl="4"/>
             <a:r>
-              <a:rPr lang="en-US" smtClean="0"/>
+              <a:rPr lang="en-US"/>
               <a:t>Fifth level</a:t>
             </a:r>
-            <a:endParaRPr lang="en-US"/>
           </a:p>
         </p:txBody>
       </p:sp>
@@ -2117,7 +2117,7 @@
           <a:p>
             <a:fld id="{78C97017-6FC3-485B-9764-EAC9E56C1D49}" type="datetimeFigureOut">
               <a:rPr lang="en-US" smtClean="0"/>
-              <a:t>10/16/2016</a:t>
+              <a:t>3/26/2019</a:t>
             </a:fld>
             <a:endParaRPr lang="en-US"/>
           </a:p>
@@ -2211,10 +2211,9 @@
           <a:lstStyle/>
           <a:p>
             <a:r>
-              <a:rPr lang="en-US" smtClean="0"/>
+              <a:rPr lang="en-US"/>
               <a:t>Click to edit Master title style</a:t>
             </a:r>
-            <a:endParaRPr lang="en-US"/>
           </a:p>
         </p:txBody>
       </p:sp>
@@ -2235,7 +2234,7 @@
           <a:p>
             <a:fld id="{78C97017-6FC3-485B-9764-EAC9E56C1D49}" type="datetimeFigureOut">
               <a:rPr lang="en-US" smtClean="0"/>
-              <a:t>10/16/2016</a:t>
+              <a:t>3/26/2019</a:t>
             </a:fld>
             <a:endParaRPr lang="en-US"/>
           </a:p>
@@ -2330,7 +2329,7 @@
           <a:p>
             <a:fld id="{78C97017-6FC3-485B-9764-EAC9E56C1D49}" type="datetimeFigureOut">
               <a:rPr lang="en-US" smtClean="0"/>
-              <a:t>10/16/2016</a:t>
+              <a:t>3/26/2019</a:t>
             </a:fld>
             <a:endParaRPr lang="en-US"/>
           </a:p>
@@ -2433,10 +2432,9 @@
           </a:lstStyle>
           <a:p>
             <a:r>
-              <a:rPr lang="en-US" smtClean="0"/>
+              <a:rPr lang="en-US"/>
               <a:t>Click to edit Master title style</a:t>
             </a:r>
-            <a:endParaRPr lang="en-US"/>
           </a:p>
         </p:txBody>
       </p:sp>
@@ -2490,38 +2488,37 @@
           <a:p>
             <a:pPr lvl="0"/>
             <a:r>
-              <a:rPr lang="en-US" smtClean="0"/>
+              <a:rPr lang="en-US"/>
               <a:t>Click to edit Master text styles</a:t>
             </a:r>
           </a:p>
           <a:p>
             <a:pPr lvl="1"/>
             <a:r>
-              <a:rPr lang="en-US" smtClean="0"/>
+              <a:rPr lang="en-US"/>
               <a:t>Second level</a:t>
             </a:r>
           </a:p>
           <a:p>
             <a:pPr lvl="2"/>
             <a:r>
-              <a:rPr lang="en-US" smtClean="0"/>
+              <a:rPr lang="en-US"/>
               <a:t>Third level</a:t>
             </a:r>
           </a:p>
           <a:p>
             <a:pPr lvl="3"/>
             <a:r>
-              <a:rPr lang="en-US" smtClean="0"/>
+              <a:rPr lang="en-US"/>
               <a:t>Fourth level</a:t>
             </a:r>
           </a:p>
           <a:p>
             <a:pPr lvl="4"/>
             <a:r>
-              <a:rPr lang="en-US" smtClean="0"/>
+              <a:rPr lang="en-US"/>
               <a:t>Fifth level</a:t>
             </a:r>
-            <a:endParaRPr lang="en-US"/>
           </a:p>
         </p:txBody>
       </p:sp>
@@ -2584,7 +2581,7 @@
           <a:p>
             <a:pPr lvl="0"/>
             <a:r>
-              <a:rPr lang="en-US" smtClean="0"/>
+              <a:rPr lang="en-US"/>
               <a:t>Click to edit Master text styles</a:t>
             </a:r>
           </a:p>
@@ -2607,7 +2604,7 @@
           <a:p>
             <a:fld id="{78C97017-6FC3-485B-9764-EAC9E56C1D49}" type="datetimeFigureOut">
               <a:rPr lang="en-US" smtClean="0"/>
-              <a:t>10/16/2016</a:t>
+              <a:t>3/26/2019</a:t>
             </a:fld>
             <a:endParaRPr lang="en-US"/>
           </a:p>
@@ -2710,10 +2707,9 @@
           </a:lstStyle>
           <a:p>
             <a:r>
-              <a:rPr lang="en-US" smtClean="0"/>
+              <a:rPr lang="en-US"/>
               <a:t>Click to edit Master title style</a:t>
             </a:r>
-            <a:endParaRPr lang="en-US"/>
           </a:p>
         </p:txBody>
       </p:sp>
@@ -2837,7 +2833,7 @@
           <a:p>
             <a:pPr lvl="0"/>
             <a:r>
-              <a:rPr lang="en-US" smtClean="0"/>
+              <a:rPr lang="en-US"/>
               <a:t>Click to edit Master text styles</a:t>
             </a:r>
           </a:p>
@@ -2860,7 +2856,7 @@
           <a:p>
             <a:fld id="{78C97017-6FC3-485B-9764-EAC9E56C1D49}" type="datetimeFigureOut">
               <a:rPr lang="en-US" smtClean="0"/>
-              <a:t>10/16/2016</a:t>
+              <a:t>3/26/2019</a:t>
             </a:fld>
             <a:endParaRPr lang="en-US"/>
           </a:p>
@@ -2969,10 +2965,9 @@
           <a:lstStyle/>
           <a:p>
             <a:r>
-              <a:rPr lang="en-US" smtClean="0"/>
+              <a:rPr lang="en-US"/>
               <a:t>Click to edit Master title style</a:t>
             </a:r>
-            <a:endParaRPr lang="en-US"/>
           </a:p>
         </p:txBody>
       </p:sp>
@@ -3003,38 +2998,37 @@
           <a:p>
             <a:pPr lvl="0"/>
             <a:r>
-              <a:rPr lang="en-US" smtClean="0"/>
+              <a:rPr lang="en-US"/>
               <a:t>Click to edit Master text styles</a:t>
             </a:r>
           </a:p>
           <a:p>
             <a:pPr lvl="1"/>
             <a:r>
-              <a:rPr lang="en-US" smtClean="0"/>
+              <a:rPr lang="en-US"/>
               <a:t>Second level</a:t>
             </a:r>
           </a:p>
           <a:p>
             <a:pPr lvl="2"/>
             <a:r>
-              <a:rPr lang="en-US" smtClean="0"/>
+              <a:rPr lang="en-US"/>
               <a:t>Third level</a:t>
             </a:r>
           </a:p>
           <a:p>
             <a:pPr lvl="3"/>
             <a:r>
-              <a:rPr lang="en-US" smtClean="0"/>
+              <a:rPr lang="en-US"/>
               <a:t>Fourth level</a:t>
             </a:r>
           </a:p>
           <a:p>
             <a:pPr lvl="4"/>
             <a:r>
-              <a:rPr lang="en-US" smtClean="0"/>
+              <a:rPr lang="en-US"/>
               <a:t>Fifth level</a:t>
             </a:r>
-            <a:endParaRPr lang="en-US"/>
           </a:p>
         </p:txBody>
       </p:sp>
@@ -3073,7 +3067,7 @@
           <a:p>
             <a:fld id="{78C97017-6FC3-485B-9764-EAC9E56C1D49}" type="datetimeFigureOut">
               <a:rPr lang="en-US" smtClean="0"/>
-              <a:t>10/16/2016</a:t>
+              <a:t>3/26/2019</a:t>
             </a:fld>
             <a:endParaRPr lang="en-US"/>
           </a:p>
@@ -3492,7 +3486,7 @@
           <a:p>
             <a:pPr algn="ctr"/>
             <a:r>
-              <a:rPr lang="en-US" sz="1600" dirty="0" smtClean="0">
+              <a:rPr lang="en-US" sz="1600" dirty="0">
                 <a:solidFill>
                   <a:schemeClr val="bg1"/>
                 </a:solidFill>
@@ -3510,13 +3504,15 @@
       <p:cxnSp>
         <p:nvCxnSpPr>
           <p:cNvPr id="5" name="Straight Connector 4"/>
-          <p:cNvCxnSpPr/>
+          <p:cNvCxnSpPr>
+            <a:cxnSpLocks/>
+          </p:cNvCxnSpPr>
           <p:nvPr/>
         </p:nvCxnSpPr>
         <p:spPr>
           <a:xfrm>
             <a:off x="1658677" y="971597"/>
-            <a:ext cx="0" cy="1723059"/>
+            <a:ext cx="0" cy="2381203"/>
           </a:xfrm>
           <a:prstGeom prst="line">
             <a:avLst/>
@@ -3552,8 +3548,8 @@
         </p:nvSpPr>
         <p:spPr>
           <a:xfrm>
-            <a:off x="1586669" y="1322292"/>
-            <a:ext cx="152400" cy="1019910"/>
+            <a:off x="1544019" y="1322292"/>
+            <a:ext cx="195050" cy="1725708"/>
           </a:xfrm>
           <a:prstGeom prst="rect">
             <a:avLst/>
@@ -3856,7 +3852,7 @@
           <a:p>
             <a:pPr algn="ctr"/>
             <a:r>
-              <a:rPr lang="en-US" sz="1600" dirty="0" smtClean="0">
+              <a:rPr lang="en-US" sz="1600" dirty="0">
                 <a:solidFill>
                   <a:schemeClr val="bg1"/>
                 </a:solidFill>
@@ -3874,13 +3870,15 @@
       <p:cxnSp>
         <p:nvCxnSpPr>
           <p:cNvPr id="17" name="Straight Connector 16"/>
-          <p:cNvCxnSpPr/>
+          <p:cNvCxnSpPr>
+            <a:cxnSpLocks/>
+          </p:cNvCxnSpPr>
           <p:nvPr/>
         </p:nvCxnSpPr>
         <p:spPr>
           <a:xfrm>
             <a:off x="3882400" y="975284"/>
-            <a:ext cx="0" cy="1723059"/>
+            <a:ext cx="0" cy="2377516"/>
           </a:xfrm>
           <a:prstGeom prst="line">
             <a:avLst/>
@@ -3917,7 +3915,7 @@
         <p:spPr>
           <a:xfrm>
             <a:off x="3810392" y="1433477"/>
-            <a:ext cx="144016" cy="832525"/>
+            <a:ext cx="140431" cy="1462120"/>
           </a:xfrm>
           <a:prstGeom prst="rect">
             <a:avLst/>
@@ -4003,7 +4001,7 @@
           <a:p>
             <a:pPr algn="ctr"/>
             <a:r>
-              <a:rPr lang="en-US" sz="1600" dirty="0" smtClean="0">
+              <a:rPr lang="en-US" sz="1600" dirty="0">
                 <a:solidFill>
                   <a:schemeClr val="bg1"/>
                 </a:solidFill>
@@ -4021,13 +4019,15 @@
       <p:cxnSp>
         <p:nvCxnSpPr>
           <p:cNvPr id="20" name="Straight Connector 19"/>
-          <p:cNvCxnSpPr/>
+          <p:cNvCxnSpPr>
+            <a:cxnSpLocks/>
+          </p:cNvCxnSpPr>
           <p:nvPr/>
         </p:nvCxnSpPr>
         <p:spPr>
           <a:xfrm>
             <a:off x="5863600" y="971597"/>
-            <a:ext cx="0" cy="1723059"/>
+            <a:ext cx="0" cy="2381203"/>
           </a:xfrm>
           <a:prstGeom prst="line">
             <a:avLst/>
@@ -4109,13 +4109,15 @@
       <p:cxnSp>
         <p:nvCxnSpPr>
           <p:cNvPr id="23" name="Straight Arrow Connector 22"/>
-          <p:cNvCxnSpPr/>
+          <p:cNvCxnSpPr>
+            <a:cxnSpLocks/>
+          </p:cNvCxnSpPr>
           <p:nvPr/>
         </p:nvCxnSpPr>
         <p:spPr>
           <a:xfrm>
-            <a:off x="466818" y="1325979"/>
-            <a:ext cx="1119851" cy="0"/>
+            <a:off x="314394" y="1322292"/>
+            <a:ext cx="1229625" cy="0"/>
           </a:xfrm>
           <a:prstGeom prst="straightConnector1">
             <a:avLst/>
@@ -4150,8 +4152,8 @@
         </p:nvSpPr>
         <p:spPr>
           <a:xfrm>
-            <a:off x="466818" y="1345880"/>
-            <a:ext cx="860170" cy="215444"/>
+            <a:off x="636378" y="1446215"/>
+            <a:ext cx="704078" cy="215444"/>
           </a:xfrm>
           <a:prstGeom prst="rect">
             <a:avLst/>
@@ -4165,10 +4167,9 @@
           <a:lstStyle/>
           <a:p>
             <a:r>
-              <a:rPr lang="en-US" sz="1400" dirty="0" smtClean="0"/>
+              <a:rPr lang="en-US" sz="1400" dirty="0"/>
               <a:t>delete 1</a:t>
             </a:r>
-            <a:endParaRPr lang="en-US" sz="1400" dirty="0"/>
           </a:p>
         </p:txBody>
       </p:sp>
@@ -4231,18 +4232,13 @@
           <a:lstStyle/>
           <a:p>
             <a:r>
-              <a:rPr lang="en-US" sz="1400" dirty="0" smtClean="0">
+              <a:rPr lang="en-US" sz="1400" dirty="0">
                 <a:solidFill>
                   <a:srgbClr val="0070C0"/>
                 </a:solidFill>
               </a:rPr>
               <a:t>execute(“delete 1”)</a:t>
             </a:r>
-            <a:endParaRPr lang="en-US" sz="1400" dirty="0">
-              <a:solidFill>
-                <a:srgbClr val="0070C0"/>
-              </a:solidFill>
-            </a:endParaRPr>
           </a:p>
         </p:txBody>
       </p:sp>
@@ -4305,88 +4301,21 @@
           <a:lstStyle/>
           <a:p>
             <a:r>
-              <a:rPr lang="en-US" sz="1400" dirty="0" err="1" smtClean="0">
+              <a:rPr lang="en-US" sz="1400" dirty="0" err="1">
                 <a:solidFill>
                   <a:srgbClr val="7030A0"/>
                 </a:solidFill>
               </a:rPr>
-              <a:t>deletePerson</a:t>
-            </a:r>
-            <a:r>
-              <a:rPr lang="en-US" sz="1400" dirty="0" smtClean="0">
+              <a:t>deleteCard</a:t>
+            </a:r>
+            <a:r>
+              <a:rPr lang="en-US" sz="1400" dirty="0">
                 <a:solidFill>
                   <a:srgbClr val="7030A0"/>
                 </a:solidFill>
               </a:rPr>
-              <a:t>(p)</a:t>
-            </a:r>
-            <a:endParaRPr lang="en-US" sz="1400" dirty="0">
-              <a:solidFill>
-                <a:srgbClr val="7030A0"/>
-              </a:solidFill>
-            </a:endParaRPr>
-          </a:p>
-        </p:txBody>
-      </p:sp>
-      <p:sp>
-        <p:nvSpPr>
-          <p:cNvPr id="33" name="TextBox 32"/>
-          <p:cNvSpPr txBox="1"/>
-          <p:nvPr/>
-        </p:nvSpPr>
-        <p:spPr>
-          <a:xfrm>
-            <a:off x="6074030" y="1687656"/>
-            <a:ext cx="2438400" cy="215444"/>
-          </a:xfrm>
-          <a:prstGeom prst="rect">
-            <a:avLst/>
-          </a:prstGeom>
-          <a:noFill/>
-        </p:spPr>
-        <p:txBody>
-          <a:bodyPr wrap="square" lIns="0" tIns="0" rIns="0" bIns="0" rtlCol="0">
-            <a:spAutoFit/>
-          </a:bodyPr>
-          <a:lstStyle/>
-          <a:p>
-            <a:r>
-              <a:rPr lang="en-US" sz="1400" dirty="0" smtClean="0">
-                <a:solidFill>
-                  <a:schemeClr val="accent5">
-                    <a:lumMod val="75000"/>
-                  </a:schemeClr>
-                </a:solidFill>
-              </a:rPr>
-              <a:t>post(</a:t>
-            </a:r>
-            <a:r>
-              <a:rPr lang="en-US" sz="1400" dirty="0" err="1" smtClean="0">
-                <a:solidFill>
-                  <a:schemeClr val="accent5">
-                    <a:lumMod val="75000"/>
-                  </a:schemeClr>
-                </a:solidFill>
-              </a:rPr>
-              <a:t>AddressBookChangedEvent</a:t>
-            </a:r>
-            <a:r>
-              <a:rPr lang="en-US" sz="1400" dirty="0" smtClean="0">
-                <a:solidFill>
-                  <a:schemeClr val="accent5">
-                    <a:lumMod val="75000"/>
-                  </a:schemeClr>
-                </a:solidFill>
-              </a:rPr>
-              <a:t>)</a:t>
-            </a:r>
-            <a:endParaRPr lang="en-US" sz="1400" dirty="0">
-              <a:solidFill>
-                <a:schemeClr val="accent5">
-                  <a:lumMod val="75000"/>
-                </a:schemeClr>
-              </a:solidFill>
-            </a:endParaRPr>
+              <a:t>(c)</a:t>
+            </a:r>
           </a:p>
         </p:txBody>
       </p:sp>
@@ -4436,7 +4365,7 @@
         </p:nvCxnSpPr>
         <p:spPr>
           <a:xfrm>
-            <a:off x="1739069" y="2266002"/>
+            <a:off x="1733028" y="2895597"/>
             <a:ext cx="2058118" cy="0"/>
           </a:xfrm>
           <a:prstGeom prst="straightConnector1">
@@ -4474,7 +4403,7 @@
         </p:nvCxnSpPr>
         <p:spPr>
           <a:xfrm>
-            <a:off x="390618" y="2342202"/>
+            <a:off x="304800" y="3048000"/>
             <a:ext cx="1196051" cy="0"/>
           </a:xfrm>
           <a:prstGeom prst="straightConnector1">
@@ -4506,13 +4435,265 @@
       </p:cxnSp>
       <p:sp>
         <p:nvSpPr>
-          <p:cNvPr id="39" name="Rectangle 62"/>
+          <p:cNvPr id="53" name="Rectangle 62"/>
           <p:cNvSpPr/>
           <p:nvPr/>
         </p:nvSpPr>
         <p:spPr>
           <a:xfrm>
-            <a:off x="7696200" y="591251"/>
+            <a:off x="7370178" y="4278322"/>
+            <a:ext cx="1093635" cy="346760"/>
+          </a:xfrm>
+          <a:prstGeom prst="rect">
+            <a:avLst/>
+          </a:prstGeom>
+          <a:solidFill>
+            <a:schemeClr val="accent6">
+              <a:lumMod val="75000"/>
+            </a:schemeClr>
+          </a:solidFill>
+          <a:ln w="19050">
+            <a:solidFill>
+              <a:schemeClr val="accent6">
+                <a:lumMod val="75000"/>
+              </a:schemeClr>
+            </a:solidFill>
+          </a:ln>
+          <a:effectLst/>
+        </p:spPr>
+        <p:style>
+          <a:lnRef idx="1">
+            <a:schemeClr val="accent2"/>
+          </a:lnRef>
+          <a:fillRef idx="2">
+            <a:schemeClr val="accent2"/>
+          </a:fillRef>
+          <a:effectRef idx="1">
+            <a:schemeClr val="accent2"/>
+          </a:effectRef>
+          <a:fontRef idx="minor">
+            <a:schemeClr val="dk1"/>
+          </a:fontRef>
+        </p:style>
+        <p:txBody>
+          <a:bodyPr rtlCol="0" anchor="ctr"/>
+          <a:lstStyle/>
+          <a:p>
+            <a:pPr algn="ctr"/>
+            <a:r>
+              <a:rPr lang="en-US" sz="1600" dirty="0">
+                <a:solidFill>
+                  <a:schemeClr val="bg1"/>
+                </a:solidFill>
+              </a:rPr>
+              <a:t>:Storage</a:t>
+            </a:r>
+            <a:endParaRPr lang="en-SG" sz="1600" dirty="0">
+              <a:solidFill>
+                <a:schemeClr val="bg1"/>
+              </a:solidFill>
+            </a:endParaRPr>
+          </a:p>
+        </p:txBody>
+      </p:sp>
+      <p:cxnSp>
+        <p:nvCxnSpPr>
+          <p:cNvPr id="54" name="Straight Connector 53"/>
+          <p:cNvCxnSpPr/>
+          <p:nvPr/>
+        </p:nvCxnSpPr>
+        <p:spPr>
+          <a:xfrm>
+            <a:off x="7916995" y="4641993"/>
+            <a:ext cx="0" cy="1723059"/>
+          </a:xfrm>
+          <a:prstGeom prst="line">
+            <a:avLst/>
+          </a:prstGeom>
+          <a:ln w="19050">
+            <a:solidFill>
+              <a:schemeClr val="accent6">
+                <a:lumMod val="75000"/>
+              </a:schemeClr>
+            </a:solidFill>
+            <a:prstDash val="sysDash"/>
+          </a:ln>
+          <a:effectLst/>
+        </p:spPr>
+        <p:style>
+          <a:lnRef idx="1">
+            <a:schemeClr val="accent1"/>
+          </a:lnRef>
+          <a:fillRef idx="2">
+            <a:schemeClr val="accent1"/>
+          </a:fillRef>
+          <a:effectRef idx="1">
+            <a:schemeClr val="accent1"/>
+          </a:effectRef>
+          <a:fontRef idx="minor">
+            <a:schemeClr val="dk1"/>
+          </a:fontRef>
+        </p:style>
+      </p:cxnSp>
+      <p:sp>
+        <p:nvSpPr>
+          <p:cNvPr id="55" name="Rectangle 54"/>
+          <p:cNvSpPr/>
+          <p:nvPr/>
+        </p:nvSpPr>
+        <p:spPr>
+          <a:xfrm>
+            <a:off x="7844987" y="5335662"/>
+            <a:ext cx="124478" cy="287409"/>
+          </a:xfrm>
+          <a:prstGeom prst="rect">
+            <a:avLst/>
+          </a:prstGeom>
+          <a:solidFill>
+            <a:schemeClr val="accent6">
+              <a:lumMod val="75000"/>
+            </a:schemeClr>
+          </a:solidFill>
+          <a:ln>
+            <a:solidFill>
+              <a:schemeClr val="accent6">
+                <a:lumMod val="75000"/>
+              </a:schemeClr>
+            </a:solidFill>
+          </a:ln>
+          <a:effectLst/>
+        </p:spPr>
+        <p:style>
+          <a:lnRef idx="1">
+            <a:schemeClr val="accent3"/>
+          </a:lnRef>
+          <a:fillRef idx="2">
+            <a:schemeClr val="accent3"/>
+          </a:fillRef>
+          <a:effectRef idx="1">
+            <a:schemeClr val="accent3"/>
+          </a:effectRef>
+          <a:fontRef idx="minor">
+            <a:schemeClr val="dk1"/>
+          </a:fontRef>
+        </p:style>
+        <p:txBody>
+          <a:bodyPr rtlCol="0" anchor="ctr"/>
+          <a:lstStyle/>
+          <a:p>
+            <a:pPr algn="ctr"/>
+            <a:endParaRPr lang="en-SG" sz="1400">
+              <a:solidFill>
+                <a:schemeClr val="dk1"/>
+              </a:solidFill>
+            </a:endParaRPr>
+          </a:p>
+        </p:txBody>
+      </p:sp>
+      <p:sp>
+        <p:nvSpPr>
+          <p:cNvPr id="62" name="TextBox 61"/>
+          <p:cNvSpPr txBox="1"/>
+          <p:nvPr/>
+        </p:nvSpPr>
+        <p:spPr>
+          <a:xfrm>
+            <a:off x="1810094" y="4797674"/>
+            <a:ext cx="2716635" cy="215444"/>
+          </a:xfrm>
+          <a:prstGeom prst="rect">
+            <a:avLst/>
+          </a:prstGeom>
+          <a:noFill/>
+        </p:spPr>
+        <p:txBody>
+          <a:bodyPr wrap="square" lIns="0" tIns="0" rIns="0" bIns="0" rtlCol="0">
+            <a:spAutoFit/>
+          </a:bodyPr>
+          <a:lstStyle/>
+          <a:p>
+            <a:r>
+              <a:rPr lang="en-US" sz="1400" dirty="0">
+                <a:solidFill>
+                  <a:schemeClr val="accent5">
+                    <a:lumMod val="75000"/>
+                  </a:schemeClr>
+                </a:solidFill>
+              </a:rPr>
+              <a:t>post(</a:t>
+            </a:r>
+            <a:r>
+              <a:rPr lang="en-US" sz="1400" dirty="0" err="1">
+                <a:solidFill>
+                  <a:schemeClr val="accent5">
+                    <a:lumMod val="75000"/>
+                  </a:schemeClr>
+                </a:solidFill>
+              </a:rPr>
+              <a:t>AddressBookChangedEvent</a:t>
+            </a:r>
+            <a:r>
+              <a:rPr lang="en-US" sz="1400" dirty="0">
+                <a:solidFill>
+                  <a:schemeClr val="accent5">
+                    <a:lumMod val="75000"/>
+                  </a:schemeClr>
+                </a:solidFill>
+              </a:rPr>
+              <a:t>)</a:t>
+            </a:r>
+          </a:p>
+        </p:txBody>
+      </p:sp>
+      <p:cxnSp>
+        <p:nvCxnSpPr>
+          <p:cNvPr id="63" name="Straight Arrow Connector 62"/>
+          <p:cNvCxnSpPr/>
+          <p:nvPr/>
+        </p:nvCxnSpPr>
+        <p:spPr>
+          <a:xfrm flipH="1">
+            <a:off x="4526729" y="5623071"/>
+            <a:ext cx="3383941" cy="0"/>
+          </a:xfrm>
+          <a:prstGeom prst="straightConnector1">
+            <a:avLst/>
+          </a:prstGeom>
+          <a:ln w="19050">
+            <a:solidFill>
+              <a:schemeClr val="accent6">
+                <a:lumMod val="75000"/>
+              </a:schemeClr>
+            </a:solidFill>
+            <a:prstDash val="sysDash"/>
+            <a:headEnd type="none" w="med" len="med"/>
+            <a:tailEnd type="arrow" w="med" len="med"/>
+          </a:ln>
+        </p:spPr>
+        <p:style>
+          <a:lnRef idx="1">
+            <a:schemeClr val="accent1"/>
+          </a:lnRef>
+          <a:fillRef idx="0">
+            <a:schemeClr val="accent1"/>
+          </a:fillRef>
+          <a:effectRef idx="0">
+            <a:schemeClr val="accent1"/>
+          </a:effectRef>
+          <a:fontRef idx="minor">
+            <a:schemeClr val="tx1"/>
+          </a:fontRef>
+        </p:style>
+      </p:cxnSp>
+      <p:sp>
+        <p:nvSpPr>
+          <p:cNvPr id="66" name="Rectangle 62"/>
+          <p:cNvSpPr/>
+          <p:nvPr/>
+        </p:nvSpPr>
+        <p:spPr>
+          <a:xfrm>
+            <a:off x="3791146" y="4295233"/>
             <a:ext cx="1371600" cy="346760"/>
           </a:xfrm>
           <a:prstGeom prst="rect">
@@ -4552,7 +4733,7 @@
           <a:p>
             <a:pPr algn="ctr"/>
             <a:r>
-              <a:rPr lang="en-US" sz="1600" dirty="0" smtClean="0">
+              <a:rPr lang="en-US" sz="1600" dirty="0">
                 <a:solidFill>
                   <a:schemeClr val="bg1"/>
                 </a:solidFill>
@@ -4560,507 +4741,7 @@
               <a:t>:</a:t>
             </a:r>
             <a:r>
-              <a:rPr lang="en-US" sz="1600" dirty="0" err="1" smtClean="0">
-                <a:solidFill>
-                  <a:schemeClr val="bg1"/>
-                </a:solidFill>
-              </a:rPr>
-              <a:t>EventsCenter</a:t>
-            </a:r>
-            <a:endParaRPr lang="en-SG" sz="1600" dirty="0">
-              <a:solidFill>
-                <a:schemeClr val="bg1"/>
-              </a:solidFill>
-            </a:endParaRPr>
-          </a:p>
-        </p:txBody>
-      </p:sp>
-      <p:cxnSp>
-        <p:nvCxnSpPr>
-          <p:cNvPr id="40" name="Straight Connector 39"/>
-          <p:cNvCxnSpPr/>
-          <p:nvPr/>
-        </p:nvCxnSpPr>
-        <p:spPr>
-          <a:xfrm>
-            <a:off x="8616802" y="944305"/>
-            <a:ext cx="0" cy="1723059"/>
-          </a:xfrm>
-          <a:prstGeom prst="line">
-            <a:avLst/>
-          </a:prstGeom>
-          <a:ln w="19050">
-            <a:solidFill>
-              <a:schemeClr val="accent5">
-                <a:lumMod val="75000"/>
-              </a:schemeClr>
-            </a:solidFill>
-            <a:prstDash val="sysDash"/>
-          </a:ln>
-          <a:effectLst/>
-        </p:spPr>
-        <p:style>
-          <a:lnRef idx="1">
-            <a:schemeClr val="accent1"/>
-          </a:lnRef>
-          <a:fillRef idx="2">
-            <a:schemeClr val="accent1"/>
-          </a:fillRef>
-          <a:effectRef idx="1">
-            <a:schemeClr val="accent1"/>
-          </a:effectRef>
-          <a:fontRef idx="minor">
-            <a:schemeClr val="dk1"/>
-          </a:fontRef>
-        </p:style>
-      </p:cxnSp>
-      <p:sp>
-        <p:nvSpPr>
-          <p:cNvPr id="41" name="Rectangle 40"/>
-          <p:cNvSpPr/>
-          <p:nvPr/>
-        </p:nvSpPr>
-        <p:spPr>
-          <a:xfrm>
-            <a:off x="8544794" y="1961202"/>
-            <a:ext cx="142006" cy="176787"/>
-          </a:xfrm>
-          <a:prstGeom prst="rect">
-            <a:avLst/>
-          </a:prstGeom>
-          <a:solidFill>
-            <a:schemeClr val="accent5">
-              <a:lumMod val="75000"/>
-            </a:schemeClr>
-          </a:solidFill>
-          <a:ln>
-            <a:solidFill>
-              <a:schemeClr val="accent5">
-                <a:lumMod val="75000"/>
-              </a:schemeClr>
-            </a:solidFill>
-          </a:ln>
-          <a:effectLst/>
-        </p:spPr>
-        <p:style>
-          <a:lnRef idx="1">
-            <a:schemeClr val="accent3"/>
-          </a:lnRef>
-          <a:fillRef idx="2">
-            <a:schemeClr val="accent3"/>
-          </a:fillRef>
-          <a:effectRef idx="1">
-            <a:schemeClr val="accent3"/>
-          </a:effectRef>
-          <a:fontRef idx="minor">
-            <a:schemeClr val="dk1"/>
-          </a:fontRef>
-        </p:style>
-        <p:txBody>
-          <a:bodyPr rtlCol="0" anchor="ctr"/>
-          <a:lstStyle/>
-          <a:p>
-            <a:pPr algn="ctr"/>
-            <a:endParaRPr lang="en-SG" sz="1400">
-              <a:solidFill>
-                <a:schemeClr val="dk1"/>
-              </a:solidFill>
-            </a:endParaRPr>
-          </a:p>
-        </p:txBody>
-      </p:sp>
-      <p:cxnSp>
-        <p:nvCxnSpPr>
-          <p:cNvPr id="42" name="Straight Arrow Connector 41"/>
-          <p:cNvCxnSpPr/>
-          <p:nvPr/>
-        </p:nvCxnSpPr>
-        <p:spPr>
-          <a:xfrm>
-            <a:off x="5943992" y="1961202"/>
-            <a:ext cx="2568438" cy="0"/>
-          </a:xfrm>
-          <a:prstGeom prst="straightConnector1">
-            <a:avLst/>
-          </a:prstGeom>
-          <a:ln w="19050">
-            <a:solidFill>
-              <a:srgbClr val="7030A0"/>
-            </a:solidFill>
-            <a:tailEnd type="arrow"/>
-          </a:ln>
-        </p:spPr>
-        <p:style>
-          <a:lnRef idx="1">
-            <a:schemeClr val="accent1"/>
-          </a:lnRef>
-          <a:fillRef idx="0">
-            <a:schemeClr val="accent1"/>
-          </a:fillRef>
-          <a:effectRef idx="0">
-            <a:schemeClr val="accent1"/>
-          </a:effectRef>
-          <a:fontRef idx="minor">
-            <a:schemeClr val="tx1"/>
-          </a:fontRef>
-        </p:style>
-      </p:cxnSp>
-      <p:cxnSp>
-        <p:nvCxnSpPr>
-          <p:cNvPr id="44" name="Straight Arrow Connector 43"/>
-          <p:cNvCxnSpPr/>
-          <p:nvPr/>
-        </p:nvCxnSpPr>
-        <p:spPr>
-          <a:xfrm>
-            <a:off x="5943992" y="2137989"/>
-            <a:ext cx="2549946" cy="0"/>
-          </a:xfrm>
-          <a:prstGeom prst="straightConnector1">
-            <a:avLst/>
-          </a:prstGeom>
-          <a:ln w="19050">
-            <a:solidFill>
-              <a:schemeClr val="accent5">
-                <a:lumMod val="75000"/>
-              </a:schemeClr>
-            </a:solidFill>
-            <a:prstDash val="sysDash"/>
-            <a:headEnd type="arrow" w="med" len="med"/>
-            <a:tailEnd type="none" w="med" len="med"/>
-          </a:ln>
-        </p:spPr>
-        <p:style>
-          <a:lnRef idx="1">
-            <a:schemeClr val="accent1"/>
-          </a:lnRef>
-          <a:fillRef idx="0">
-            <a:schemeClr val="accent1"/>
-          </a:fillRef>
-          <a:effectRef idx="0">
-            <a:schemeClr val="accent1"/>
-          </a:effectRef>
-          <a:fontRef idx="minor">
-            <a:schemeClr val="tx1"/>
-          </a:fontRef>
-        </p:style>
-      </p:cxnSp>
-      <p:sp>
-        <p:nvSpPr>
-          <p:cNvPr id="53" name="Rectangle 62"/>
-          <p:cNvSpPr/>
-          <p:nvPr/>
-        </p:nvSpPr>
-        <p:spPr>
-          <a:xfrm>
-            <a:off x="7370178" y="4278322"/>
-            <a:ext cx="1093635" cy="346760"/>
-          </a:xfrm>
-          <a:prstGeom prst="rect">
-            <a:avLst/>
-          </a:prstGeom>
-          <a:solidFill>
-            <a:schemeClr val="accent6">
-              <a:lumMod val="75000"/>
-            </a:schemeClr>
-          </a:solidFill>
-          <a:ln w="19050">
-            <a:solidFill>
-              <a:schemeClr val="accent6">
-                <a:lumMod val="75000"/>
-              </a:schemeClr>
-            </a:solidFill>
-          </a:ln>
-          <a:effectLst/>
-        </p:spPr>
-        <p:style>
-          <a:lnRef idx="1">
-            <a:schemeClr val="accent2"/>
-          </a:lnRef>
-          <a:fillRef idx="2">
-            <a:schemeClr val="accent2"/>
-          </a:fillRef>
-          <a:effectRef idx="1">
-            <a:schemeClr val="accent2"/>
-          </a:effectRef>
-          <a:fontRef idx="minor">
-            <a:schemeClr val="dk1"/>
-          </a:fontRef>
-        </p:style>
-        <p:txBody>
-          <a:bodyPr rtlCol="0" anchor="ctr"/>
-          <a:lstStyle/>
-          <a:p>
-            <a:pPr algn="ctr"/>
-            <a:r>
-              <a:rPr lang="en-US" sz="1600" dirty="0" smtClean="0">
-                <a:solidFill>
-                  <a:schemeClr val="bg1"/>
-                </a:solidFill>
-              </a:rPr>
-              <a:t>:Storage</a:t>
-            </a:r>
-            <a:endParaRPr lang="en-SG" sz="1600" dirty="0">
-              <a:solidFill>
-                <a:schemeClr val="bg1"/>
-              </a:solidFill>
-            </a:endParaRPr>
-          </a:p>
-        </p:txBody>
-      </p:sp>
-      <p:cxnSp>
-        <p:nvCxnSpPr>
-          <p:cNvPr id="54" name="Straight Connector 53"/>
-          <p:cNvCxnSpPr/>
-          <p:nvPr/>
-        </p:nvCxnSpPr>
-        <p:spPr>
-          <a:xfrm>
-            <a:off x="7916995" y="4641993"/>
-            <a:ext cx="0" cy="1723059"/>
-          </a:xfrm>
-          <a:prstGeom prst="line">
-            <a:avLst/>
-          </a:prstGeom>
-          <a:ln w="19050">
-            <a:solidFill>
-              <a:schemeClr val="accent6">
-                <a:lumMod val="75000"/>
-              </a:schemeClr>
-            </a:solidFill>
-            <a:prstDash val="sysDash"/>
-          </a:ln>
-          <a:effectLst/>
-        </p:spPr>
-        <p:style>
-          <a:lnRef idx="1">
-            <a:schemeClr val="accent1"/>
-          </a:lnRef>
-          <a:fillRef idx="2">
-            <a:schemeClr val="accent1"/>
-          </a:fillRef>
-          <a:effectRef idx="1">
-            <a:schemeClr val="accent1"/>
-          </a:effectRef>
-          <a:fontRef idx="minor">
-            <a:schemeClr val="dk1"/>
-          </a:fontRef>
-        </p:style>
-      </p:cxnSp>
-      <p:sp>
-        <p:nvSpPr>
-          <p:cNvPr id="55" name="Rectangle 54"/>
-          <p:cNvSpPr/>
-          <p:nvPr/>
-        </p:nvSpPr>
-        <p:spPr>
-          <a:xfrm>
-            <a:off x="7844987" y="5335662"/>
-            <a:ext cx="124478" cy="287409"/>
-          </a:xfrm>
-          <a:prstGeom prst="rect">
-            <a:avLst/>
-          </a:prstGeom>
-          <a:solidFill>
-            <a:schemeClr val="accent6">
-              <a:lumMod val="75000"/>
-            </a:schemeClr>
-          </a:solidFill>
-          <a:ln>
-            <a:solidFill>
-              <a:schemeClr val="accent6">
-                <a:lumMod val="75000"/>
-              </a:schemeClr>
-            </a:solidFill>
-          </a:ln>
-          <a:effectLst/>
-        </p:spPr>
-        <p:style>
-          <a:lnRef idx="1">
-            <a:schemeClr val="accent3"/>
-          </a:lnRef>
-          <a:fillRef idx="2">
-            <a:schemeClr val="accent3"/>
-          </a:fillRef>
-          <a:effectRef idx="1">
-            <a:schemeClr val="accent3"/>
-          </a:effectRef>
-          <a:fontRef idx="minor">
-            <a:schemeClr val="dk1"/>
-          </a:fontRef>
-        </p:style>
-        <p:txBody>
-          <a:bodyPr rtlCol="0" anchor="ctr"/>
-          <a:lstStyle/>
-          <a:p>
-            <a:pPr algn="ctr"/>
-            <a:endParaRPr lang="en-SG" sz="1400">
-              <a:solidFill>
-                <a:schemeClr val="dk1"/>
-              </a:solidFill>
-            </a:endParaRPr>
-          </a:p>
-        </p:txBody>
-      </p:sp>
-      <p:sp>
-        <p:nvSpPr>
-          <p:cNvPr id="62" name="TextBox 61"/>
-          <p:cNvSpPr txBox="1"/>
-          <p:nvPr/>
-        </p:nvSpPr>
-        <p:spPr>
-          <a:xfrm>
-            <a:off x="1810094" y="4797674"/>
-            <a:ext cx="2716635" cy="215444"/>
-          </a:xfrm>
-          <a:prstGeom prst="rect">
-            <a:avLst/>
-          </a:prstGeom>
-          <a:noFill/>
-        </p:spPr>
-        <p:txBody>
-          <a:bodyPr wrap="square" lIns="0" tIns="0" rIns="0" bIns="0" rtlCol="0">
-            <a:spAutoFit/>
-          </a:bodyPr>
-          <a:lstStyle/>
-          <a:p>
-            <a:r>
-              <a:rPr lang="en-US" sz="1400" dirty="0" smtClean="0">
-                <a:solidFill>
-                  <a:schemeClr val="accent5">
-                    <a:lumMod val="75000"/>
-                  </a:schemeClr>
-                </a:solidFill>
-              </a:rPr>
-              <a:t>post(</a:t>
-            </a:r>
-            <a:r>
-              <a:rPr lang="en-US" sz="1400" dirty="0" err="1" smtClean="0">
-                <a:solidFill>
-                  <a:schemeClr val="accent5">
-                    <a:lumMod val="75000"/>
-                  </a:schemeClr>
-                </a:solidFill>
-              </a:rPr>
-              <a:t>AddressBookChangedEvent</a:t>
-            </a:r>
-            <a:r>
-              <a:rPr lang="en-US" sz="1400" dirty="0" smtClean="0">
-                <a:solidFill>
-                  <a:schemeClr val="accent5">
-                    <a:lumMod val="75000"/>
-                  </a:schemeClr>
-                </a:solidFill>
-              </a:rPr>
-              <a:t>)</a:t>
-            </a:r>
-            <a:endParaRPr lang="en-US" sz="1400" dirty="0">
-              <a:solidFill>
-                <a:schemeClr val="accent5">
-                  <a:lumMod val="75000"/>
-                </a:schemeClr>
-              </a:solidFill>
-            </a:endParaRPr>
-          </a:p>
-        </p:txBody>
-      </p:sp>
-      <p:cxnSp>
-        <p:nvCxnSpPr>
-          <p:cNvPr id="63" name="Straight Arrow Connector 62"/>
-          <p:cNvCxnSpPr/>
-          <p:nvPr/>
-        </p:nvCxnSpPr>
-        <p:spPr>
-          <a:xfrm flipH="1">
-            <a:off x="4526729" y="5623071"/>
-            <a:ext cx="3383941" cy="0"/>
-          </a:xfrm>
-          <a:prstGeom prst="straightConnector1">
-            <a:avLst/>
-          </a:prstGeom>
-          <a:ln w="19050">
-            <a:solidFill>
-              <a:schemeClr val="accent6">
-                <a:lumMod val="75000"/>
-              </a:schemeClr>
-            </a:solidFill>
-            <a:prstDash val="sysDash"/>
-            <a:headEnd type="none" w="med" len="med"/>
-            <a:tailEnd type="arrow" w="med" len="med"/>
-          </a:ln>
-        </p:spPr>
-        <p:style>
-          <a:lnRef idx="1">
-            <a:schemeClr val="accent1"/>
-          </a:lnRef>
-          <a:fillRef idx="0">
-            <a:schemeClr val="accent1"/>
-          </a:fillRef>
-          <a:effectRef idx="0">
-            <a:schemeClr val="accent1"/>
-          </a:effectRef>
-          <a:fontRef idx="minor">
-            <a:schemeClr val="tx1"/>
-          </a:fontRef>
-        </p:style>
-      </p:cxnSp>
-      <p:sp>
-        <p:nvSpPr>
-          <p:cNvPr id="66" name="Rectangle 62"/>
-          <p:cNvSpPr/>
-          <p:nvPr/>
-        </p:nvSpPr>
-        <p:spPr>
-          <a:xfrm>
-            <a:off x="3791146" y="4295233"/>
-            <a:ext cx="1371600" cy="346760"/>
-          </a:xfrm>
-          <a:prstGeom prst="rect">
-            <a:avLst/>
-          </a:prstGeom>
-          <a:solidFill>
-            <a:schemeClr val="accent5">
-              <a:lumMod val="75000"/>
-            </a:schemeClr>
-          </a:solidFill>
-          <a:ln w="19050">
-            <a:solidFill>
-              <a:schemeClr val="accent5">
-                <a:lumMod val="75000"/>
-              </a:schemeClr>
-            </a:solidFill>
-          </a:ln>
-          <a:effectLst/>
-        </p:spPr>
-        <p:style>
-          <a:lnRef idx="1">
-            <a:schemeClr val="accent2"/>
-          </a:lnRef>
-          <a:fillRef idx="2">
-            <a:schemeClr val="accent2"/>
-          </a:fillRef>
-          <a:effectRef idx="1">
-            <a:schemeClr val="accent2"/>
-          </a:effectRef>
-          <a:fontRef idx="minor">
-            <a:schemeClr val="dk1"/>
-          </a:fontRef>
-        </p:style>
-        <p:txBody>
-          <a:bodyPr rtlCol="0" anchor="ctr"/>
-          <a:lstStyle/>
-          <a:p>
-            <a:pPr algn="ctr"/>
-            <a:r>
-              <a:rPr lang="en-US" sz="1600" dirty="0" smtClean="0">
-                <a:solidFill>
-                  <a:schemeClr val="bg1"/>
-                </a:solidFill>
-              </a:rPr>
-              <a:t>:</a:t>
-            </a:r>
-            <a:r>
-              <a:rPr lang="en-US" sz="1600" dirty="0" err="1" smtClean="0">
+              <a:rPr lang="en-US" sz="1600" dirty="0" err="1">
                 <a:solidFill>
                   <a:schemeClr val="bg1"/>
                 </a:solidFill>
@@ -5307,7 +4988,7 @@
           <a:lstStyle/>
           <a:p>
             <a:r>
-              <a:rPr lang="en-US" sz="1400" dirty="0" err="1" smtClean="0">
+              <a:rPr lang="en-US" sz="1400" dirty="0" err="1">
                 <a:solidFill>
                   <a:schemeClr val="accent6">
                     <a:lumMod val="75000"/>
@@ -5317,7 +4998,7 @@
               <a:t>handleAddresssBookChangedEvent</a:t>
             </a:r>
             <a:r>
-              <a:rPr lang="en-US" sz="1400" dirty="0" smtClean="0">
+              <a:rPr lang="en-US" sz="1400" dirty="0">
                 <a:solidFill>
                   <a:schemeClr val="accent6">
                     <a:lumMod val="75000"/>
@@ -5326,26 +5007,21 @@
               </a:rPr>
               <a:t>()</a:t>
             </a:r>
-            <a:endParaRPr lang="en-US" sz="1400" dirty="0">
-              <a:solidFill>
-                <a:schemeClr val="accent6">
-                  <a:lumMod val="75000"/>
-                </a:schemeClr>
-              </a:solidFill>
-            </a:endParaRPr>
           </a:p>
         </p:txBody>
       </p:sp>
       <p:cxnSp>
         <p:nvCxnSpPr>
           <p:cNvPr id="85" name="Straight Connector 84"/>
-          <p:cNvCxnSpPr/>
+          <p:cNvCxnSpPr>
+            <a:cxnSpLocks/>
+          </p:cNvCxnSpPr>
           <p:nvPr/>
         </p:nvCxnSpPr>
         <p:spPr>
           <a:xfrm flipH="1">
             <a:off x="314394" y="1099672"/>
-            <a:ext cx="24" cy="1598671"/>
+            <a:ext cx="24" cy="2329328"/>
           </a:xfrm>
           <a:prstGeom prst="line">
             <a:avLst/>
@@ -5417,7 +5093,7 @@
           <a:p>
             <a:pPr algn="ctr"/>
             <a:r>
-              <a:rPr lang="en-US" sz="1600" dirty="0" smtClean="0">
+              <a:rPr lang="en-US" sz="1600" dirty="0">
                 <a:solidFill>
                   <a:schemeClr val="bg1"/>
                 </a:solidFill>
@@ -5620,7 +5296,7 @@
           <a:lstStyle/>
           <a:p>
             <a:r>
-              <a:rPr lang="en-US" sz="1400" dirty="0" err="1" smtClean="0">
+              <a:rPr lang="en-US" sz="1400" dirty="0" err="1">
                 <a:solidFill>
                   <a:srgbClr val="00B050"/>
                 </a:solidFill>
@@ -5628,18 +5304,13 @@
               <a:t>handleAddresssBookChangedEvent</a:t>
             </a:r>
             <a:r>
-              <a:rPr lang="en-US" sz="1400" dirty="0" smtClean="0">
+              <a:rPr lang="en-US" sz="1400" dirty="0">
                 <a:solidFill>
                   <a:srgbClr val="00B050"/>
                 </a:solidFill>
               </a:rPr>
               <a:t>()</a:t>
             </a:r>
-            <a:endParaRPr lang="en-US" sz="1400" dirty="0">
-              <a:solidFill>
-                <a:srgbClr val="00B050"/>
-              </a:solidFill>
-            </a:endParaRPr>
           </a:p>
         </p:txBody>
       </p:sp>
@@ -5826,18 +5497,13 @@
           <a:p>
             <a:pPr algn="r"/>
             <a:r>
-              <a:rPr lang="en-US" sz="1400" dirty="0" smtClean="0">
+              <a:rPr lang="en-US" sz="1400" dirty="0">
                 <a:solidFill>
                   <a:srgbClr val="00B050"/>
                 </a:solidFill>
               </a:rPr>
               <a:t>Update status bar</a:t>
             </a:r>
-            <a:endParaRPr lang="en-US" sz="1400" dirty="0">
-              <a:solidFill>
-                <a:srgbClr val="00B050"/>
-              </a:solidFill>
-            </a:endParaRPr>
           </a:p>
         </p:txBody>
       </p:sp>
@@ -6027,7 +5693,7 @@
           <a:lstStyle/>
           <a:p>
             <a:r>
-              <a:rPr lang="en-US" sz="1400" dirty="0" smtClean="0">
+              <a:rPr lang="en-US" sz="1400" dirty="0">
                 <a:solidFill>
                   <a:schemeClr val="accent6">
                     <a:lumMod val="75000"/>
@@ -6037,7 +5703,7 @@
               <a:t>Save </a:t>
             </a:r>
             <a:br>
-              <a:rPr lang="en-US" sz="1400" dirty="0" smtClean="0">
+              <a:rPr lang="en-US" sz="1400" dirty="0">
                 <a:solidFill>
                   <a:schemeClr val="accent6">
                     <a:lumMod val="75000"/>
@@ -6046,7 +5712,7 @@
               </a:rPr>
             </a:br>
             <a:r>
-              <a:rPr lang="en-US" sz="1400" dirty="0" smtClean="0">
+              <a:rPr lang="en-US" sz="1400" dirty="0">
                 <a:solidFill>
                   <a:schemeClr val="accent6">
                     <a:lumMod val="75000"/>
@@ -6055,13 +5721,587 @@
               </a:rPr>
               <a:t>to file</a:t>
             </a:r>
-            <a:endParaRPr lang="en-US" sz="1400" dirty="0">
+          </a:p>
+        </p:txBody>
+      </p:sp>
+      <p:sp>
+        <p:nvSpPr>
+          <p:cNvPr id="64" name="Rectangle 62">
+            <a:extLst>
+              <a:ext uri="{FF2B5EF4-FFF2-40B4-BE49-F238E27FC236}">
+                <a16:creationId xmlns:a16="http://schemas.microsoft.com/office/drawing/2014/main" id="{102130B7-C165-41D1-A00C-A4FA73E2FA80}"/>
+              </a:ext>
+            </a:extLst>
+          </p:cNvPr>
+          <p:cNvSpPr/>
+          <p:nvPr/>
+        </p:nvSpPr>
+        <p:spPr>
+          <a:xfrm>
+            <a:off x="7239000" y="598915"/>
+            <a:ext cx="1093635" cy="346760"/>
+          </a:xfrm>
+          <a:prstGeom prst="rect">
+            <a:avLst/>
+          </a:prstGeom>
+          <a:solidFill>
+            <a:schemeClr val="accent6">
+              <a:lumMod val="75000"/>
+            </a:schemeClr>
+          </a:solidFill>
+          <a:ln w="19050">
+            <a:solidFill>
+              <a:schemeClr val="accent6">
+                <a:lumMod val="75000"/>
+              </a:schemeClr>
+            </a:solidFill>
+          </a:ln>
+          <a:effectLst/>
+        </p:spPr>
+        <p:style>
+          <a:lnRef idx="1">
+            <a:schemeClr val="accent2"/>
+          </a:lnRef>
+          <a:fillRef idx="2">
+            <a:schemeClr val="accent2"/>
+          </a:fillRef>
+          <a:effectRef idx="1">
+            <a:schemeClr val="accent2"/>
+          </a:effectRef>
+          <a:fontRef idx="minor">
+            <a:schemeClr val="dk1"/>
+          </a:fontRef>
+        </p:style>
+        <p:txBody>
+          <a:bodyPr rtlCol="0" anchor="ctr"/>
+          <a:lstStyle/>
+          <a:p>
+            <a:pPr algn="ctr"/>
+            <a:r>
+              <a:rPr lang="en-US" sz="1600" dirty="0">
+                <a:solidFill>
+                  <a:schemeClr val="bg1"/>
+                </a:solidFill>
+              </a:rPr>
+              <a:t>:Storage</a:t>
+            </a:r>
+            <a:endParaRPr lang="en-SG" sz="1600" dirty="0">
+              <a:solidFill>
+                <a:schemeClr val="bg1"/>
+              </a:solidFill>
+            </a:endParaRPr>
+          </a:p>
+        </p:txBody>
+      </p:sp>
+      <p:cxnSp>
+        <p:nvCxnSpPr>
+          <p:cNvPr id="65" name="Straight Connector 64">
+            <a:extLst>
+              <a:ext uri="{FF2B5EF4-FFF2-40B4-BE49-F238E27FC236}">
+                <a16:creationId xmlns:a16="http://schemas.microsoft.com/office/drawing/2014/main" id="{1B890693-9AAB-4936-89E0-6A9F6F3AD361}"/>
+              </a:ext>
+            </a:extLst>
+          </p:cNvPr>
+          <p:cNvCxnSpPr>
+            <a:cxnSpLocks/>
+          </p:cNvCxnSpPr>
+          <p:nvPr/>
+        </p:nvCxnSpPr>
+        <p:spPr>
+          <a:xfrm>
+            <a:off x="7772400" y="896497"/>
+            <a:ext cx="0" cy="2456303"/>
+          </a:xfrm>
+          <a:prstGeom prst="line">
+            <a:avLst/>
+          </a:prstGeom>
+          <a:ln w="19050">
+            <a:solidFill>
+              <a:schemeClr val="accent6">
+                <a:lumMod val="75000"/>
+              </a:schemeClr>
+            </a:solidFill>
+            <a:prstDash val="sysDash"/>
+          </a:ln>
+          <a:effectLst/>
+        </p:spPr>
+        <p:style>
+          <a:lnRef idx="1">
+            <a:schemeClr val="accent1"/>
+          </a:lnRef>
+          <a:fillRef idx="2">
+            <a:schemeClr val="accent1"/>
+          </a:fillRef>
+          <a:effectRef idx="1">
+            <a:schemeClr val="accent1"/>
+          </a:effectRef>
+          <a:fontRef idx="minor">
+            <a:schemeClr val="dk1"/>
+          </a:fontRef>
+        </p:style>
+      </p:cxnSp>
+      <p:cxnSp>
+        <p:nvCxnSpPr>
+          <p:cNvPr id="71" name="Straight Arrow Connector 70">
+            <a:extLst>
+              <a:ext uri="{FF2B5EF4-FFF2-40B4-BE49-F238E27FC236}">
+                <a16:creationId xmlns:a16="http://schemas.microsoft.com/office/drawing/2014/main" id="{A493E40B-2C94-4508-8006-E6D8E778F5F1}"/>
+              </a:ext>
+            </a:extLst>
+          </p:cNvPr>
+          <p:cNvCxnSpPr>
+            <a:cxnSpLocks/>
+          </p:cNvCxnSpPr>
+          <p:nvPr/>
+        </p:nvCxnSpPr>
+        <p:spPr>
+          <a:xfrm>
+            <a:off x="3810392" y="2438400"/>
+            <a:ext cx="3885808" cy="0"/>
+          </a:xfrm>
+          <a:prstGeom prst="straightConnector1">
+            <a:avLst/>
+          </a:prstGeom>
+          <a:ln w="19050">
+            <a:solidFill>
+              <a:srgbClr val="0070C0"/>
+            </a:solidFill>
+            <a:tailEnd type="arrow"/>
+          </a:ln>
+        </p:spPr>
+        <p:style>
+          <a:lnRef idx="1">
+            <a:schemeClr val="accent1"/>
+          </a:lnRef>
+          <a:fillRef idx="0">
+            <a:schemeClr val="accent1"/>
+          </a:fillRef>
+          <a:effectRef idx="0">
+            <a:schemeClr val="accent1"/>
+          </a:effectRef>
+          <a:fontRef idx="minor">
+            <a:schemeClr val="tx1"/>
+          </a:fontRef>
+        </p:style>
+      </p:cxnSp>
+      <p:sp>
+        <p:nvSpPr>
+          <p:cNvPr id="73" name="Rectangle 72">
+            <a:extLst>
+              <a:ext uri="{FF2B5EF4-FFF2-40B4-BE49-F238E27FC236}">
+                <a16:creationId xmlns:a16="http://schemas.microsoft.com/office/drawing/2014/main" id="{35EF1318-34C8-4FEF-90E1-79A547FF8AB6}"/>
+              </a:ext>
+            </a:extLst>
+          </p:cNvPr>
+          <p:cNvSpPr/>
+          <p:nvPr/>
+        </p:nvSpPr>
+        <p:spPr>
+          <a:xfrm>
+            <a:off x="7696200" y="2440670"/>
+            <a:ext cx="124478" cy="287409"/>
+          </a:xfrm>
+          <a:prstGeom prst="rect">
+            <a:avLst/>
+          </a:prstGeom>
+          <a:solidFill>
+            <a:schemeClr val="accent6">
+              <a:lumMod val="75000"/>
+            </a:schemeClr>
+          </a:solidFill>
+          <a:ln>
+            <a:solidFill>
+              <a:schemeClr val="accent6">
+                <a:lumMod val="75000"/>
+              </a:schemeClr>
+            </a:solidFill>
+          </a:ln>
+          <a:effectLst/>
+        </p:spPr>
+        <p:style>
+          <a:lnRef idx="1">
+            <a:schemeClr val="accent3"/>
+          </a:lnRef>
+          <a:fillRef idx="2">
+            <a:schemeClr val="accent3"/>
+          </a:fillRef>
+          <a:effectRef idx="1">
+            <a:schemeClr val="accent3"/>
+          </a:effectRef>
+          <a:fontRef idx="minor">
+            <a:schemeClr val="dk1"/>
+          </a:fontRef>
+        </p:style>
+        <p:txBody>
+          <a:bodyPr rtlCol="0" anchor="ctr"/>
+          <a:lstStyle/>
+          <a:p>
+            <a:pPr algn="ctr"/>
+            <a:endParaRPr lang="en-SG" sz="1400">
+              <a:solidFill>
+                <a:schemeClr val="dk1"/>
+              </a:solidFill>
+            </a:endParaRPr>
+          </a:p>
+        </p:txBody>
+      </p:sp>
+      <p:grpSp>
+        <p:nvGrpSpPr>
+          <p:cNvPr id="75" name="Group 74">
+            <a:extLst>
+              <a:ext uri="{FF2B5EF4-FFF2-40B4-BE49-F238E27FC236}">
+                <a16:creationId xmlns:a16="http://schemas.microsoft.com/office/drawing/2014/main" id="{828F363A-C992-44C3-B5E6-E5335F393F1D}"/>
+              </a:ext>
+            </a:extLst>
+          </p:cNvPr>
+          <p:cNvGrpSpPr/>
+          <p:nvPr/>
+        </p:nvGrpSpPr>
+        <p:grpSpPr>
+          <a:xfrm flipH="1">
+            <a:off x="7788055" y="2440670"/>
+            <a:ext cx="217349" cy="270072"/>
+            <a:chOff x="1028134" y="5612032"/>
+            <a:chExt cx="217349" cy="270072"/>
+          </a:xfrm>
+        </p:grpSpPr>
+        <p:sp>
+          <p:nvSpPr>
+            <p:cNvPr id="76" name="Freeform 58">
+              <a:extLst>
+                <a:ext uri="{FF2B5EF4-FFF2-40B4-BE49-F238E27FC236}">
+                  <a16:creationId xmlns:a16="http://schemas.microsoft.com/office/drawing/2014/main" id="{41711F1F-8231-4D05-8AE9-0040AA419464}"/>
+                </a:ext>
+              </a:extLst>
+            </p:cNvPr>
+            <p:cNvSpPr/>
+            <p:nvPr/>
+          </p:nvSpPr>
+          <p:spPr>
+            <a:xfrm rot="2600998" flipH="1" flipV="1">
+              <a:off x="1028134" y="5612032"/>
+              <a:ext cx="167452" cy="116880"/>
+            </a:xfrm>
+            <a:custGeom>
+              <a:avLst/>
+              <a:gdLst>
+                <a:gd name="connsiteX0" fmla="*/ 0 w 226400"/>
+                <a:gd name="connsiteY0" fmla="*/ 32920 h 171466"/>
+                <a:gd name="connsiteX1" fmla="*/ 157018 w 226400"/>
+                <a:gd name="connsiteY1" fmla="*/ 5211 h 171466"/>
+                <a:gd name="connsiteX2" fmla="*/ 221673 w 226400"/>
+                <a:gd name="connsiteY2" fmla="*/ 125284 h 171466"/>
+                <a:gd name="connsiteX3" fmla="*/ 36945 w 226400"/>
+                <a:gd name="connsiteY3" fmla="*/ 171466 h 171466"/>
+              </a:gdLst>
+              <a:ahLst/>
+              <a:cxnLst>
+                <a:cxn ang="0">
+                  <a:pos x="connsiteX0" y="connsiteY0"/>
+                </a:cxn>
+                <a:cxn ang="0">
+                  <a:pos x="connsiteX1" y="connsiteY1"/>
+                </a:cxn>
+                <a:cxn ang="0">
+                  <a:pos x="connsiteX2" y="connsiteY2"/>
+                </a:cxn>
+                <a:cxn ang="0">
+                  <a:pos x="connsiteX3" y="connsiteY3"/>
+                </a:cxn>
+              </a:cxnLst>
+              <a:rect l="l" t="t" r="r" b="b"/>
+              <a:pathLst>
+                <a:path w="226400" h="171466">
+                  <a:moveTo>
+                    <a:pt x="0" y="32920"/>
+                  </a:moveTo>
+                  <a:cubicBezTo>
+                    <a:pt x="60036" y="11368"/>
+                    <a:pt x="120073" y="-10183"/>
+                    <a:pt x="157018" y="5211"/>
+                  </a:cubicBezTo>
+                  <a:cubicBezTo>
+                    <a:pt x="193963" y="20605"/>
+                    <a:pt x="241685" y="97575"/>
+                    <a:pt x="221673" y="125284"/>
+                  </a:cubicBezTo>
+                  <a:cubicBezTo>
+                    <a:pt x="201661" y="152993"/>
+                    <a:pt x="119303" y="162229"/>
+                    <a:pt x="36945" y="171466"/>
+                  </a:cubicBezTo>
+                </a:path>
+              </a:pathLst>
+            </a:custGeom>
+            <a:ln w="19050">
               <a:solidFill>
                 <a:schemeClr val="accent6">
                   <a:lumMod val="75000"/>
                 </a:schemeClr>
               </a:solidFill>
-            </a:endParaRPr>
+              <a:headEnd type="arrow" w="med" len="med"/>
+              <a:tailEnd type="none" w="med" len="med"/>
+            </a:ln>
+          </p:spPr>
+          <p:style>
+            <a:lnRef idx="1">
+              <a:schemeClr val="accent1"/>
+            </a:lnRef>
+            <a:fillRef idx="0">
+              <a:schemeClr val="accent1"/>
+            </a:fillRef>
+            <a:effectRef idx="0">
+              <a:schemeClr val="accent1"/>
+            </a:effectRef>
+            <a:fontRef idx="minor">
+              <a:schemeClr val="tx1"/>
+            </a:fontRef>
+          </p:style>
+          <p:txBody>
+            <a:bodyPr rtlCol="0" anchor="ctr"/>
+            <a:lstStyle/>
+            <a:p>
+              <a:pPr algn="ctr"/>
+              <a:endParaRPr lang="en-SG"/>
+            </a:p>
+          </p:txBody>
+        </p:sp>
+        <p:sp>
+          <p:nvSpPr>
+            <p:cNvPr id="77" name="Rectangle 76">
+              <a:extLst>
+                <a:ext uri="{FF2B5EF4-FFF2-40B4-BE49-F238E27FC236}">
+                  <a16:creationId xmlns:a16="http://schemas.microsoft.com/office/drawing/2014/main" id="{1544AD61-5626-4278-B9AD-7733891373D5}"/>
+                </a:ext>
+              </a:extLst>
+            </p:cNvPr>
+            <p:cNvSpPr/>
+            <p:nvPr/>
+          </p:nvSpPr>
+          <p:spPr>
+            <a:xfrm>
+              <a:off x="1147403" y="5712513"/>
+              <a:ext cx="98080" cy="169591"/>
+            </a:xfrm>
+            <a:prstGeom prst="rect">
+              <a:avLst/>
+            </a:prstGeom>
+            <a:solidFill>
+              <a:schemeClr val="accent6">
+                <a:lumMod val="75000"/>
+              </a:schemeClr>
+            </a:solidFill>
+            <a:ln>
+              <a:solidFill>
+                <a:schemeClr val="bg1"/>
+              </a:solidFill>
+            </a:ln>
+            <a:effectLst/>
+          </p:spPr>
+          <p:style>
+            <a:lnRef idx="1">
+              <a:schemeClr val="accent3"/>
+            </a:lnRef>
+            <a:fillRef idx="2">
+              <a:schemeClr val="accent3"/>
+            </a:fillRef>
+            <a:effectRef idx="1">
+              <a:schemeClr val="accent3"/>
+            </a:effectRef>
+            <a:fontRef idx="minor">
+              <a:schemeClr val="dk1"/>
+            </a:fontRef>
+          </p:style>
+          <p:txBody>
+            <a:bodyPr rtlCol="0" anchor="ctr"/>
+            <a:lstStyle/>
+            <a:p>
+              <a:pPr algn="ctr"/>
+              <a:endParaRPr lang="en-SG" sz="1400">
+                <a:solidFill>
+                  <a:schemeClr val="dk1"/>
+                </a:solidFill>
+              </a:endParaRPr>
+            </a:p>
+          </p:txBody>
+        </p:sp>
+      </p:grpSp>
+      <p:sp>
+        <p:nvSpPr>
+          <p:cNvPr id="78" name="TextBox 77">
+            <a:extLst>
+              <a:ext uri="{FF2B5EF4-FFF2-40B4-BE49-F238E27FC236}">
+                <a16:creationId xmlns:a16="http://schemas.microsoft.com/office/drawing/2014/main" id="{48527C90-2121-45F8-AF75-EC6BA5F26686}"/>
+              </a:ext>
+            </a:extLst>
+          </p:cNvPr>
+          <p:cNvSpPr txBox="1"/>
+          <p:nvPr/>
+        </p:nvSpPr>
+        <p:spPr>
+          <a:xfrm>
+            <a:off x="8075166" y="2286000"/>
+            <a:ext cx="539047" cy="430887"/>
+          </a:xfrm>
+          <a:prstGeom prst="rect">
+            <a:avLst/>
+          </a:prstGeom>
+          <a:noFill/>
+        </p:spPr>
+        <p:txBody>
+          <a:bodyPr wrap="square" lIns="0" tIns="0" rIns="0" bIns="0" rtlCol="0">
+            <a:spAutoFit/>
+          </a:bodyPr>
+          <a:lstStyle/>
+          <a:p>
+            <a:r>
+              <a:rPr lang="en-US" sz="1400" dirty="0">
+                <a:solidFill>
+                  <a:schemeClr val="accent6">
+                    <a:lumMod val="75000"/>
+                  </a:schemeClr>
+                </a:solidFill>
+              </a:rPr>
+              <a:t>Save </a:t>
+            </a:r>
+            <a:br>
+              <a:rPr lang="en-US" sz="1400" dirty="0">
+                <a:solidFill>
+                  <a:schemeClr val="accent6">
+                    <a:lumMod val="75000"/>
+                  </a:schemeClr>
+                </a:solidFill>
+              </a:rPr>
+            </a:br>
+            <a:r>
+              <a:rPr lang="en-US" sz="1400" dirty="0">
+                <a:solidFill>
+                  <a:schemeClr val="accent6">
+                    <a:lumMod val="75000"/>
+                  </a:schemeClr>
+                </a:solidFill>
+              </a:rPr>
+              <a:t>to file</a:t>
+            </a:r>
+          </a:p>
+        </p:txBody>
+      </p:sp>
+      <p:cxnSp>
+        <p:nvCxnSpPr>
+          <p:cNvPr id="79" name="Straight Arrow Connector 78">
+            <a:extLst>
+              <a:ext uri="{FF2B5EF4-FFF2-40B4-BE49-F238E27FC236}">
+                <a16:creationId xmlns:a16="http://schemas.microsoft.com/office/drawing/2014/main" id="{0A893586-622F-4362-8A92-8C73549DFFD8}"/>
+              </a:ext>
+            </a:extLst>
+          </p:cNvPr>
+          <p:cNvCxnSpPr>
+            <a:cxnSpLocks/>
+          </p:cNvCxnSpPr>
+          <p:nvPr/>
+        </p:nvCxnSpPr>
+        <p:spPr>
+          <a:xfrm flipH="1">
+            <a:off x="3970069" y="2728080"/>
+            <a:ext cx="3713647" cy="4959"/>
+          </a:xfrm>
+          <a:prstGeom prst="straightConnector1">
+            <a:avLst/>
+          </a:prstGeom>
+          <a:ln w="19050">
+            <a:solidFill>
+              <a:schemeClr val="accent6">
+                <a:lumMod val="75000"/>
+              </a:schemeClr>
+            </a:solidFill>
+            <a:prstDash val="sysDash"/>
+            <a:headEnd type="none" w="med" len="med"/>
+            <a:tailEnd type="arrow" w="med" len="med"/>
+          </a:ln>
+        </p:spPr>
+        <p:style>
+          <a:lnRef idx="1">
+            <a:schemeClr val="accent1"/>
+          </a:lnRef>
+          <a:fillRef idx="0">
+            <a:schemeClr val="accent1"/>
+          </a:fillRef>
+          <a:effectRef idx="0">
+            <a:schemeClr val="accent1"/>
+          </a:effectRef>
+          <a:fontRef idx="minor">
+            <a:schemeClr val="tx1"/>
+          </a:fontRef>
+        </p:style>
+      </p:cxnSp>
+      <p:sp>
+        <p:nvSpPr>
+          <p:cNvPr id="80" name="TextBox 79">
+            <a:extLst>
+              <a:ext uri="{FF2B5EF4-FFF2-40B4-BE49-F238E27FC236}">
+                <a16:creationId xmlns:a16="http://schemas.microsoft.com/office/drawing/2014/main" id="{777EBFF1-0D6A-4C5F-973D-F9E91411EE8C}"/>
+              </a:ext>
+            </a:extLst>
+          </p:cNvPr>
+          <p:cNvSpPr txBox="1"/>
+          <p:nvPr/>
+        </p:nvSpPr>
+        <p:spPr>
+          <a:xfrm>
+            <a:off x="4733565" y="2433429"/>
+            <a:ext cx="2659870" cy="215444"/>
+          </a:xfrm>
+          <a:prstGeom prst="rect">
+            <a:avLst/>
+          </a:prstGeom>
+          <a:noFill/>
+        </p:spPr>
+        <p:txBody>
+          <a:bodyPr wrap="square" lIns="0" tIns="0" rIns="0" bIns="0" rtlCol="0">
+            <a:spAutoFit/>
+          </a:bodyPr>
+          <a:lstStyle/>
+          <a:p>
+            <a:r>
+              <a:rPr lang="en-US" sz="1400" dirty="0" err="1">
+                <a:solidFill>
+                  <a:schemeClr val="accent6">
+                    <a:lumMod val="75000"/>
+                  </a:schemeClr>
+                </a:solidFill>
+              </a:rPr>
+              <a:t>saveCardFolder</a:t>
+            </a:r>
+            <a:r>
+              <a:rPr lang="en-US" sz="1400" dirty="0">
+                <a:solidFill>
+                  <a:schemeClr val="accent6">
+                    <a:lumMod val="75000"/>
+                  </a:schemeClr>
+                </a:solidFill>
+              </a:rPr>
+              <a:t>(</a:t>
+            </a:r>
+            <a:r>
+              <a:rPr lang="en-US" sz="1400" dirty="0" err="1">
+                <a:solidFill>
+                  <a:schemeClr val="accent6">
+                    <a:lumMod val="75000"/>
+                  </a:schemeClr>
+                </a:solidFill>
+              </a:rPr>
+              <a:t>cardFolder</a:t>
+            </a:r>
+            <a:r>
+              <a:rPr lang="en-US" sz="1400" dirty="0">
+                <a:solidFill>
+                  <a:schemeClr val="accent6">
+                    <a:lumMod val="75000"/>
+                  </a:schemeClr>
+                </a:solidFill>
+              </a:rPr>
+              <a:t>)</a:t>
+            </a:r>
           </a:p>
         </p:txBody>
       </p:sp>

</xml_diff>

<commit_message>
Update DG and diagrams
</commit_message>
<xml_diff>
--- a/docs/diagrams/HighLevelSequenceDiagrams.pptx
+++ b/docs/diagrams/HighLevelSequenceDiagrams.pptx
@@ -5,10 +5,11 @@
     <p:sldMasterId id="2147483648" r:id="rId1"/>
   </p:sldMasterIdLst>
   <p:notesMasterIdLst>
-    <p:notesMasterId r:id="rId3"/>
+    <p:notesMasterId r:id="rId4"/>
   </p:notesMasterIdLst>
   <p:sldIdLst>
     <p:sldId id="266" r:id="rId2"/>
+    <p:sldId id="267" r:id="rId3"/>
   </p:sldIdLst>
   <p:sldSz cx="9144000" cy="6858000" type="screen4x3"/>
   <p:notesSz cx="6858000" cy="9144000"/>
@@ -107,6 +108,22 @@
       </a:defRPr>
     </a:lvl9pPr>
   </p:defaultTextStyle>
+  <p:extLst>
+    <p:ext uri="{EFAFB233-063F-42B5-8137-9DF3F51BA10A}">
+      <p15:sldGuideLst xmlns:p15="http://schemas.microsoft.com/office/powerpoint/2012/main">
+        <p15:guide id="1" orient="horz" pos="1488">
+          <p15:clr>
+            <a:srgbClr val="A4A3A4"/>
+          </p15:clr>
+        </p15:guide>
+        <p15:guide id="2" pos="2880">
+          <p15:clr>
+            <a:srgbClr val="A4A3A4"/>
+          </p15:clr>
+        </p15:guide>
+      </p15:sldGuideLst>
+    </p:ext>
+  </p:extLst>
 </p:presentation>
 </file>
 
@@ -192,7 +209,7 @@
           <a:p>
             <a:fld id="{F5CC4B3F-88C1-4FFA-B1B6-F41C21DC6924}" type="datetimeFigureOut">
               <a:rPr lang="en-US" smtClean="0"/>
-              <a:t>10/16/2016</a:t>
+              <a:t>4/1/19</a:t>
             </a:fld>
             <a:endParaRPr lang="en-US"/>
           </a:p>
@@ -641,7 +658,7 @@
           <a:p>
             <a:fld id="{78C97017-6FC3-485B-9764-EAC9E56C1D49}" type="datetimeFigureOut">
               <a:rPr lang="en-US" smtClean="0"/>
-              <a:t>10/16/2016</a:t>
+              <a:t>4/1/19</a:t>
             </a:fld>
             <a:endParaRPr lang="en-US"/>
           </a:p>
@@ -811,7 +828,7 @@
           <a:p>
             <a:fld id="{78C97017-6FC3-485B-9764-EAC9E56C1D49}" type="datetimeFigureOut">
               <a:rPr lang="en-US" smtClean="0"/>
-              <a:t>10/16/2016</a:t>
+              <a:t>4/1/19</a:t>
             </a:fld>
             <a:endParaRPr lang="en-US"/>
           </a:p>
@@ -991,7 +1008,7 @@
           <a:p>
             <a:fld id="{78C97017-6FC3-485B-9764-EAC9E56C1D49}" type="datetimeFigureOut">
               <a:rPr lang="en-US" smtClean="0"/>
-              <a:t>10/16/2016</a:t>
+              <a:t>4/1/19</a:t>
             </a:fld>
             <a:endParaRPr lang="en-US"/>
           </a:p>
@@ -1161,7 +1178,7 @@
           <a:p>
             <a:fld id="{78C97017-6FC3-485B-9764-EAC9E56C1D49}" type="datetimeFigureOut">
               <a:rPr lang="en-US" smtClean="0"/>
-              <a:t>10/16/2016</a:t>
+              <a:t>4/1/19</a:t>
             </a:fld>
             <a:endParaRPr lang="en-US"/>
           </a:p>
@@ -1407,7 +1424,7 @@
           <a:p>
             <a:fld id="{78C97017-6FC3-485B-9764-EAC9E56C1D49}" type="datetimeFigureOut">
               <a:rPr lang="en-US" smtClean="0"/>
-              <a:t>10/16/2016</a:t>
+              <a:t>4/1/19</a:t>
             </a:fld>
             <a:endParaRPr lang="en-US"/>
           </a:p>
@@ -1695,7 +1712,7 @@
           <a:p>
             <a:fld id="{78C97017-6FC3-485B-9764-EAC9E56C1D49}" type="datetimeFigureOut">
               <a:rPr lang="en-US" smtClean="0"/>
-              <a:t>10/16/2016</a:t>
+              <a:t>4/1/19</a:t>
             </a:fld>
             <a:endParaRPr lang="en-US"/>
           </a:p>
@@ -2117,7 +2134,7 @@
           <a:p>
             <a:fld id="{78C97017-6FC3-485B-9764-EAC9E56C1D49}" type="datetimeFigureOut">
               <a:rPr lang="en-US" smtClean="0"/>
-              <a:t>10/16/2016</a:t>
+              <a:t>4/1/19</a:t>
             </a:fld>
             <a:endParaRPr lang="en-US"/>
           </a:p>
@@ -2235,7 +2252,7 @@
           <a:p>
             <a:fld id="{78C97017-6FC3-485B-9764-EAC9E56C1D49}" type="datetimeFigureOut">
               <a:rPr lang="en-US" smtClean="0"/>
-              <a:t>10/16/2016</a:t>
+              <a:t>4/1/19</a:t>
             </a:fld>
             <a:endParaRPr lang="en-US"/>
           </a:p>
@@ -2330,7 +2347,7 @@
           <a:p>
             <a:fld id="{78C97017-6FC3-485B-9764-EAC9E56C1D49}" type="datetimeFigureOut">
               <a:rPr lang="en-US" smtClean="0"/>
-              <a:t>10/16/2016</a:t>
+              <a:t>4/1/19</a:t>
             </a:fld>
             <a:endParaRPr lang="en-US"/>
           </a:p>
@@ -2607,7 +2624,7 @@
           <a:p>
             <a:fld id="{78C97017-6FC3-485B-9764-EAC9E56C1D49}" type="datetimeFigureOut">
               <a:rPr lang="en-US" smtClean="0"/>
-              <a:t>10/16/2016</a:t>
+              <a:t>4/1/19</a:t>
             </a:fld>
             <a:endParaRPr lang="en-US"/>
           </a:p>
@@ -2860,7 +2877,7 @@
           <a:p>
             <a:fld id="{78C97017-6FC3-485B-9764-EAC9E56C1D49}" type="datetimeFigureOut">
               <a:rPr lang="en-US" smtClean="0"/>
-              <a:t>10/16/2016</a:t>
+              <a:t>4/1/19</a:t>
             </a:fld>
             <a:endParaRPr lang="en-US"/>
           </a:p>
@@ -3073,7 +3090,7 @@
           <a:p>
             <a:fld id="{78C97017-6FC3-485B-9764-EAC9E56C1D49}" type="datetimeFigureOut">
               <a:rPr lang="en-US" smtClean="0"/>
-              <a:t>10/16/2016</a:t>
+              <a:t>4/1/19</a:t>
             </a:fld>
             <a:endParaRPr lang="en-US"/>
           </a:p>
@@ -4216,8 +4233,8 @@
         </p:nvSpPr>
         <p:spPr>
           <a:xfrm>
-            <a:off x="2166172" y="1453379"/>
-            <a:ext cx="1424846" cy="215444"/>
+            <a:off x="1967782" y="1453379"/>
+            <a:ext cx="1689818" cy="215444"/>
           </a:xfrm>
           <a:prstGeom prst="rect">
             <a:avLst/>
@@ -6069,6 +6086,2841 @@
     <p:extLst>
       <p:ext uri="{BB962C8B-B14F-4D97-AF65-F5344CB8AC3E}">
         <p14:creationId xmlns:p14="http://schemas.microsoft.com/office/powerpoint/2010/main" val="4023378879"/>
+      </p:ext>
+    </p:extLst>
+  </p:cSld>
+  <p:clrMapOvr>
+    <a:masterClrMapping/>
+  </p:clrMapOvr>
+</p:sld>
+</file>
+
+<file path=ppt/slides/slide2.xml><?xml version="1.0" encoding="utf-8"?>
+<p:sld xmlns:a="http://schemas.openxmlformats.org/drawingml/2006/main" xmlns:r="http://schemas.openxmlformats.org/officeDocument/2006/relationships" xmlns:p="http://schemas.openxmlformats.org/presentationml/2006/main">
+  <p:cSld>
+    <p:spTree>
+      <p:nvGrpSpPr>
+        <p:cNvPr id="1" name=""/>
+        <p:cNvGrpSpPr/>
+        <p:nvPr/>
+      </p:nvGrpSpPr>
+      <p:grpSpPr>
+        <a:xfrm>
+          <a:off x="0" y="0"/>
+          <a:ext cx="0" cy="0"/>
+          <a:chOff x="0" y="0"/>
+          <a:chExt cx="0" cy="0"/>
+        </a:xfrm>
+      </p:grpSpPr>
+      <p:sp>
+        <p:nvSpPr>
+          <p:cNvPr id="2" name="Rectangle 62"/>
+          <p:cNvSpPr/>
+          <p:nvPr/>
+        </p:nvSpPr>
+        <p:spPr>
+          <a:xfrm>
+            <a:off x="1111860" y="607926"/>
+            <a:ext cx="1093635" cy="346760"/>
+          </a:xfrm>
+          <a:prstGeom prst="rect">
+            <a:avLst/>
+          </a:prstGeom>
+          <a:solidFill>
+            <a:srgbClr val="00B050"/>
+          </a:solidFill>
+          <a:ln w="19050">
+            <a:solidFill>
+              <a:srgbClr val="00B050"/>
+            </a:solidFill>
+          </a:ln>
+          <a:effectLst/>
+        </p:spPr>
+        <p:style>
+          <a:lnRef idx="1">
+            <a:schemeClr val="accent2"/>
+          </a:lnRef>
+          <a:fillRef idx="2">
+            <a:schemeClr val="accent2"/>
+          </a:fillRef>
+          <a:effectRef idx="1">
+            <a:schemeClr val="accent2"/>
+          </a:effectRef>
+          <a:fontRef idx="minor">
+            <a:schemeClr val="dk1"/>
+          </a:fontRef>
+        </p:style>
+        <p:txBody>
+          <a:bodyPr rtlCol="0" anchor="ctr"/>
+          <a:lstStyle/>
+          <a:p>
+            <a:pPr algn="ctr"/>
+            <a:r>
+              <a:rPr lang="en-US" sz="1600" dirty="0" smtClean="0">
+                <a:solidFill>
+                  <a:schemeClr val="bg1"/>
+                </a:solidFill>
+              </a:rPr>
+              <a:t>:UI</a:t>
+            </a:r>
+            <a:endParaRPr lang="en-SG" sz="1600" dirty="0">
+              <a:solidFill>
+                <a:schemeClr val="bg1"/>
+              </a:solidFill>
+            </a:endParaRPr>
+          </a:p>
+        </p:txBody>
+      </p:sp>
+      <p:cxnSp>
+        <p:nvCxnSpPr>
+          <p:cNvPr id="5" name="Straight Connector 4"/>
+          <p:cNvCxnSpPr/>
+          <p:nvPr/>
+        </p:nvCxnSpPr>
+        <p:spPr>
+          <a:xfrm flipH="1">
+            <a:off x="1676400" y="971597"/>
+            <a:ext cx="0" cy="2228803"/>
+          </a:xfrm>
+          <a:prstGeom prst="line">
+            <a:avLst/>
+          </a:prstGeom>
+          <a:ln w="19050">
+            <a:solidFill>
+              <a:srgbClr val="00B050"/>
+            </a:solidFill>
+            <a:prstDash val="sysDash"/>
+          </a:ln>
+          <a:effectLst/>
+        </p:spPr>
+        <p:style>
+          <a:lnRef idx="1">
+            <a:schemeClr val="accent1"/>
+          </a:lnRef>
+          <a:fillRef idx="2">
+            <a:schemeClr val="accent1"/>
+          </a:fillRef>
+          <a:effectRef idx="1">
+            <a:schemeClr val="accent1"/>
+          </a:effectRef>
+          <a:fontRef idx="minor">
+            <a:schemeClr val="dk1"/>
+          </a:fontRef>
+        </p:style>
+      </p:cxnSp>
+      <p:sp>
+        <p:nvSpPr>
+          <p:cNvPr id="6" name="Rectangle 5"/>
+          <p:cNvSpPr/>
+          <p:nvPr/>
+        </p:nvSpPr>
+        <p:spPr>
+          <a:xfrm>
+            <a:off x="1586668" y="1322292"/>
+            <a:ext cx="184489" cy="1637512"/>
+          </a:xfrm>
+          <a:prstGeom prst="rect">
+            <a:avLst/>
+          </a:prstGeom>
+          <a:solidFill>
+            <a:srgbClr val="00B050"/>
+          </a:solidFill>
+          <a:ln>
+            <a:solidFill>
+              <a:srgbClr val="00B050"/>
+            </a:solidFill>
+          </a:ln>
+          <a:effectLst/>
+        </p:spPr>
+        <p:style>
+          <a:lnRef idx="1">
+            <a:schemeClr val="accent3"/>
+          </a:lnRef>
+          <a:fillRef idx="2">
+            <a:schemeClr val="accent3"/>
+          </a:fillRef>
+          <a:effectRef idx="1">
+            <a:schemeClr val="accent3"/>
+          </a:effectRef>
+          <a:fontRef idx="minor">
+            <a:schemeClr val="dk1"/>
+          </a:fontRef>
+        </p:style>
+        <p:txBody>
+          <a:bodyPr rtlCol="0" anchor="ctr"/>
+          <a:lstStyle/>
+          <a:p>
+            <a:pPr algn="ctr"/>
+            <a:endParaRPr lang="en-SG" sz="1400">
+              <a:solidFill>
+                <a:schemeClr val="dk1"/>
+              </a:solidFill>
+            </a:endParaRPr>
+          </a:p>
+        </p:txBody>
+      </p:sp>
+      <p:grpSp>
+        <p:nvGrpSpPr>
+          <p:cNvPr id="7" name="Actor"/>
+          <p:cNvGrpSpPr/>
+          <p:nvPr/>
+        </p:nvGrpSpPr>
+        <p:grpSpPr>
+          <a:xfrm>
+            <a:off x="152400" y="533400"/>
+            <a:ext cx="324036" cy="573410"/>
+            <a:chOff x="3239901" y="4149080"/>
+            <a:chExt cx="648072" cy="1146820"/>
+          </a:xfrm>
+        </p:grpSpPr>
+        <p:sp>
+          <p:nvSpPr>
+            <p:cNvPr id="8" name="Flowchart: Connector 7"/>
+            <p:cNvSpPr/>
+            <p:nvPr/>
+          </p:nvSpPr>
+          <p:spPr>
+            <a:xfrm>
+              <a:off x="3419872" y="4149080"/>
+              <a:ext cx="288032" cy="288032"/>
+            </a:xfrm>
+            <a:prstGeom prst="flowChartConnector">
+              <a:avLst/>
+            </a:prstGeom>
+            <a:solidFill>
+              <a:schemeClr val="bg1">
+                <a:lumMod val="85000"/>
+              </a:schemeClr>
+            </a:solidFill>
+            <a:ln w="28575">
+              <a:solidFill>
+                <a:schemeClr val="tx1"/>
+              </a:solidFill>
+            </a:ln>
+            <a:effectLst/>
+          </p:spPr>
+          <p:style>
+            <a:lnRef idx="1">
+              <a:schemeClr val="accent4"/>
+            </a:lnRef>
+            <a:fillRef idx="2">
+              <a:schemeClr val="accent4"/>
+            </a:fillRef>
+            <a:effectRef idx="1">
+              <a:schemeClr val="accent4"/>
+            </a:effectRef>
+            <a:fontRef idx="minor">
+              <a:schemeClr val="dk1"/>
+            </a:fontRef>
+          </p:style>
+          <p:txBody>
+            <a:bodyPr rtlCol="0" anchor="ctr"/>
+            <a:lstStyle/>
+            <a:p>
+              <a:pPr algn="ctr"/>
+              <a:endParaRPr lang="en-SG"/>
+            </a:p>
+          </p:txBody>
+        </p:sp>
+        <p:cxnSp>
+          <p:nvCxnSpPr>
+            <p:cNvPr id="9" name="Straight Connector 8"/>
+            <p:cNvCxnSpPr>
+              <a:stCxn id="8" idx="4"/>
+            </p:cNvCxnSpPr>
+            <p:nvPr/>
+          </p:nvCxnSpPr>
+          <p:spPr>
+            <a:xfrm>
+              <a:off x="3563888" y="4437112"/>
+              <a:ext cx="0" cy="504056"/>
+            </a:xfrm>
+            <a:prstGeom prst="line">
+              <a:avLst/>
+            </a:prstGeom>
+            <a:ln w="28575">
+              <a:solidFill>
+                <a:schemeClr val="tx1"/>
+              </a:solidFill>
+            </a:ln>
+            <a:effectLst/>
+          </p:spPr>
+          <p:style>
+            <a:lnRef idx="1">
+              <a:schemeClr val="accent4"/>
+            </a:lnRef>
+            <a:fillRef idx="2">
+              <a:schemeClr val="accent4"/>
+            </a:fillRef>
+            <a:effectRef idx="1">
+              <a:schemeClr val="accent4"/>
+            </a:effectRef>
+            <a:fontRef idx="minor">
+              <a:schemeClr val="dk1"/>
+            </a:fontRef>
+          </p:style>
+        </p:cxnSp>
+        <p:sp>
+          <p:nvSpPr>
+            <p:cNvPr id="10" name="Freeform 9"/>
+            <p:cNvSpPr/>
+            <p:nvPr/>
+          </p:nvSpPr>
+          <p:spPr>
+            <a:xfrm>
+              <a:off x="3324225" y="4933950"/>
+              <a:ext cx="479425" cy="361950"/>
+            </a:xfrm>
+            <a:custGeom>
+              <a:avLst/>
+              <a:gdLst>
+                <a:gd name="connsiteX0" fmla="*/ 0 w 479425"/>
+                <a:gd name="connsiteY0" fmla="*/ 355600 h 361950"/>
+                <a:gd name="connsiteX1" fmla="*/ 241300 w 479425"/>
+                <a:gd name="connsiteY1" fmla="*/ 0 h 361950"/>
+                <a:gd name="connsiteX2" fmla="*/ 479425 w 479425"/>
+                <a:gd name="connsiteY2" fmla="*/ 361950 h 361950"/>
+              </a:gdLst>
+              <a:ahLst/>
+              <a:cxnLst>
+                <a:cxn ang="0">
+                  <a:pos x="connsiteX0" y="connsiteY0"/>
+                </a:cxn>
+                <a:cxn ang="0">
+                  <a:pos x="connsiteX1" y="connsiteY1"/>
+                </a:cxn>
+                <a:cxn ang="0">
+                  <a:pos x="connsiteX2" y="connsiteY2"/>
+                </a:cxn>
+              </a:cxnLst>
+              <a:rect l="l" t="t" r="r" b="b"/>
+              <a:pathLst>
+                <a:path w="479425" h="361950">
+                  <a:moveTo>
+                    <a:pt x="0" y="355600"/>
+                  </a:moveTo>
+                  <a:lnTo>
+                    <a:pt x="241300" y="0"/>
+                  </a:lnTo>
+                  <a:lnTo>
+                    <a:pt x="479425" y="361950"/>
+                  </a:lnTo>
+                </a:path>
+              </a:pathLst>
+            </a:custGeom>
+            <a:noFill/>
+            <a:ln w="28575">
+              <a:solidFill>
+                <a:schemeClr val="tx1"/>
+              </a:solidFill>
+            </a:ln>
+            <a:effectLst/>
+          </p:spPr>
+          <p:style>
+            <a:lnRef idx="1">
+              <a:schemeClr val="accent4"/>
+            </a:lnRef>
+            <a:fillRef idx="2">
+              <a:schemeClr val="accent4"/>
+            </a:fillRef>
+            <a:effectRef idx="1">
+              <a:schemeClr val="accent4"/>
+            </a:effectRef>
+            <a:fontRef idx="minor">
+              <a:schemeClr val="dk1"/>
+            </a:fontRef>
+          </p:style>
+          <p:txBody>
+            <a:bodyPr rtlCol="0" anchor="ctr"/>
+            <a:lstStyle/>
+            <a:p>
+              <a:pPr algn="ctr"/>
+              <a:endParaRPr lang="en-SG"/>
+            </a:p>
+          </p:txBody>
+        </p:sp>
+        <p:cxnSp>
+          <p:nvCxnSpPr>
+            <p:cNvPr id="11" name="Straight Connector 10"/>
+            <p:cNvCxnSpPr/>
+            <p:nvPr/>
+          </p:nvCxnSpPr>
+          <p:spPr>
+            <a:xfrm>
+              <a:off x="3239901" y="4509120"/>
+              <a:ext cx="648072" cy="0"/>
+            </a:xfrm>
+            <a:prstGeom prst="line">
+              <a:avLst/>
+            </a:prstGeom>
+            <a:ln w="28575">
+              <a:solidFill>
+                <a:schemeClr val="tx1"/>
+              </a:solidFill>
+            </a:ln>
+            <a:effectLst/>
+          </p:spPr>
+          <p:style>
+            <a:lnRef idx="1">
+              <a:schemeClr val="accent4"/>
+            </a:lnRef>
+            <a:fillRef idx="2">
+              <a:schemeClr val="accent4"/>
+            </a:fillRef>
+            <a:effectRef idx="1">
+              <a:schemeClr val="accent4"/>
+            </a:effectRef>
+            <a:fontRef idx="minor">
+              <a:schemeClr val="dk1"/>
+            </a:fontRef>
+          </p:style>
+        </p:cxnSp>
+      </p:grpSp>
+      <p:sp>
+        <p:nvSpPr>
+          <p:cNvPr id="16" name="Rectangle 62"/>
+          <p:cNvSpPr/>
+          <p:nvPr/>
+        </p:nvSpPr>
+        <p:spPr>
+          <a:xfrm>
+            <a:off x="3335583" y="611613"/>
+            <a:ext cx="1093635" cy="346760"/>
+          </a:xfrm>
+          <a:prstGeom prst="rect">
+            <a:avLst/>
+          </a:prstGeom>
+          <a:solidFill>
+            <a:srgbClr val="0070C0"/>
+          </a:solidFill>
+          <a:ln w="19050">
+            <a:solidFill>
+              <a:srgbClr val="0070C0"/>
+            </a:solidFill>
+          </a:ln>
+          <a:effectLst/>
+        </p:spPr>
+        <p:style>
+          <a:lnRef idx="1">
+            <a:schemeClr val="accent2"/>
+          </a:lnRef>
+          <a:fillRef idx="2">
+            <a:schemeClr val="accent2"/>
+          </a:fillRef>
+          <a:effectRef idx="1">
+            <a:schemeClr val="accent2"/>
+          </a:effectRef>
+          <a:fontRef idx="minor">
+            <a:schemeClr val="dk1"/>
+          </a:fontRef>
+        </p:style>
+        <p:txBody>
+          <a:bodyPr rtlCol="0" anchor="ctr"/>
+          <a:lstStyle/>
+          <a:p>
+            <a:pPr algn="ctr"/>
+            <a:r>
+              <a:rPr lang="en-US" sz="1600" dirty="0" smtClean="0">
+                <a:solidFill>
+                  <a:schemeClr val="bg1"/>
+                </a:solidFill>
+              </a:rPr>
+              <a:t>:Logic</a:t>
+            </a:r>
+            <a:endParaRPr lang="en-SG" sz="1600" dirty="0">
+              <a:solidFill>
+                <a:schemeClr val="bg1"/>
+              </a:solidFill>
+            </a:endParaRPr>
+          </a:p>
+        </p:txBody>
+      </p:sp>
+      <p:cxnSp>
+        <p:nvCxnSpPr>
+          <p:cNvPr id="17" name="Straight Connector 16"/>
+          <p:cNvCxnSpPr/>
+          <p:nvPr/>
+        </p:nvCxnSpPr>
+        <p:spPr>
+          <a:xfrm>
+            <a:off x="3882400" y="975284"/>
+            <a:ext cx="0" cy="2225116"/>
+          </a:xfrm>
+          <a:prstGeom prst="line">
+            <a:avLst/>
+          </a:prstGeom>
+          <a:ln w="19050">
+            <a:solidFill>
+              <a:srgbClr val="0070C0"/>
+            </a:solidFill>
+            <a:prstDash val="sysDash"/>
+          </a:ln>
+          <a:effectLst/>
+        </p:spPr>
+        <p:style>
+          <a:lnRef idx="1">
+            <a:schemeClr val="accent1"/>
+          </a:lnRef>
+          <a:fillRef idx="2">
+            <a:schemeClr val="accent1"/>
+          </a:fillRef>
+          <a:effectRef idx="1">
+            <a:schemeClr val="accent1"/>
+          </a:effectRef>
+          <a:fontRef idx="minor">
+            <a:schemeClr val="dk1"/>
+          </a:fontRef>
+        </p:style>
+      </p:cxnSp>
+      <p:sp>
+        <p:nvSpPr>
+          <p:cNvPr id="18" name="Rectangle 17"/>
+          <p:cNvSpPr/>
+          <p:nvPr/>
+        </p:nvSpPr>
+        <p:spPr>
+          <a:xfrm>
+            <a:off x="3810392" y="1433477"/>
+            <a:ext cx="166022" cy="1309723"/>
+          </a:xfrm>
+          <a:prstGeom prst="rect">
+            <a:avLst/>
+          </a:prstGeom>
+          <a:solidFill>
+            <a:srgbClr val="0070C0"/>
+          </a:solidFill>
+          <a:ln>
+            <a:solidFill>
+              <a:srgbClr val="0070C0"/>
+            </a:solidFill>
+          </a:ln>
+          <a:effectLst/>
+        </p:spPr>
+        <p:style>
+          <a:lnRef idx="1">
+            <a:schemeClr val="accent3"/>
+          </a:lnRef>
+          <a:fillRef idx="2">
+            <a:schemeClr val="accent3"/>
+          </a:fillRef>
+          <a:effectRef idx="1">
+            <a:schemeClr val="accent3"/>
+          </a:effectRef>
+          <a:fontRef idx="minor">
+            <a:schemeClr val="dk1"/>
+          </a:fontRef>
+        </p:style>
+        <p:txBody>
+          <a:bodyPr rtlCol="0" anchor="ctr"/>
+          <a:lstStyle/>
+          <a:p>
+            <a:pPr algn="ctr"/>
+            <a:endParaRPr lang="en-SG" sz="1400">
+              <a:solidFill>
+                <a:schemeClr val="dk1"/>
+              </a:solidFill>
+            </a:endParaRPr>
+          </a:p>
+        </p:txBody>
+      </p:sp>
+      <p:sp>
+        <p:nvSpPr>
+          <p:cNvPr id="19" name="Rectangle 62"/>
+          <p:cNvSpPr/>
+          <p:nvPr/>
+        </p:nvSpPr>
+        <p:spPr>
+          <a:xfrm>
+            <a:off x="5316783" y="607926"/>
+            <a:ext cx="1093635" cy="346760"/>
+          </a:xfrm>
+          <a:prstGeom prst="rect">
+            <a:avLst/>
+          </a:prstGeom>
+          <a:solidFill>
+            <a:srgbClr val="7030A0"/>
+          </a:solidFill>
+          <a:ln w="19050">
+            <a:solidFill>
+              <a:srgbClr val="7030A0"/>
+            </a:solidFill>
+          </a:ln>
+          <a:effectLst/>
+        </p:spPr>
+        <p:style>
+          <a:lnRef idx="1">
+            <a:schemeClr val="accent2"/>
+          </a:lnRef>
+          <a:fillRef idx="2">
+            <a:schemeClr val="accent2"/>
+          </a:fillRef>
+          <a:effectRef idx="1">
+            <a:schemeClr val="accent2"/>
+          </a:effectRef>
+          <a:fontRef idx="minor">
+            <a:schemeClr val="dk1"/>
+          </a:fontRef>
+        </p:style>
+        <p:txBody>
+          <a:bodyPr rtlCol="0" anchor="ctr"/>
+          <a:lstStyle/>
+          <a:p>
+            <a:pPr algn="ctr"/>
+            <a:r>
+              <a:rPr lang="en-US" sz="1600" dirty="0" smtClean="0">
+                <a:solidFill>
+                  <a:schemeClr val="bg1"/>
+                </a:solidFill>
+              </a:rPr>
+              <a:t>:Model</a:t>
+            </a:r>
+            <a:endParaRPr lang="en-SG" sz="1600" dirty="0">
+              <a:solidFill>
+                <a:schemeClr val="bg1"/>
+              </a:solidFill>
+            </a:endParaRPr>
+          </a:p>
+        </p:txBody>
+      </p:sp>
+      <p:cxnSp>
+        <p:nvCxnSpPr>
+          <p:cNvPr id="20" name="Straight Connector 19"/>
+          <p:cNvCxnSpPr/>
+          <p:nvPr/>
+        </p:nvCxnSpPr>
+        <p:spPr>
+          <a:xfrm>
+            <a:off x="5863600" y="971597"/>
+            <a:ext cx="0" cy="2228803"/>
+          </a:xfrm>
+          <a:prstGeom prst="line">
+            <a:avLst/>
+          </a:prstGeom>
+          <a:ln w="19050">
+            <a:solidFill>
+              <a:srgbClr val="7030A0"/>
+            </a:solidFill>
+            <a:prstDash val="sysDash"/>
+          </a:ln>
+          <a:effectLst/>
+        </p:spPr>
+        <p:style>
+          <a:lnRef idx="1">
+            <a:schemeClr val="accent1"/>
+          </a:lnRef>
+          <a:fillRef idx="2">
+            <a:schemeClr val="accent1"/>
+          </a:fillRef>
+          <a:effectRef idx="1">
+            <a:schemeClr val="accent1"/>
+          </a:effectRef>
+          <a:fontRef idx="minor">
+            <a:schemeClr val="dk1"/>
+          </a:fontRef>
+        </p:style>
+      </p:cxnSp>
+      <p:sp>
+        <p:nvSpPr>
+          <p:cNvPr id="21" name="Rectangle 20"/>
+          <p:cNvSpPr/>
+          <p:nvPr/>
+        </p:nvSpPr>
+        <p:spPr>
+          <a:xfrm>
+            <a:off x="5791592" y="1538408"/>
+            <a:ext cx="152400" cy="401194"/>
+          </a:xfrm>
+          <a:prstGeom prst="rect">
+            <a:avLst/>
+          </a:prstGeom>
+          <a:solidFill>
+            <a:srgbClr val="7030A0"/>
+          </a:solidFill>
+          <a:ln>
+            <a:solidFill>
+              <a:srgbClr val="7030A0"/>
+            </a:solidFill>
+          </a:ln>
+          <a:effectLst/>
+        </p:spPr>
+        <p:style>
+          <a:lnRef idx="1">
+            <a:schemeClr val="accent3"/>
+          </a:lnRef>
+          <a:fillRef idx="2">
+            <a:schemeClr val="accent3"/>
+          </a:fillRef>
+          <a:effectRef idx="1">
+            <a:schemeClr val="accent3"/>
+          </a:effectRef>
+          <a:fontRef idx="minor">
+            <a:schemeClr val="dk1"/>
+          </a:fontRef>
+        </p:style>
+        <p:txBody>
+          <a:bodyPr rtlCol="0" anchor="ctr"/>
+          <a:lstStyle/>
+          <a:p>
+            <a:pPr algn="ctr"/>
+            <a:endParaRPr lang="en-SG" sz="1400">
+              <a:solidFill>
+                <a:schemeClr val="dk1"/>
+              </a:solidFill>
+            </a:endParaRPr>
+          </a:p>
+        </p:txBody>
+      </p:sp>
+      <p:cxnSp>
+        <p:nvCxnSpPr>
+          <p:cNvPr id="23" name="Straight Arrow Connector 22"/>
+          <p:cNvCxnSpPr/>
+          <p:nvPr/>
+        </p:nvCxnSpPr>
+        <p:spPr>
+          <a:xfrm>
+            <a:off x="466818" y="1325979"/>
+            <a:ext cx="1119851" cy="0"/>
+          </a:xfrm>
+          <a:prstGeom prst="straightConnector1">
+            <a:avLst/>
+          </a:prstGeom>
+          <a:ln w="19050">
+            <a:solidFill>
+              <a:schemeClr val="tx1"/>
+            </a:solidFill>
+            <a:tailEnd type="arrow"/>
+          </a:ln>
+        </p:spPr>
+        <p:style>
+          <a:lnRef idx="1">
+            <a:schemeClr val="accent1"/>
+          </a:lnRef>
+          <a:fillRef idx="0">
+            <a:schemeClr val="accent1"/>
+          </a:fillRef>
+          <a:effectRef idx="0">
+            <a:schemeClr val="accent1"/>
+          </a:effectRef>
+          <a:fontRef idx="minor">
+            <a:schemeClr val="tx1"/>
+          </a:fontRef>
+        </p:style>
+      </p:cxnSp>
+      <p:sp>
+        <p:nvSpPr>
+          <p:cNvPr id="24" name="TextBox 23"/>
+          <p:cNvSpPr txBox="1"/>
+          <p:nvPr/>
+        </p:nvSpPr>
+        <p:spPr>
+          <a:xfrm>
+            <a:off x="510475" y="1345880"/>
+            <a:ext cx="1013525" cy="215444"/>
+          </a:xfrm>
+          <a:prstGeom prst="rect">
+            <a:avLst/>
+          </a:prstGeom>
+          <a:noFill/>
+        </p:spPr>
+        <p:txBody>
+          <a:bodyPr wrap="square" lIns="0" tIns="0" rIns="0" bIns="0" rtlCol="0">
+            <a:spAutoFit/>
+          </a:bodyPr>
+          <a:lstStyle/>
+          <a:p>
+            <a:r>
+              <a:rPr lang="en-US" sz="1400" dirty="0" smtClean="0"/>
+              <a:t>addTable 2</a:t>
+            </a:r>
+            <a:endParaRPr lang="en-US" sz="1400" dirty="0"/>
+          </a:p>
+        </p:txBody>
+      </p:sp>
+      <p:cxnSp>
+        <p:nvCxnSpPr>
+          <p:cNvPr id="25" name="Straight Arrow Connector 24"/>
+          <p:cNvCxnSpPr/>
+          <p:nvPr/>
+        </p:nvCxnSpPr>
+        <p:spPr>
+          <a:xfrm>
+            <a:off x="1739069" y="1433478"/>
+            <a:ext cx="2071323" cy="0"/>
+          </a:xfrm>
+          <a:prstGeom prst="straightConnector1">
+            <a:avLst/>
+          </a:prstGeom>
+          <a:ln w="19050">
+            <a:solidFill>
+              <a:srgbClr val="00B050"/>
+            </a:solidFill>
+            <a:tailEnd type="arrow"/>
+          </a:ln>
+        </p:spPr>
+        <p:style>
+          <a:lnRef idx="1">
+            <a:schemeClr val="accent1"/>
+          </a:lnRef>
+          <a:fillRef idx="0">
+            <a:schemeClr val="accent1"/>
+          </a:fillRef>
+          <a:effectRef idx="0">
+            <a:schemeClr val="accent1"/>
+          </a:effectRef>
+          <a:fontRef idx="minor">
+            <a:schemeClr val="tx1"/>
+          </a:fontRef>
+        </p:style>
+      </p:cxnSp>
+      <p:sp>
+        <p:nvSpPr>
+          <p:cNvPr id="26" name="TextBox 25"/>
+          <p:cNvSpPr txBox="1"/>
+          <p:nvPr/>
+        </p:nvSpPr>
+        <p:spPr>
+          <a:xfrm>
+            <a:off x="1949706" y="1453379"/>
+            <a:ext cx="1784094" cy="215444"/>
+          </a:xfrm>
+          <a:prstGeom prst="rect">
+            <a:avLst/>
+          </a:prstGeom>
+          <a:noFill/>
+        </p:spPr>
+        <p:txBody>
+          <a:bodyPr wrap="square" lIns="0" tIns="0" rIns="0" bIns="0" rtlCol="0">
+            <a:spAutoFit/>
+          </a:bodyPr>
+          <a:lstStyle/>
+          <a:p>
+            <a:r>
+              <a:rPr lang="en-US" sz="1400" dirty="0" smtClean="0">
+                <a:solidFill>
+                  <a:srgbClr val="0070C0"/>
+                </a:solidFill>
+              </a:rPr>
+              <a:t>execute(“addTable 2”)</a:t>
+            </a:r>
+            <a:endParaRPr lang="en-US" sz="1400" dirty="0">
+              <a:solidFill>
+                <a:srgbClr val="0070C0"/>
+              </a:solidFill>
+            </a:endParaRPr>
+          </a:p>
+        </p:txBody>
+      </p:sp>
+      <p:cxnSp>
+        <p:nvCxnSpPr>
+          <p:cNvPr id="28" name="Straight Arrow Connector 27"/>
+          <p:cNvCxnSpPr/>
+          <p:nvPr/>
+        </p:nvCxnSpPr>
+        <p:spPr>
+          <a:xfrm>
+            <a:off x="3954408" y="1538409"/>
+            <a:ext cx="1837184" cy="0"/>
+          </a:xfrm>
+          <a:prstGeom prst="straightConnector1">
+            <a:avLst/>
+          </a:prstGeom>
+          <a:ln w="19050">
+            <a:solidFill>
+              <a:srgbClr val="0070C0"/>
+            </a:solidFill>
+            <a:tailEnd type="arrow"/>
+          </a:ln>
+        </p:spPr>
+        <p:style>
+          <a:lnRef idx="1">
+            <a:schemeClr val="accent1"/>
+          </a:lnRef>
+          <a:fillRef idx="0">
+            <a:schemeClr val="accent1"/>
+          </a:fillRef>
+          <a:effectRef idx="0">
+            <a:schemeClr val="accent1"/>
+          </a:effectRef>
+          <a:fontRef idx="minor">
+            <a:schemeClr val="tx1"/>
+          </a:fontRef>
+        </p:style>
+      </p:cxnSp>
+      <p:sp>
+        <p:nvSpPr>
+          <p:cNvPr id="29" name="TextBox 28"/>
+          <p:cNvSpPr txBox="1"/>
+          <p:nvPr/>
+        </p:nvSpPr>
+        <p:spPr>
+          <a:xfrm>
+            <a:off x="4299772" y="1542583"/>
+            <a:ext cx="1424846" cy="215444"/>
+          </a:xfrm>
+          <a:prstGeom prst="rect">
+            <a:avLst/>
+          </a:prstGeom>
+          <a:noFill/>
+        </p:spPr>
+        <p:txBody>
+          <a:bodyPr wrap="square" lIns="0" tIns="0" rIns="0" bIns="0" rtlCol="0">
+            <a:spAutoFit/>
+          </a:bodyPr>
+          <a:lstStyle/>
+          <a:p>
+            <a:r>
+              <a:rPr lang="en-US" sz="1400" dirty="0" smtClean="0">
+                <a:solidFill>
+                  <a:srgbClr val="7030A0"/>
+                </a:solidFill>
+              </a:rPr>
+              <a:t>addTable(0/2)</a:t>
+            </a:r>
+            <a:endParaRPr lang="en-US" sz="1400" dirty="0">
+              <a:solidFill>
+                <a:srgbClr val="7030A0"/>
+              </a:solidFill>
+            </a:endParaRPr>
+          </a:p>
+        </p:txBody>
+      </p:sp>
+      <p:cxnSp>
+        <p:nvCxnSpPr>
+          <p:cNvPr id="34" name="Straight Arrow Connector 33"/>
+          <p:cNvCxnSpPr/>
+          <p:nvPr/>
+        </p:nvCxnSpPr>
+        <p:spPr>
+          <a:xfrm>
+            <a:off x="3976414" y="1939602"/>
+            <a:ext cx="1837184" cy="0"/>
+          </a:xfrm>
+          <a:prstGeom prst="straightConnector1">
+            <a:avLst/>
+          </a:prstGeom>
+          <a:ln w="19050">
+            <a:solidFill>
+              <a:srgbClr val="7030A0"/>
+            </a:solidFill>
+            <a:prstDash val="sysDash"/>
+            <a:headEnd type="arrow" w="med" len="med"/>
+            <a:tailEnd type="none" w="med" len="med"/>
+          </a:ln>
+        </p:spPr>
+        <p:style>
+          <a:lnRef idx="1">
+            <a:schemeClr val="accent1"/>
+          </a:lnRef>
+          <a:fillRef idx="0">
+            <a:schemeClr val="accent1"/>
+          </a:fillRef>
+          <a:effectRef idx="0">
+            <a:schemeClr val="accent1"/>
+          </a:effectRef>
+          <a:fontRef idx="minor">
+            <a:schemeClr val="tx1"/>
+          </a:fontRef>
+        </p:style>
+      </p:cxnSp>
+      <p:cxnSp>
+        <p:nvCxnSpPr>
+          <p:cNvPr id="35" name="Straight Arrow Connector 34"/>
+          <p:cNvCxnSpPr/>
+          <p:nvPr/>
+        </p:nvCxnSpPr>
+        <p:spPr>
+          <a:xfrm>
+            <a:off x="1780063" y="2743200"/>
+            <a:ext cx="2058118" cy="0"/>
+          </a:xfrm>
+          <a:prstGeom prst="straightConnector1">
+            <a:avLst/>
+          </a:prstGeom>
+          <a:ln w="19050">
+            <a:solidFill>
+              <a:srgbClr val="0070C0"/>
+            </a:solidFill>
+            <a:prstDash val="sysDash"/>
+            <a:headEnd type="arrow" w="med" len="med"/>
+            <a:tailEnd type="none" w="med" len="med"/>
+          </a:ln>
+        </p:spPr>
+        <p:style>
+          <a:lnRef idx="1">
+            <a:schemeClr val="accent1"/>
+          </a:lnRef>
+          <a:fillRef idx="0">
+            <a:schemeClr val="accent1"/>
+          </a:fillRef>
+          <a:effectRef idx="0">
+            <a:schemeClr val="accent1"/>
+          </a:effectRef>
+          <a:fontRef idx="minor">
+            <a:schemeClr val="tx1"/>
+          </a:fontRef>
+        </p:style>
+      </p:cxnSp>
+      <p:cxnSp>
+        <p:nvCxnSpPr>
+          <p:cNvPr id="37" name="Straight Arrow Connector 36"/>
+          <p:cNvCxnSpPr/>
+          <p:nvPr/>
+        </p:nvCxnSpPr>
+        <p:spPr>
+          <a:xfrm>
+            <a:off x="457200" y="2959804"/>
+            <a:ext cx="1196051" cy="0"/>
+          </a:xfrm>
+          <a:prstGeom prst="straightConnector1">
+            <a:avLst/>
+          </a:prstGeom>
+          <a:ln w="19050">
+            <a:solidFill>
+              <a:srgbClr val="00B050"/>
+            </a:solidFill>
+            <a:prstDash val="sysDash"/>
+            <a:headEnd type="arrow" w="med" len="med"/>
+            <a:tailEnd type="none" w="med" len="med"/>
+          </a:ln>
+        </p:spPr>
+        <p:style>
+          <a:lnRef idx="1">
+            <a:schemeClr val="accent1"/>
+          </a:lnRef>
+          <a:fillRef idx="0">
+            <a:schemeClr val="accent1"/>
+          </a:fillRef>
+          <a:effectRef idx="0">
+            <a:schemeClr val="accent1"/>
+          </a:effectRef>
+          <a:fontRef idx="minor">
+            <a:schemeClr val="tx1"/>
+          </a:fontRef>
+        </p:style>
+      </p:cxnSp>
+      <p:sp>
+        <p:nvSpPr>
+          <p:cNvPr id="53" name="Rectangle 62"/>
+          <p:cNvSpPr/>
+          <p:nvPr/>
+        </p:nvSpPr>
+        <p:spPr>
+          <a:xfrm>
+            <a:off x="7370178" y="4278322"/>
+            <a:ext cx="1093635" cy="346760"/>
+          </a:xfrm>
+          <a:prstGeom prst="rect">
+            <a:avLst/>
+          </a:prstGeom>
+          <a:solidFill>
+            <a:schemeClr val="accent6">
+              <a:lumMod val="75000"/>
+            </a:schemeClr>
+          </a:solidFill>
+          <a:ln w="19050">
+            <a:solidFill>
+              <a:schemeClr val="accent6">
+                <a:lumMod val="75000"/>
+              </a:schemeClr>
+            </a:solidFill>
+          </a:ln>
+          <a:effectLst/>
+        </p:spPr>
+        <p:style>
+          <a:lnRef idx="1">
+            <a:schemeClr val="accent2"/>
+          </a:lnRef>
+          <a:fillRef idx="2">
+            <a:schemeClr val="accent2"/>
+          </a:fillRef>
+          <a:effectRef idx="1">
+            <a:schemeClr val="accent2"/>
+          </a:effectRef>
+          <a:fontRef idx="minor">
+            <a:schemeClr val="dk1"/>
+          </a:fontRef>
+        </p:style>
+        <p:txBody>
+          <a:bodyPr rtlCol="0" anchor="ctr"/>
+          <a:lstStyle/>
+          <a:p>
+            <a:pPr algn="ctr"/>
+            <a:r>
+              <a:rPr lang="en-US" sz="1600" dirty="0" smtClean="0">
+                <a:solidFill>
+                  <a:schemeClr val="bg1"/>
+                </a:solidFill>
+              </a:rPr>
+              <a:t>:Storage</a:t>
+            </a:r>
+            <a:endParaRPr lang="en-SG" sz="1600" dirty="0">
+              <a:solidFill>
+                <a:schemeClr val="bg1"/>
+              </a:solidFill>
+            </a:endParaRPr>
+          </a:p>
+        </p:txBody>
+      </p:sp>
+      <p:cxnSp>
+        <p:nvCxnSpPr>
+          <p:cNvPr id="54" name="Straight Connector 53"/>
+          <p:cNvCxnSpPr/>
+          <p:nvPr/>
+        </p:nvCxnSpPr>
+        <p:spPr>
+          <a:xfrm>
+            <a:off x="7916995" y="4641993"/>
+            <a:ext cx="0" cy="1723059"/>
+          </a:xfrm>
+          <a:prstGeom prst="line">
+            <a:avLst/>
+          </a:prstGeom>
+          <a:ln w="19050">
+            <a:solidFill>
+              <a:schemeClr val="accent6">
+                <a:lumMod val="75000"/>
+              </a:schemeClr>
+            </a:solidFill>
+            <a:prstDash val="sysDash"/>
+          </a:ln>
+          <a:effectLst/>
+        </p:spPr>
+        <p:style>
+          <a:lnRef idx="1">
+            <a:schemeClr val="accent1"/>
+          </a:lnRef>
+          <a:fillRef idx="2">
+            <a:schemeClr val="accent1"/>
+          </a:fillRef>
+          <a:effectRef idx="1">
+            <a:schemeClr val="accent1"/>
+          </a:effectRef>
+          <a:fontRef idx="minor">
+            <a:schemeClr val="dk1"/>
+          </a:fontRef>
+        </p:style>
+      </p:cxnSp>
+      <p:sp>
+        <p:nvSpPr>
+          <p:cNvPr id="55" name="Rectangle 54"/>
+          <p:cNvSpPr/>
+          <p:nvPr/>
+        </p:nvSpPr>
+        <p:spPr>
+          <a:xfrm>
+            <a:off x="7844987" y="5335662"/>
+            <a:ext cx="124478" cy="287409"/>
+          </a:xfrm>
+          <a:prstGeom prst="rect">
+            <a:avLst/>
+          </a:prstGeom>
+          <a:solidFill>
+            <a:schemeClr val="accent6">
+              <a:lumMod val="75000"/>
+            </a:schemeClr>
+          </a:solidFill>
+          <a:ln>
+            <a:solidFill>
+              <a:schemeClr val="accent6">
+                <a:lumMod val="75000"/>
+              </a:schemeClr>
+            </a:solidFill>
+          </a:ln>
+          <a:effectLst/>
+        </p:spPr>
+        <p:style>
+          <a:lnRef idx="1">
+            <a:schemeClr val="accent3"/>
+          </a:lnRef>
+          <a:fillRef idx="2">
+            <a:schemeClr val="accent3"/>
+          </a:fillRef>
+          <a:effectRef idx="1">
+            <a:schemeClr val="accent3"/>
+          </a:effectRef>
+          <a:fontRef idx="minor">
+            <a:schemeClr val="dk1"/>
+          </a:fontRef>
+        </p:style>
+        <p:txBody>
+          <a:bodyPr rtlCol="0" anchor="ctr"/>
+          <a:lstStyle/>
+          <a:p>
+            <a:pPr algn="ctr"/>
+            <a:endParaRPr lang="en-SG" sz="1400">
+              <a:solidFill>
+                <a:schemeClr val="dk1"/>
+              </a:solidFill>
+            </a:endParaRPr>
+          </a:p>
+        </p:txBody>
+      </p:sp>
+      <p:sp>
+        <p:nvSpPr>
+          <p:cNvPr id="62" name="TextBox 61"/>
+          <p:cNvSpPr txBox="1"/>
+          <p:nvPr/>
+        </p:nvSpPr>
+        <p:spPr>
+          <a:xfrm>
+            <a:off x="1810094" y="4797674"/>
+            <a:ext cx="2716635" cy="215444"/>
+          </a:xfrm>
+          <a:prstGeom prst="rect">
+            <a:avLst/>
+          </a:prstGeom>
+          <a:noFill/>
+        </p:spPr>
+        <p:txBody>
+          <a:bodyPr wrap="square" lIns="0" tIns="0" rIns="0" bIns="0" rtlCol="0">
+            <a:spAutoFit/>
+          </a:bodyPr>
+          <a:lstStyle/>
+          <a:p>
+            <a:r>
+              <a:rPr lang="en-US" sz="1400" dirty="0" smtClean="0">
+                <a:solidFill>
+                  <a:schemeClr val="accent5">
+                    <a:lumMod val="75000"/>
+                  </a:schemeClr>
+                </a:solidFill>
+              </a:rPr>
+              <a:t>post(</a:t>
+            </a:r>
+            <a:r>
+              <a:rPr lang="en-US" sz="1400" dirty="0" err="1" smtClean="0">
+                <a:solidFill>
+                  <a:schemeClr val="accent5">
+                    <a:lumMod val="75000"/>
+                  </a:schemeClr>
+                </a:solidFill>
+              </a:rPr>
+              <a:t>AddressBookChangedEvent</a:t>
+            </a:r>
+            <a:r>
+              <a:rPr lang="en-US" sz="1400" dirty="0" smtClean="0">
+                <a:solidFill>
+                  <a:schemeClr val="accent5">
+                    <a:lumMod val="75000"/>
+                  </a:schemeClr>
+                </a:solidFill>
+              </a:rPr>
+              <a:t>)</a:t>
+            </a:r>
+            <a:endParaRPr lang="en-US" sz="1400" dirty="0">
+              <a:solidFill>
+                <a:schemeClr val="accent5">
+                  <a:lumMod val="75000"/>
+                </a:schemeClr>
+              </a:solidFill>
+            </a:endParaRPr>
+          </a:p>
+        </p:txBody>
+      </p:sp>
+      <p:cxnSp>
+        <p:nvCxnSpPr>
+          <p:cNvPr id="63" name="Straight Arrow Connector 62"/>
+          <p:cNvCxnSpPr/>
+          <p:nvPr/>
+        </p:nvCxnSpPr>
+        <p:spPr>
+          <a:xfrm flipH="1">
+            <a:off x="4526729" y="5623071"/>
+            <a:ext cx="3383941" cy="0"/>
+          </a:xfrm>
+          <a:prstGeom prst="straightConnector1">
+            <a:avLst/>
+          </a:prstGeom>
+          <a:ln w="19050">
+            <a:solidFill>
+              <a:schemeClr val="accent6">
+                <a:lumMod val="75000"/>
+              </a:schemeClr>
+            </a:solidFill>
+            <a:prstDash val="sysDash"/>
+            <a:headEnd type="none" w="med" len="med"/>
+            <a:tailEnd type="arrow" w="med" len="med"/>
+          </a:ln>
+        </p:spPr>
+        <p:style>
+          <a:lnRef idx="1">
+            <a:schemeClr val="accent1"/>
+          </a:lnRef>
+          <a:fillRef idx="0">
+            <a:schemeClr val="accent1"/>
+          </a:fillRef>
+          <a:effectRef idx="0">
+            <a:schemeClr val="accent1"/>
+          </a:effectRef>
+          <a:fontRef idx="minor">
+            <a:schemeClr val="tx1"/>
+          </a:fontRef>
+        </p:style>
+      </p:cxnSp>
+      <p:sp>
+        <p:nvSpPr>
+          <p:cNvPr id="66" name="Rectangle 62"/>
+          <p:cNvSpPr/>
+          <p:nvPr/>
+        </p:nvSpPr>
+        <p:spPr>
+          <a:xfrm>
+            <a:off x="3791146" y="4295233"/>
+            <a:ext cx="1371600" cy="346760"/>
+          </a:xfrm>
+          <a:prstGeom prst="rect">
+            <a:avLst/>
+          </a:prstGeom>
+          <a:solidFill>
+            <a:schemeClr val="accent5">
+              <a:lumMod val="75000"/>
+            </a:schemeClr>
+          </a:solidFill>
+          <a:ln w="19050">
+            <a:solidFill>
+              <a:schemeClr val="accent5">
+                <a:lumMod val="75000"/>
+              </a:schemeClr>
+            </a:solidFill>
+          </a:ln>
+          <a:effectLst/>
+        </p:spPr>
+        <p:style>
+          <a:lnRef idx="1">
+            <a:schemeClr val="accent2"/>
+          </a:lnRef>
+          <a:fillRef idx="2">
+            <a:schemeClr val="accent2"/>
+          </a:fillRef>
+          <a:effectRef idx="1">
+            <a:schemeClr val="accent2"/>
+          </a:effectRef>
+          <a:fontRef idx="minor">
+            <a:schemeClr val="dk1"/>
+          </a:fontRef>
+        </p:style>
+        <p:txBody>
+          <a:bodyPr rtlCol="0" anchor="ctr"/>
+          <a:lstStyle/>
+          <a:p>
+            <a:pPr algn="ctr"/>
+            <a:r>
+              <a:rPr lang="en-US" sz="1600" dirty="0" smtClean="0">
+                <a:solidFill>
+                  <a:schemeClr val="bg1"/>
+                </a:solidFill>
+              </a:rPr>
+              <a:t>:</a:t>
+            </a:r>
+            <a:r>
+              <a:rPr lang="en-US" sz="1600" dirty="0" err="1" smtClean="0">
+                <a:solidFill>
+                  <a:schemeClr val="bg1"/>
+                </a:solidFill>
+              </a:rPr>
+              <a:t>EventsCenter</a:t>
+            </a:r>
+            <a:endParaRPr lang="en-SG" sz="1600" dirty="0">
+              <a:solidFill>
+                <a:schemeClr val="bg1"/>
+              </a:solidFill>
+            </a:endParaRPr>
+          </a:p>
+        </p:txBody>
+      </p:sp>
+      <p:cxnSp>
+        <p:nvCxnSpPr>
+          <p:cNvPr id="67" name="Straight Connector 66"/>
+          <p:cNvCxnSpPr/>
+          <p:nvPr/>
+        </p:nvCxnSpPr>
+        <p:spPr>
+          <a:xfrm>
+            <a:off x="4456731" y="4648287"/>
+            <a:ext cx="0" cy="1723059"/>
+          </a:xfrm>
+          <a:prstGeom prst="line">
+            <a:avLst/>
+          </a:prstGeom>
+          <a:ln w="19050">
+            <a:solidFill>
+              <a:schemeClr val="accent5">
+                <a:lumMod val="75000"/>
+              </a:schemeClr>
+            </a:solidFill>
+            <a:prstDash val="sysDash"/>
+          </a:ln>
+          <a:effectLst/>
+        </p:spPr>
+        <p:style>
+          <a:lnRef idx="1">
+            <a:schemeClr val="accent1"/>
+          </a:lnRef>
+          <a:fillRef idx="2">
+            <a:schemeClr val="accent1"/>
+          </a:fillRef>
+          <a:effectRef idx="1">
+            <a:schemeClr val="accent1"/>
+          </a:effectRef>
+          <a:fontRef idx="minor">
+            <a:schemeClr val="dk1"/>
+          </a:fontRef>
+        </p:style>
+      </p:cxnSp>
+      <p:sp>
+        <p:nvSpPr>
+          <p:cNvPr id="68" name="Rectangle 67"/>
+          <p:cNvSpPr/>
+          <p:nvPr/>
+        </p:nvSpPr>
+        <p:spPr>
+          <a:xfrm>
+            <a:off x="4384723" y="5071220"/>
+            <a:ext cx="142006" cy="1036757"/>
+          </a:xfrm>
+          <a:prstGeom prst="rect">
+            <a:avLst/>
+          </a:prstGeom>
+          <a:solidFill>
+            <a:schemeClr val="accent5">
+              <a:lumMod val="75000"/>
+            </a:schemeClr>
+          </a:solidFill>
+          <a:ln>
+            <a:solidFill>
+              <a:schemeClr val="accent5">
+                <a:lumMod val="75000"/>
+              </a:schemeClr>
+            </a:solidFill>
+          </a:ln>
+          <a:effectLst/>
+        </p:spPr>
+        <p:style>
+          <a:lnRef idx="1">
+            <a:schemeClr val="accent3"/>
+          </a:lnRef>
+          <a:fillRef idx="2">
+            <a:schemeClr val="accent3"/>
+          </a:fillRef>
+          <a:effectRef idx="1">
+            <a:schemeClr val="accent3"/>
+          </a:effectRef>
+          <a:fontRef idx="minor">
+            <a:schemeClr val="dk1"/>
+          </a:fontRef>
+        </p:style>
+        <p:txBody>
+          <a:bodyPr rtlCol="0" anchor="ctr"/>
+          <a:lstStyle/>
+          <a:p>
+            <a:pPr algn="ctr"/>
+            <a:endParaRPr lang="en-SG" sz="1400">
+              <a:solidFill>
+                <a:schemeClr val="dk1"/>
+              </a:solidFill>
+            </a:endParaRPr>
+          </a:p>
+        </p:txBody>
+      </p:sp>
+      <p:cxnSp>
+        <p:nvCxnSpPr>
+          <p:cNvPr id="69" name="Straight Arrow Connector 68"/>
+          <p:cNvCxnSpPr/>
+          <p:nvPr/>
+        </p:nvCxnSpPr>
+        <p:spPr>
+          <a:xfrm>
+            <a:off x="3078929" y="5071220"/>
+            <a:ext cx="1295400" cy="0"/>
+          </a:xfrm>
+          <a:prstGeom prst="straightConnector1">
+            <a:avLst/>
+          </a:prstGeom>
+          <a:ln w="19050">
+            <a:solidFill>
+              <a:srgbClr val="7030A0"/>
+            </a:solidFill>
+            <a:tailEnd type="arrow"/>
+          </a:ln>
+        </p:spPr>
+        <p:style>
+          <a:lnRef idx="1">
+            <a:schemeClr val="accent1"/>
+          </a:lnRef>
+          <a:fillRef idx="0">
+            <a:schemeClr val="accent1"/>
+          </a:fillRef>
+          <a:effectRef idx="0">
+            <a:schemeClr val="accent1"/>
+          </a:effectRef>
+          <a:fontRef idx="minor">
+            <a:schemeClr val="tx1"/>
+          </a:fontRef>
+        </p:style>
+      </p:cxnSp>
+      <p:cxnSp>
+        <p:nvCxnSpPr>
+          <p:cNvPr id="70" name="Straight Arrow Connector 69"/>
+          <p:cNvCxnSpPr/>
+          <p:nvPr/>
+        </p:nvCxnSpPr>
+        <p:spPr>
+          <a:xfrm>
+            <a:off x="2975642" y="6107977"/>
+            <a:ext cx="1448755" cy="0"/>
+          </a:xfrm>
+          <a:prstGeom prst="straightConnector1">
+            <a:avLst/>
+          </a:prstGeom>
+          <a:ln w="19050">
+            <a:solidFill>
+              <a:schemeClr val="accent5">
+                <a:lumMod val="75000"/>
+              </a:schemeClr>
+            </a:solidFill>
+            <a:prstDash val="sysDash"/>
+            <a:headEnd type="arrow" w="med" len="med"/>
+            <a:tailEnd type="none" w="med" len="med"/>
+          </a:ln>
+        </p:spPr>
+        <p:style>
+          <a:lnRef idx="1">
+            <a:schemeClr val="accent1"/>
+          </a:lnRef>
+          <a:fillRef idx="0">
+            <a:schemeClr val="accent1"/>
+          </a:fillRef>
+          <a:effectRef idx="0">
+            <a:schemeClr val="accent1"/>
+          </a:effectRef>
+          <a:fontRef idx="minor">
+            <a:schemeClr val="tx1"/>
+          </a:fontRef>
+        </p:style>
+      </p:cxnSp>
+      <p:cxnSp>
+        <p:nvCxnSpPr>
+          <p:cNvPr id="72" name="Straight Arrow Connector 71"/>
+          <p:cNvCxnSpPr/>
+          <p:nvPr/>
+        </p:nvCxnSpPr>
+        <p:spPr>
+          <a:xfrm>
+            <a:off x="4526729" y="5341014"/>
+            <a:ext cx="3318258" cy="0"/>
+          </a:xfrm>
+          <a:prstGeom prst="straightConnector1">
+            <a:avLst/>
+          </a:prstGeom>
+          <a:ln w="19050">
+            <a:solidFill>
+              <a:schemeClr val="accent5">
+                <a:lumMod val="75000"/>
+              </a:schemeClr>
+            </a:solidFill>
+            <a:headEnd type="none" w="med" len="med"/>
+            <a:tailEnd type="arrow" w="med" len="med"/>
+          </a:ln>
+        </p:spPr>
+        <p:style>
+          <a:lnRef idx="1">
+            <a:schemeClr val="accent1"/>
+          </a:lnRef>
+          <a:fillRef idx="0">
+            <a:schemeClr val="accent1"/>
+          </a:fillRef>
+          <a:effectRef idx="0">
+            <a:schemeClr val="accent1"/>
+          </a:effectRef>
+          <a:fontRef idx="minor">
+            <a:schemeClr val="tx1"/>
+          </a:fontRef>
+        </p:style>
+      </p:cxnSp>
+      <p:sp>
+        <p:nvSpPr>
+          <p:cNvPr id="74" name="TextBox 73"/>
+          <p:cNvSpPr txBox="1"/>
+          <p:nvPr/>
+        </p:nvSpPr>
+        <p:spPr>
+          <a:xfrm>
+            <a:off x="5036330" y="5065911"/>
+            <a:ext cx="2659870" cy="215444"/>
+          </a:xfrm>
+          <a:prstGeom prst="rect">
+            <a:avLst/>
+          </a:prstGeom>
+          <a:noFill/>
+        </p:spPr>
+        <p:txBody>
+          <a:bodyPr wrap="square" lIns="0" tIns="0" rIns="0" bIns="0" rtlCol="0">
+            <a:spAutoFit/>
+          </a:bodyPr>
+          <a:lstStyle/>
+          <a:p>
+            <a:r>
+              <a:rPr lang="en-US" sz="1400" dirty="0" err="1" smtClean="0">
+                <a:solidFill>
+                  <a:schemeClr val="accent6">
+                    <a:lumMod val="75000"/>
+                  </a:schemeClr>
+                </a:solidFill>
+              </a:rPr>
+              <a:t>handleAddresssBookChangedEvent</a:t>
+            </a:r>
+            <a:r>
+              <a:rPr lang="en-US" sz="1400" dirty="0" smtClean="0">
+                <a:solidFill>
+                  <a:schemeClr val="accent6">
+                    <a:lumMod val="75000"/>
+                  </a:schemeClr>
+                </a:solidFill>
+              </a:rPr>
+              <a:t>()</a:t>
+            </a:r>
+            <a:endParaRPr lang="en-US" sz="1400" dirty="0">
+              <a:solidFill>
+                <a:schemeClr val="accent6">
+                  <a:lumMod val="75000"/>
+                </a:schemeClr>
+              </a:solidFill>
+            </a:endParaRPr>
+          </a:p>
+        </p:txBody>
+      </p:sp>
+      <p:cxnSp>
+        <p:nvCxnSpPr>
+          <p:cNvPr id="85" name="Straight Connector 84"/>
+          <p:cNvCxnSpPr/>
+          <p:nvPr/>
+        </p:nvCxnSpPr>
+        <p:spPr>
+          <a:xfrm>
+            <a:off x="314418" y="1099672"/>
+            <a:ext cx="0" cy="2100728"/>
+          </a:xfrm>
+          <a:prstGeom prst="line">
+            <a:avLst/>
+          </a:prstGeom>
+          <a:ln w="19050">
+            <a:solidFill>
+              <a:schemeClr val="tx1"/>
+            </a:solidFill>
+            <a:prstDash val="sysDash"/>
+          </a:ln>
+          <a:effectLst/>
+        </p:spPr>
+        <p:style>
+          <a:lnRef idx="1">
+            <a:schemeClr val="accent1"/>
+          </a:lnRef>
+          <a:fillRef idx="2">
+            <a:schemeClr val="accent1"/>
+          </a:fillRef>
+          <a:effectRef idx="1">
+            <a:schemeClr val="accent1"/>
+          </a:effectRef>
+          <a:fontRef idx="minor">
+            <a:schemeClr val="dk1"/>
+          </a:fontRef>
+        </p:style>
+      </p:cxnSp>
+      <p:sp>
+        <p:nvSpPr>
+          <p:cNvPr id="45" name="Rectangle 62"/>
+          <p:cNvSpPr/>
+          <p:nvPr/>
+        </p:nvSpPr>
+        <p:spPr>
+          <a:xfrm>
+            <a:off x="721634" y="4278322"/>
+            <a:ext cx="1093635" cy="346760"/>
+          </a:xfrm>
+          <a:prstGeom prst="rect">
+            <a:avLst/>
+          </a:prstGeom>
+          <a:solidFill>
+            <a:srgbClr val="00B050"/>
+          </a:solidFill>
+          <a:ln w="19050">
+            <a:solidFill>
+              <a:srgbClr val="00B050"/>
+            </a:solidFill>
+          </a:ln>
+          <a:effectLst/>
+        </p:spPr>
+        <p:style>
+          <a:lnRef idx="1">
+            <a:schemeClr val="accent2"/>
+          </a:lnRef>
+          <a:fillRef idx="2">
+            <a:schemeClr val="accent2"/>
+          </a:fillRef>
+          <a:effectRef idx="1">
+            <a:schemeClr val="accent2"/>
+          </a:effectRef>
+          <a:fontRef idx="minor">
+            <a:schemeClr val="dk1"/>
+          </a:fontRef>
+        </p:style>
+        <p:txBody>
+          <a:bodyPr rtlCol="0" anchor="ctr"/>
+          <a:lstStyle/>
+          <a:p>
+            <a:pPr algn="ctr"/>
+            <a:r>
+              <a:rPr lang="en-US" sz="1600" dirty="0" smtClean="0">
+                <a:solidFill>
+                  <a:schemeClr val="bg1"/>
+                </a:solidFill>
+              </a:rPr>
+              <a:t>:UI</a:t>
+            </a:r>
+            <a:endParaRPr lang="en-SG" sz="1600" dirty="0">
+              <a:solidFill>
+                <a:schemeClr val="bg1"/>
+              </a:solidFill>
+            </a:endParaRPr>
+          </a:p>
+        </p:txBody>
+      </p:sp>
+      <p:cxnSp>
+        <p:nvCxnSpPr>
+          <p:cNvPr id="46" name="Straight Connector 45"/>
+          <p:cNvCxnSpPr/>
+          <p:nvPr/>
+        </p:nvCxnSpPr>
+        <p:spPr>
+          <a:xfrm>
+            <a:off x="1268451" y="4641993"/>
+            <a:ext cx="0" cy="1723059"/>
+          </a:xfrm>
+          <a:prstGeom prst="line">
+            <a:avLst/>
+          </a:prstGeom>
+          <a:ln w="19050">
+            <a:solidFill>
+              <a:srgbClr val="00B050"/>
+            </a:solidFill>
+            <a:prstDash val="sysDash"/>
+          </a:ln>
+          <a:effectLst/>
+        </p:spPr>
+        <p:style>
+          <a:lnRef idx="1">
+            <a:schemeClr val="accent1"/>
+          </a:lnRef>
+          <a:fillRef idx="2">
+            <a:schemeClr val="accent1"/>
+          </a:fillRef>
+          <a:effectRef idx="1">
+            <a:schemeClr val="accent1"/>
+          </a:effectRef>
+          <a:fontRef idx="minor">
+            <a:schemeClr val="dk1"/>
+          </a:fontRef>
+        </p:style>
+      </p:cxnSp>
+      <p:sp>
+        <p:nvSpPr>
+          <p:cNvPr id="47" name="Rectangle 46"/>
+          <p:cNvSpPr/>
+          <p:nvPr/>
+        </p:nvSpPr>
+        <p:spPr>
+          <a:xfrm>
+            <a:off x="1196443" y="5670472"/>
+            <a:ext cx="130545" cy="273128"/>
+          </a:xfrm>
+          <a:prstGeom prst="rect">
+            <a:avLst/>
+          </a:prstGeom>
+          <a:solidFill>
+            <a:srgbClr val="00B050"/>
+          </a:solidFill>
+          <a:ln>
+            <a:solidFill>
+              <a:srgbClr val="00B050"/>
+            </a:solidFill>
+          </a:ln>
+          <a:effectLst/>
+        </p:spPr>
+        <p:style>
+          <a:lnRef idx="1">
+            <a:schemeClr val="accent3"/>
+          </a:lnRef>
+          <a:fillRef idx="2">
+            <a:schemeClr val="accent3"/>
+          </a:fillRef>
+          <a:effectRef idx="1">
+            <a:schemeClr val="accent3"/>
+          </a:effectRef>
+          <a:fontRef idx="minor">
+            <a:schemeClr val="dk1"/>
+          </a:fontRef>
+        </p:style>
+        <p:txBody>
+          <a:bodyPr rtlCol="0" anchor="ctr"/>
+          <a:lstStyle/>
+          <a:p>
+            <a:pPr algn="ctr"/>
+            <a:endParaRPr lang="en-SG" sz="1400">
+              <a:solidFill>
+                <a:schemeClr val="dk1"/>
+              </a:solidFill>
+            </a:endParaRPr>
+          </a:p>
+        </p:txBody>
+      </p:sp>
+      <p:cxnSp>
+        <p:nvCxnSpPr>
+          <p:cNvPr id="48" name="Straight Arrow Connector 47"/>
+          <p:cNvCxnSpPr/>
+          <p:nvPr/>
+        </p:nvCxnSpPr>
+        <p:spPr>
+          <a:xfrm flipH="1">
+            <a:off x="1348843" y="5943600"/>
+            <a:ext cx="3061842" cy="0"/>
+          </a:xfrm>
+          <a:prstGeom prst="straightConnector1">
+            <a:avLst/>
+          </a:prstGeom>
+          <a:ln w="19050">
+            <a:solidFill>
+              <a:srgbClr val="00B050"/>
+            </a:solidFill>
+            <a:prstDash val="sysDash"/>
+            <a:headEnd type="arrow" w="med" len="med"/>
+            <a:tailEnd type="none" w="med" len="med"/>
+          </a:ln>
+        </p:spPr>
+        <p:style>
+          <a:lnRef idx="1">
+            <a:schemeClr val="accent1"/>
+          </a:lnRef>
+          <a:fillRef idx="0">
+            <a:schemeClr val="accent1"/>
+          </a:fillRef>
+          <a:effectRef idx="0">
+            <a:schemeClr val="accent1"/>
+          </a:effectRef>
+          <a:fontRef idx="minor">
+            <a:schemeClr val="tx1"/>
+          </a:fontRef>
+        </p:style>
+      </p:cxnSp>
+      <p:cxnSp>
+        <p:nvCxnSpPr>
+          <p:cNvPr id="49" name="Straight Arrow Connector 48"/>
+          <p:cNvCxnSpPr/>
+          <p:nvPr/>
+        </p:nvCxnSpPr>
+        <p:spPr>
+          <a:xfrm>
+            <a:off x="1348843" y="5670472"/>
+            <a:ext cx="3061841" cy="0"/>
+          </a:xfrm>
+          <a:prstGeom prst="straightConnector1">
+            <a:avLst/>
+          </a:prstGeom>
+          <a:ln w="19050">
+            <a:solidFill>
+              <a:schemeClr val="accent5">
+                <a:lumMod val="75000"/>
+              </a:schemeClr>
+            </a:solidFill>
+            <a:headEnd type="arrow" w="med" len="med"/>
+            <a:tailEnd type="none" w="med" len="med"/>
+          </a:ln>
+        </p:spPr>
+        <p:style>
+          <a:lnRef idx="1">
+            <a:schemeClr val="accent1"/>
+          </a:lnRef>
+          <a:fillRef idx="0">
+            <a:schemeClr val="accent1"/>
+          </a:fillRef>
+          <a:effectRef idx="0">
+            <a:schemeClr val="accent1"/>
+          </a:effectRef>
+          <a:fontRef idx="minor">
+            <a:schemeClr val="tx1"/>
+          </a:fontRef>
+        </p:style>
+      </p:cxnSp>
+      <p:sp>
+        <p:nvSpPr>
+          <p:cNvPr id="50" name="TextBox 49"/>
+          <p:cNvSpPr txBox="1"/>
+          <p:nvPr/>
+        </p:nvSpPr>
+        <p:spPr>
+          <a:xfrm>
+            <a:off x="1416276" y="5395369"/>
+            <a:ext cx="2659870" cy="215444"/>
+          </a:xfrm>
+          <a:prstGeom prst="rect">
+            <a:avLst/>
+          </a:prstGeom>
+          <a:noFill/>
+        </p:spPr>
+        <p:txBody>
+          <a:bodyPr wrap="square" lIns="0" tIns="0" rIns="0" bIns="0" rtlCol="0">
+            <a:spAutoFit/>
+          </a:bodyPr>
+          <a:lstStyle/>
+          <a:p>
+            <a:r>
+              <a:rPr lang="en-US" sz="1400" dirty="0" err="1" smtClean="0">
+                <a:solidFill>
+                  <a:srgbClr val="00B050"/>
+                </a:solidFill>
+              </a:rPr>
+              <a:t>handleAddresssBookChangedEvent</a:t>
+            </a:r>
+            <a:r>
+              <a:rPr lang="en-US" sz="1400" dirty="0" smtClean="0">
+                <a:solidFill>
+                  <a:srgbClr val="00B050"/>
+                </a:solidFill>
+              </a:rPr>
+              <a:t>()</a:t>
+            </a:r>
+            <a:endParaRPr lang="en-US" sz="1400" dirty="0">
+              <a:solidFill>
+                <a:srgbClr val="00B050"/>
+              </a:solidFill>
+            </a:endParaRPr>
+          </a:p>
+        </p:txBody>
+      </p:sp>
+      <p:grpSp>
+        <p:nvGrpSpPr>
+          <p:cNvPr id="13" name="Group 12"/>
+          <p:cNvGrpSpPr/>
+          <p:nvPr/>
+        </p:nvGrpSpPr>
+        <p:grpSpPr>
+          <a:xfrm>
+            <a:off x="1028134" y="5612032"/>
+            <a:ext cx="217349" cy="270072"/>
+            <a:chOff x="1028134" y="5612032"/>
+            <a:chExt cx="217349" cy="270072"/>
+          </a:xfrm>
+        </p:grpSpPr>
+        <p:sp>
+          <p:nvSpPr>
+            <p:cNvPr id="12" name="Freeform 11"/>
+            <p:cNvSpPr/>
+            <p:nvPr/>
+          </p:nvSpPr>
+          <p:spPr>
+            <a:xfrm rot="2600998" flipH="1" flipV="1">
+              <a:off x="1028134" y="5612032"/>
+              <a:ext cx="167452" cy="116880"/>
+            </a:xfrm>
+            <a:custGeom>
+              <a:avLst/>
+              <a:gdLst>
+                <a:gd name="connsiteX0" fmla="*/ 0 w 226400"/>
+                <a:gd name="connsiteY0" fmla="*/ 32920 h 171466"/>
+                <a:gd name="connsiteX1" fmla="*/ 157018 w 226400"/>
+                <a:gd name="connsiteY1" fmla="*/ 5211 h 171466"/>
+                <a:gd name="connsiteX2" fmla="*/ 221673 w 226400"/>
+                <a:gd name="connsiteY2" fmla="*/ 125284 h 171466"/>
+                <a:gd name="connsiteX3" fmla="*/ 36945 w 226400"/>
+                <a:gd name="connsiteY3" fmla="*/ 171466 h 171466"/>
+              </a:gdLst>
+              <a:ahLst/>
+              <a:cxnLst>
+                <a:cxn ang="0">
+                  <a:pos x="connsiteX0" y="connsiteY0"/>
+                </a:cxn>
+                <a:cxn ang="0">
+                  <a:pos x="connsiteX1" y="connsiteY1"/>
+                </a:cxn>
+                <a:cxn ang="0">
+                  <a:pos x="connsiteX2" y="connsiteY2"/>
+                </a:cxn>
+                <a:cxn ang="0">
+                  <a:pos x="connsiteX3" y="connsiteY3"/>
+                </a:cxn>
+              </a:cxnLst>
+              <a:rect l="l" t="t" r="r" b="b"/>
+              <a:pathLst>
+                <a:path w="226400" h="171466">
+                  <a:moveTo>
+                    <a:pt x="0" y="32920"/>
+                  </a:moveTo>
+                  <a:cubicBezTo>
+                    <a:pt x="60036" y="11368"/>
+                    <a:pt x="120073" y="-10183"/>
+                    <a:pt x="157018" y="5211"/>
+                  </a:cubicBezTo>
+                  <a:cubicBezTo>
+                    <a:pt x="193963" y="20605"/>
+                    <a:pt x="241685" y="97575"/>
+                    <a:pt x="221673" y="125284"/>
+                  </a:cubicBezTo>
+                  <a:cubicBezTo>
+                    <a:pt x="201661" y="152993"/>
+                    <a:pt x="119303" y="162229"/>
+                    <a:pt x="36945" y="171466"/>
+                  </a:cubicBezTo>
+                </a:path>
+              </a:pathLst>
+            </a:custGeom>
+            <a:ln w="19050">
+              <a:solidFill>
+                <a:srgbClr val="00B050"/>
+              </a:solidFill>
+              <a:headEnd type="arrow" w="med" len="med"/>
+              <a:tailEnd type="none" w="med" len="med"/>
+            </a:ln>
+          </p:spPr>
+          <p:style>
+            <a:lnRef idx="1">
+              <a:schemeClr val="accent1"/>
+            </a:lnRef>
+            <a:fillRef idx="0">
+              <a:schemeClr val="accent1"/>
+            </a:fillRef>
+            <a:effectRef idx="0">
+              <a:schemeClr val="accent1"/>
+            </a:effectRef>
+            <a:fontRef idx="minor">
+              <a:schemeClr val="tx1"/>
+            </a:fontRef>
+          </p:style>
+          <p:txBody>
+            <a:bodyPr rtlCol="0" anchor="ctr"/>
+            <a:lstStyle/>
+            <a:p>
+              <a:pPr algn="ctr"/>
+              <a:endParaRPr lang="en-SG"/>
+            </a:p>
+          </p:txBody>
+        </p:sp>
+        <p:sp>
+          <p:nvSpPr>
+            <p:cNvPr id="56" name="Rectangle 55"/>
+            <p:cNvSpPr/>
+            <p:nvPr/>
+          </p:nvSpPr>
+          <p:spPr>
+            <a:xfrm>
+              <a:off x="1147403" y="5712513"/>
+              <a:ext cx="98080" cy="169591"/>
+            </a:xfrm>
+            <a:prstGeom prst="rect">
+              <a:avLst/>
+            </a:prstGeom>
+            <a:solidFill>
+              <a:srgbClr val="00B050"/>
+            </a:solidFill>
+            <a:ln>
+              <a:solidFill>
+                <a:schemeClr val="bg1"/>
+              </a:solidFill>
+            </a:ln>
+            <a:effectLst/>
+          </p:spPr>
+          <p:style>
+            <a:lnRef idx="1">
+              <a:schemeClr val="accent3"/>
+            </a:lnRef>
+            <a:fillRef idx="2">
+              <a:schemeClr val="accent3"/>
+            </a:fillRef>
+            <a:effectRef idx="1">
+              <a:schemeClr val="accent3"/>
+            </a:effectRef>
+            <a:fontRef idx="minor">
+              <a:schemeClr val="dk1"/>
+            </a:fontRef>
+          </p:style>
+          <p:txBody>
+            <a:bodyPr rtlCol="0" anchor="ctr"/>
+            <a:lstStyle/>
+            <a:p>
+              <a:pPr algn="ctr"/>
+              <a:endParaRPr lang="en-SG" sz="1400">
+                <a:solidFill>
+                  <a:schemeClr val="dk1"/>
+                </a:solidFill>
+              </a:endParaRPr>
+            </a:p>
+          </p:txBody>
+        </p:sp>
+      </p:grpSp>
+      <p:sp>
+        <p:nvSpPr>
+          <p:cNvPr id="57" name="TextBox 56"/>
+          <p:cNvSpPr txBox="1"/>
+          <p:nvPr/>
+        </p:nvSpPr>
+        <p:spPr>
+          <a:xfrm>
+            <a:off x="194562" y="5444571"/>
+            <a:ext cx="794081" cy="430887"/>
+          </a:xfrm>
+          <a:prstGeom prst="rect">
+            <a:avLst/>
+          </a:prstGeom>
+          <a:noFill/>
+        </p:spPr>
+        <p:txBody>
+          <a:bodyPr wrap="square" lIns="0" tIns="0" rIns="0" bIns="0" rtlCol="0">
+            <a:spAutoFit/>
+          </a:bodyPr>
+          <a:lstStyle/>
+          <a:p>
+            <a:pPr algn="r"/>
+            <a:r>
+              <a:rPr lang="en-US" sz="1400" dirty="0" smtClean="0">
+                <a:solidFill>
+                  <a:srgbClr val="00B050"/>
+                </a:solidFill>
+              </a:rPr>
+              <a:t>Update status bar</a:t>
+            </a:r>
+            <a:endParaRPr lang="en-US" sz="1400" dirty="0">
+              <a:solidFill>
+                <a:srgbClr val="00B050"/>
+              </a:solidFill>
+            </a:endParaRPr>
+          </a:p>
+        </p:txBody>
+      </p:sp>
+      <p:grpSp>
+        <p:nvGrpSpPr>
+          <p:cNvPr id="58" name="Group 57"/>
+          <p:cNvGrpSpPr/>
+          <p:nvPr/>
+        </p:nvGrpSpPr>
+        <p:grpSpPr>
+          <a:xfrm flipH="1">
+            <a:off x="7936842" y="5335662"/>
+            <a:ext cx="217349" cy="270072"/>
+            <a:chOff x="1028134" y="5612032"/>
+            <a:chExt cx="217349" cy="270072"/>
+          </a:xfrm>
+        </p:grpSpPr>
+        <p:sp>
+          <p:nvSpPr>
+            <p:cNvPr id="59" name="Freeform 58"/>
+            <p:cNvSpPr/>
+            <p:nvPr/>
+          </p:nvSpPr>
+          <p:spPr>
+            <a:xfrm rot="2600998" flipH="1" flipV="1">
+              <a:off x="1028134" y="5612032"/>
+              <a:ext cx="167452" cy="116880"/>
+            </a:xfrm>
+            <a:custGeom>
+              <a:avLst/>
+              <a:gdLst>
+                <a:gd name="connsiteX0" fmla="*/ 0 w 226400"/>
+                <a:gd name="connsiteY0" fmla="*/ 32920 h 171466"/>
+                <a:gd name="connsiteX1" fmla="*/ 157018 w 226400"/>
+                <a:gd name="connsiteY1" fmla="*/ 5211 h 171466"/>
+                <a:gd name="connsiteX2" fmla="*/ 221673 w 226400"/>
+                <a:gd name="connsiteY2" fmla="*/ 125284 h 171466"/>
+                <a:gd name="connsiteX3" fmla="*/ 36945 w 226400"/>
+                <a:gd name="connsiteY3" fmla="*/ 171466 h 171466"/>
+              </a:gdLst>
+              <a:ahLst/>
+              <a:cxnLst>
+                <a:cxn ang="0">
+                  <a:pos x="connsiteX0" y="connsiteY0"/>
+                </a:cxn>
+                <a:cxn ang="0">
+                  <a:pos x="connsiteX1" y="connsiteY1"/>
+                </a:cxn>
+                <a:cxn ang="0">
+                  <a:pos x="connsiteX2" y="connsiteY2"/>
+                </a:cxn>
+                <a:cxn ang="0">
+                  <a:pos x="connsiteX3" y="connsiteY3"/>
+                </a:cxn>
+              </a:cxnLst>
+              <a:rect l="l" t="t" r="r" b="b"/>
+              <a:pathLst>
+                <a:path w="226400" h="171466">
+                  <a:moveTo>
+                    <a:pt x="0" y="32920"/>
+                  </a:moveTo>
+                  <a:cubicBezTo>
+                    <a:pt x="60036" y="11368"/>
+                    <a:pt x="120073" y="-10183"/>
+                    <a:pt x="157018" y="5211"/>
+                  </a:cubicBezTo>
+                  <a:cubicBezTo>
+                    <a:pt x="193963" y="20605"/>
+                    <a:pt x="241685" y="97575"/>
+                    <a:pt x="221673" y="125284"/>
+                  </a:cubicBezTo>
+                  <a:cubicBezTo>
+                    <a:pt x="201661" y="152993"/>
+                    <a:pt x="119303" y="162229"/>
+                    <a:pt x="36945" y="171466"/>
+                  </a:cubicBezTo>
+                </a:path>
+              </a:pathLst>
+            </a:custGeom>
+            <a:ln w="19050">
+              <a:solidFill>
+                <a:schemeClr val="accent6">
+                  <a:lumMod val="75000"/>
+                </a:schemeClr>
+              </a:solidFill>
+              <a:headEnd type="arrow" w="med" len="med"/>
+              <a:tailEnd type="none" w="med" len="med"/>
+            </a:ln>
+          </p:spPr>
+          <p:style>
+            <a:lnRef idx="1">
+              <a:schemeClr val="accent1"/>
+            </a:lnRef>
+            <a:fillRef idx="0">
+              <a:schemeClr val="accent1"/>
+            </a:fillRef>
+            <a:effectRef idx="0">
+              <a:schemeClr val="accent1"/>
+            </a:effectRef>
+            <a:fontRef idx="minor">
+              <a:schemeClr val="tx1"/>
+            </a:fontRef>
+          </p:style>
+          <p:txBody>
+            <a:bodyPr rtlCol="0" anchor="ctr"/>
+            <a:lstStyle/>
+            <a:p>
+              <a:pPr algn="ctr"/>
+              <a:endParaRPr lang="en-SG"/>
+            </a:p>
+          </p:txBody>
+        </p:sp>
+        <p:sp>
+          <p:nvSpPr>
+            <p:cNvPr id="60" name="Rectangle 59"/>
+            <p:cNvSpPr/>
+            <p:nvPr/>
+          </p:nvSpPr>
+          <p:spPr>
+            <a:xfrm>
+              <a:off x="1147403" y="5712513"/>
+              <a:ext cx="98080" cy="169591"/>
+            </a:xfrm>
+            <a:prstGeom prst="rect">
+              <a:avLst/>
+            </a:prstGeom>
+            <a:solidFill>
+              <a:schemeClr val="accent6">
+                <a:lumMod val="75000"/>
+              </a:schemeClr>
+            </a:solidFill>
+            <a:ln>
+              <a:solidFill>
+                <a:schemeClr val="bg1"/>
+              </a:solidFill>
+            </a:ln>
+            <a:effectLst/>
+          </p:spPr>
+          <p:style>
+            <a:lnRef idx="1">
+              <a:schemeClr val="accent3"/>
+            </a:lnRef>
+            <a:fillRef idx="2">
+              <a:schemeClr val="accent3"/>
+            </a:fillRef>
+            <a:effectRef idx="1">
+              <a:schemeClr val="accent3"/>
+            </a:effectRef>
+            <a:fontRef idx="minor">
+              <a:schemeClr val="dk1"/>
+            </a:fontRef>
+          </p:style>
+          <p:txBody>
+            <a:bodyPr rtlCol="0" anchor="ctr"/>
+            <a:lstStyle/>
+            <a:p>
+              <a:pPr algn="ctr"/>
+              <a:endParaRPr lang="en-SG" sz="1400">
+                <a:solidFill>
+                  <a:schemeClr val="dk1"/>
+                </a:solidFill>
+              </a:endParaRPr>
+            </a:p>
+          </p:txBody>
+        </p:sp>
+      </p:grpSp>
+      <p:sp>
+        <p:nvSpPr>
+          <p:cNvPr id="61" name="TextBox 60"/>
+          <p:cNvSpPr txBox="1"/>
+          <p:nvPr/>
+        </p:nvSpPr>
+        <p:spPr>
+          <a:xfrm>
+            <a:off x="8223953" y="5180992"/>
+            <a:ext cx="539047" cy="430887"/>
+          </a:xfrm>
+          <a:prstGeom prst="rect">
+            <a:avLst/>
+          </a:prstGeom>
+          <a:noFill/>
+        </p:spPr>
+        <p:txBody>
+          <a:bodyPr wrap="square" lIns="0" tIns="0" rIns="0" bIns="0" rtlCol="0">
+            <a:spAutoFit/>
+          </a:bodyPr>
+          <a:lstStyle/>
+          <a:p>
+            <a:r>
+              <a:rPr lang="en-US" sz="1400" dirty="0" smtClean="0">
+                <a:solidFill>
+                  <a:schemeClr val="accent6">
+                    <a:lumMod val="75000"/>
+                  </a:schemeClr>
+                </a:solidFill>
+              </a:rPr>
+              <a:t>Save </a:t>
+            </a:r>
+            <a:br>
+              <a:rPr lang="en-US" sz="1400" dirty="0" smtClean="0">
+                <a:solidFill>
+                  <a:schemeClr val="accent6">
+                    <a:lumMod val="75000"/>
+                  </a:schemeClr>
+                </a:solidFill>
+              </a:rPr>
+            </a:br>
+            <a:r>
+              <a:rPr lang="en-US" sz="1400" dirty="0" smtClean="0">
+                <a:solidFill>
+                  <a:schemeClr val="accent6">
+                    <a:lumMod val="75000"/>
+                  </a:schemeClr>
+                </a:solidFill>
+              </a:rPr>
+              <a:t>to file</a:t>
+            </a:r>
+            <a:endParaRPr lang="en-US" sz="1400" dirty="0">
+              <a:solidFill>
+                <a:schemeClr val="accent6">
+                  <a:lumMod val="75000"/>
+                </a:schemeClr>
+              </a:solidFill>
+            </a:endParaRPr>
+          </a:p>
+        </p:txBody>
+      </p:sp>
+      <p:sp>
+        <p:nvSpPr>
+          <p:cNvPr id="64" name="Rectangle 62"/>
+          <p:cNvSpPr/>
+          <p:nvPr/>
+        </p:nvSpPr>
+        <p:spPr>
+          <a:xfrm>
+            <a:off x="7540505" y="612190"/>
+            <a:ext cx="1093635" cy="346760"/>
+          </a:xfrm>
+          <a:prstGeom prst="rect">
+            <a:avLst/>
+          </a:prstGeom>
+          <a:solidFill>
+            <a:schemeClr val="accent6">
+              <a:lumMod val="75000"/>
+            </a:schemeClr>
+          </a:solidFill>
+          <a:ln w="19050">
+            <a:solidFill>
+              <a:schemeClr val="accent6">
+                <a:lumMod val="75000"/>
+              </a:schemeClr>
+            </a:solidFill>
+          </a:ln>
+          <a:effectLst/>
+        </p:spPr>
+        <p:style>
+          <a:lnRef idx="1">
+            <a:schemeClr val="accent2"/>
+          </a:lnRef>
+          <a:fillRef idx="2">
+            <a:schemeClr val="accent2"/>
+          </a:fillRef>
+          <a:effectRef idx="1">
+            <a:schemeClr val="accent2"/>
+          </a:effectRef>
+          <a:fontRef idx="minor">
+            <a:schemeClr val="dk1"/>
+          </a:fontRef>
+        </p:style>
+        <p:txBody>
+          <a:bodyPr rtlCol="0" anchor="ctr"/>
+          <a:lstStyle/>
+          <a:p>
+            <a:pPr algn="ctr"/>
+            <a:r>
+              <a:rPr lang="en-US" sz="1600" dirty="0" smtClean="0">
+                <a:solidFill>
+                  <a:schemeClr val="bg1"/>
+                </a:solidFill>
+              </a:rPr>
+              <a:t>:Storage</a:t>
+            </a:r>
+            <a:endParaRPr lang="en-SG" sz="1600" dirty="0">
+              <a:solidFill>
+                <a:schemeClr val="bg1"/>
+              </a:solidFill>
+            </a:endParaRPr>
+          </a:p>
+        </p:txBody>
+      </p:sp>
+      <p:cxnSp>
+        <p:nvCxnSpPr>
+          <p:cNvPr id="65" name="Straight Connector 64"/>
+          <p:cNvCxnSpPr/>
+          <p:nvPr/>
+        </p:nvCxnSpPr>
+        <p:spPr>
+          <a:xfrm flipH="1">
+            <a:off x="8034922" y="975861"/>
+            <a:ext cx="36000" cy="2224539"/>
+          </a:xfrm>
+          <a:prstGeom prst="line">
+            <a:avLst/>
+          </a:prstGeom>
+          <a:ln w="19050">
+            <a:solidFill>
+              <a:schemeClr val="accent6">
+                <a:lumMod val="75000"/>
+              </a:schemeClr>
+            </a:solidFill>
+            <a:prstDash val="sysDash"/>
+          </a:ln>
+          <a:effectLst/>
+        </p:spPr>
+        <p:style>
+          <a:lnRef idx="1">
+            <a:schemeClr val="accent1"/>
+          </a:lnRef>
+          <a:fillRef idx="2">
+            <a:schemeClr val="accent1"/>
+          </a:fillRef>
+          <a:effectRef idx="1">
+            <a:schemeClr val="accent1"/>
+          </a:effectRef>
+          <a:fontRef idx="minor">
+            <a:schemeClr val="dk1"/>
+          </a:fontRef>
+        </p:style>
+      </p:cxnSp>
+      <p:sp>
+        <p:nvSpPr>
+          <p:cNvPr id="71" name="Rectangle 70"/>
+          <p:cNvSpPr/>
+          <p:nvPr/>
+        </p:nvSpPr>
+        <p:spPr>
+          <a:xfrm>
+            <a:off x="8001000" y="2212070"/>
+            <a:ext cx="124478" cy="287409"/>
+          </a:xfrm>
+          <a:prstGeom prst="rect">
+            <a:avLst/>
+          </a:prstGeom>
+          <a:solidFill>
+            <a:schemeClr val="accent6">
+              <a:lumMod val="75000"/>
+            </a:schemeClr>
+          </a:solidFill>
+          <a:ln>
+            <a:solidFill>
+              <a:schemeClr val="accent6">
+                <a:lumMod val="75000"/>
+              </a:schemeClr>
+            </a:solidFill>
+          </a:ln>
+          <a:effectLst/>
+        </p:spPr>
+        <p:style>
+          <a:lnRef idx="1">
+            <a:schemeClr val="accent3"/>
+          </a:lnRef>
+          <a:fillRef idx="2">
+            <a:schemeClr val="accent3"/>
+          </a:fillRef>
+          <a:effectRef idx="1">
+            <a:schemeClr val="accent3"/>
+          </a:effectRef>
+          <a:fontRef idx="minor">
+            <a:schemeClr val="dk1"/>
+          </a:fontRef>
+        </p:style>
+        <p:txBody>
+          <a:bodyPr rtlCol="0" anchor="ctr"/>
+          <a:lstStyle/>
+          <a:p>
+            <a:pPr algn="ctr"/>
+            <a:endParaRPr lang="en-SG" sz="1400">
+              <a:solidFill>
+                <a:schemeClr val="dk1"/>
+              </a:solidFill>
+            </a:endParaRPr>
+          </a:p>
+        </p:txBody>
+      </p:sp>
+      <p:grpSp>
+        <p:nvGrpSpPr>
+          <p:cNvPr id="73" name="Group 72"/>
+          <p:cNvGrpSpPr/>
+          <p:nvPr/>
+        </p:nvGrpSpPr>
+        <p:grpSpPr>
+          <a:xfrm flipH="1">
+            <a:off x="8092855" y="2212070"/>
+            <a:ext cx="217349" cy="270072"/>
+            <a:chOff x="1028134" y="5612032"/>
+            <a:chExt cx="217349" cy="270072"/>
+          </a:xfrm>
+        </p:grpSpPr>
+        <p:sp>
+          <p:nvSpPr>
+            <p:cNvPr id="75" name="Freeform 74"/>
+            <p:cNvSpPr/>
+            <p:nvPr/>
+          </p:nvSpPr>
+          <p:spPr>
+            <a:xfrm rot="2600998" flipH="1" flipV="1">
+              <a:off x="1028134" y="5612032"/>
+              <a:ext cx="167452" cy="116880"/>
+            </a:xfrm>
+            <a:custGeom>
+              <a:avLst/>
+              <a:gdLst>
+                <a:gd name="connsiteX0" fmla="*/ 0 w 226400"/>
+                <a:gd name="connsiteY0" fmla="*/ 32920 h 171466"/>
+                <a:gd name="connsiteX1" fmla="*/ 157018 w 226400"/>
+                <a:gd name="connsiteY1" fmla="*/ 5211 h 171466"/>
+                <a:gd name="connsiteX2" fmla="*/ 221673 w 226400"/>
+                <a:gd name="connsiteY2" fmla="*/ 125284 h 171466"/>
+                <a:gd name="connsiteX3" fmla="*/ 36945 w 226400"/>
+                <a:gd name="connsiteY3" fmla="*/ 171466 h 171466"/>
+              </a:gdLst>
+              <a:ahLst/>
+              <a:cxnLst>
+                <a:cxn ang="0">
+                  <a:pos x="connsiteX0" y="connsiteY0"/>
+                </a:cxn>
+                <a:cxn ang="0">
+                  <a:pos x="connsiteX1" y="connsiteY1"/>
+                </a:cxn>
+                <a:cxn ang="0">
+                  <a:pos x="connsiteX2" y="connsiteY2"/>
+                </a:cxn>
+                <a:cxn ang="0">
+                  <a:pos x="connsiteX3" y="connsiteY3"/>
+                </a:cxn>
+              </a:cxnLst>
+              <a:rect l="l" t="t" r="r" b="b"/>
+              <a:pathLst>
+                <a:path w="226400" h="171466">
+                  <a:moveTo>
+                    <a:pt x="0" y="32920"/>
+                  </a:moveTo>
+                  <a:cubicBezTo>
+                    <a:pt x="60036" y="11368"/>
+                    <a:pt x="120073" y="-10183"/>
+                    <a:pt x="157018" y="5211"/>
+                  </a:cubicBezTo>
+                  <a:cubicBezTo>
+                    <a:pt x="193963" y="20605"/>
+                    <a:pt x="241685" y="97575"/>
+                    <a:pt x="221673" y="125284"/>
+                  </a:cubicBezTo>
+                  <a:cubicBezTo>
+                    <a:pt x="201661" y="152993"/>
+                    <a:pt x="119303" y="162229"/>
+                    <a:pt x="36945" y="171466"/>
+                  </a:cubicBezTo>
+                </a:path>
+              </a:pathLst>
+            </a:custGeom>
+            <a:ln w="19050">
+              <a:solidFill>
+                <a:schemeClr val="accent6">
+                  <a:lumMod val="75000"/>
+                </a:schemeClr>
+              </a:solidFill>
+              <a:headEnd type="arrow" w="med" len="med"/>
+              <a:tailEnd type="none" w="med" len="med"/>
+            </a:ln>
+          </p:spPr>
+          <p:style>
+            <a:lnRef idx="1">
+              <a:schemeClr val="accent1"/>
+            </a:lnRef>
+            <a:fillRef idx="0">
+              <a:schemeClr val="accent1"/>
+            </a:fillRef>
+            <a:effectRef idx="0">
+              <a:schemeClr val="accent1"/>
+            </a:effectRef>
+            <a:fontRef idx="minor">
+              <a:schemeClr val="tx1"/>
+            </a:fontRef>
+          </p:style>
+          <p:txBody>
+            <a:bodyPr rtlCol="0" anchor="ctr"/>
+            <a:lstStyle/>
+            <a:p>
+              <a:pPr algn="ctr"/>
+              <a:endParaRPr lang="en-SG"/>
+            </a:p>
+          </p:txBody>
+        </p:sp>
+        <p:sp>
+          <p:nvSpPr>
+            <p:cNvPr id="76" name="Rectangle 75"/>
+            <p:cNvSpPr/>
+            <p:nvPr/>
+          </p:nvSpPr>
+          <p:spPr>
+            <a:xfrm>
+              <a:off x="1147403" y="5712513"/>
+              <a:ext cx="98080" cy="169591"/>
+            </a:xfrm>
+            <a:prstGeom prst="rect">
+              <a:avLst/>
+            </a:prstGeom>
+            <a:solidFill>
+              <a:schemeClr val="accent6">
+                <a:lumMod val="75000"/>
+              </a:schemeClr>
+            </a:solidFill>
+            <a:ln>
+              <a:solidFill>
+                <a:schemeClr val="bg1"/>
+              </a:solidFill>
+            </a:ln>
+            <a:effectLst/>
+          </p:spPr>
+          <p:style>
+            <a:lnRef idx="1">
+              <a:schemeClr val="accent3"/>
+            </a:lnRef>
+            <a:fillRef idx="2">
+              <a:schemeClr val="accent3"/>
+            </a:fillRef>
+            <a:effectRef idx="1">
+              <a:schemeClr val="accent3"/>
+            </a:effectRef>
+            <a:fontRef idx="minor">
+              <a:schemeClr val="dk1"/>
+            </a:fontRef>
+          </p:style>
+          <p:txBody>
+            <a:bodyPr rtlCol="0" anchor="ctr"/>
+            <a:lstStyle/>
+            <a:p>
+              <a:pPr algn="ctr"/>
+              <a:endParaRPr lang="en-SG" sz="1400">
+                <a:solidFill>
+                  <a:schemeClr val="dk1"/>
+                </a:solidFill>
+              </a:endParaRPr>
+            </a:p>
+          </p:txBody>
+        </p:sp>
+      </p:grpSp>
+      <p:sp>
+        <p:nvSpPr>
+          <p:cNvPr id="77" name="TextBox 76"/>
+          <p:cNvSpPr txBox="1"/>
+          <p:nvPr/>
+        </p:nvSpPr>
+        <p:spPr>
+          <a:xfrm>
+            <a:off x="8379966" y="2057400"/>
+            <a:ext cx="539047" cy="430887"/>
+          </a:xfrm>
+          <a:prstGeom prst="rect">
+            <a:avLst/>
+          </a:prstGeom>
+          <a:noFill/>
+        </p:spPr>
+        <p:txBody>
+          <a:bodyPr wrap="square" lIns="0" tIns="0" rIns="0" bIns="0" rtlCol="0">
+            <a:spAutoFit/>
+          </a:bodyPr>
+          <a:lstStyle/>
+          <a:p>
+            <a:r>
+              <a:rPr lang="en-US" sz="1400" dirty="0" smtClean="0">
+                <a:solidFill>
+                  <a:schemeClr val="accent6">
+                    <a:lumMod val="75000"/>
+                  </a:schemeClr>
+                </a:solidFill>
+              </a:rPr>
+              <a:t>Save </a:t>
+            </a:r>
+            <a:br>
+              <a:rPr lang="en-US" sz="1400" dirty="0" smtClean="0">
+                <a:solidFill>
+                  <a:schemeClr val="accent6">
+                    <a:lumMod val="75000"/>
+                  </a:schemeClr>
+                </a:solidFill>
+              </a:rPr>
+            </a:br>
+            <a:r>
+              <a:rPr lang="en-US" sz="1400" dirty="0" smtClean="0">
+                <a:solidFill>
+                  <a:schemeClr val="accent6">
+                    <a:lumMod val="75000"/>
+                  </a:schemeClr>
+                </a:solidFill>
+              </a:rPr>
+              <a:t>to file</a:t>
+            </a:r>
+            <a:endParaRPr lang="en-US" sz="1400" dirty="0">
+              <a:solidFill>
+                <a:schemeClr val="accent6">
+                  <a:lumMod val="75000"/>
+                </a:schemeClr>
+              </a:solidFill>
+            </a:endParaRPr>
+          </a:p>
+        </p:txBody>
+      </p:sp>
+      <p:cxnSp>
+        <p:nvCxnSpPr>
+          <p:cNvPr id="78" name="Straight Arrow Connector 77"/>
+          <p:cNvCxnSpPr/>
+          <p:nvPr/>
+        </p:nvCxnSpPr>
+        <p:spPr>
+          <a:xfrm flipV="1">
+            <a:off x="3976414" y="2209800"/>
+            <a:ext cx="4058508" cy="2270"/>
+          </a:xfrm>
+          <a:prstGeom prst="straightConnector1">
+            <a:avLst/>
+          </a:prstGeom>
+          <a:ln w="19050">
+            <a:solidFill>
+              <a:srgbClr val="0070C0"/>
+            </a:solidFill>
+            <a:tailEnd type="arrow"/>
+          </a:ln>
+        </p:spPr>
+        <p:style>
+          <a:lnRef idx="1">
+            <a:schemeClr val="accent1"/>
+          </a:lnRef>
+          <a:fillRef idx="0">
+            <a:schemeClr val="accent1"/>
+          </a:fillRef>
+          <a:effectRef idx="0">
+            <a:schemeClr val="accent1"/>
+          </a:effectRef>
+          <a:fontRef idx="minor">
+            <a:schemeClr val="tx1"/>
+          </a:fontRef>
+        </p:style>
+      </p:cxnSp>
+      <p:cxnSp>
+        <p:nvCxnSpPr>
+          <p:cNvPr id="79" name="Straight Arrow Connector 78"/>
+          <p:cNvCxnSpPr/>
+          <p:nvPr/>
+        </p:nvCxnSpPr>
+        <p:spPr>
+          <a:xfrm flipH="1" flipV="1">
+            <a:off x="3976414" y="2482142"/>
+            <a:ext cx="4058510" cy="17337"/>
+          </a:xfrm>
+          <a:prstGeom prst="straightConnector1">
+            <a:avLst/>
+          </a:prstGeom>
+          <a:ln w="19050">
+            <a:solidFill>
+              <a:schemeClr val="accent6">
+                <a:lumMod val="75000"/>
+              </a:schemeClr>
+            </a:solidFill>
+            <a:prstDash val="sysDash"/>
+            <a:headEnd type="none" w="med" len="med"/>
+            <a:tailEnd type="arrow" w="med" len="med"/>
+          </a:ln>
+        </p:spPr>
+        <p:style>
+          <a:lnRef idx="1">
+            <a:schemeClr val="accent1"/>
+          </a:lnRef>
+          <a:fillRef idx="0">
+            <a:schemeClr val="accent1"/>
+          </a:fillRef>
+          <a:effectRef idx="0">
+            <a:schemeClr val="accent1"/>
+          </a:effectRef>
+          <a:fontRef idx="minor">
+            <a:schemeClr val="tx1"/>
+          </a:fontRef>
+        </p:style>
+      </p:cxnSp>
+      <p:sp>
+        <p:nvSpPr>
+          <p:cNvPr id="80" name="TextBox 79"/>
+          <p:cNvSpPr txBox="1"/>
+          <p:nvPr/>
+        </p:nvSpPr>
+        <p:spPr>
+          <a:xfrm>
+            <a:off x="6050184" y="2207806"/>
+            <a:ext cx="1490321" cy="214677"/>
+          </a:xfrm>
+          <a:prstGeom prst="rect">
+            <a:avLst/>
+          </a:prstGeom>
+          <a:noFill/>
+        </p:spPr>
+        <p:txBody>
+          <a:bodyPr wrap="square" lIns="0" tIns="0" rIns="0" bIns="0" rtlCol="0">
+            <a:spAutoFit/>
+          </a:bodyPr>
+          <a:lstStyle/>
+          <a:p>
+            <a:r>
+              <a:rPr lang="en-US" sz="1400" dirty="0" smtClean="0">
+                <a:solidFill>
+                  <a:schemeClr val="accent6">
+                    <a:lumMod val="75000"/>
+                  </a:schemeClr>
+                </a:solidFill>
+              </a:rPr>
+              <a:t>saveTables(tables)</a:t>
+            </a:r>
+            <a:endParaRPr lang="en-US" sz="1400" dirty="0">
+              <a:solidFill>
+                <a:schemeClr val="accent6">
+                  <a:lumMod val="75000"/>
+                </a:schemeClr>
+              </a:solidFill>
+            </a:endParaRPr>
+          </a:p>
+        </p:txBody>
+      </p:sp>
+    </p:spTree>
+    <p:extLst>
+      <p:ext uri="{BB962C8B-B14F-4D97-AF65-F5344CB8AC3E}">
+        <p14:creationId xmlns:p14="http://schemas.microsoft.com/office/powerpoint/2010/main" val="886177191"/>
       </p:ext>
     </p:extLst>
   </p:cSld>

</xml_diff>

<commit_message>
Updated DG diagrams and added intro for overall DG, and sections 1 and 2
</commit_message>
<xml_diff>
--- a/docs/diagrams/HighLevelSequenceDiagrams.pptx
+++ b/docs/diagrams/HighLevelSequenceDiagrams.pptx
@@ -208,7 +208,7 @@
           <a:p>
             <a:fld id="{F5CC4B3F-88C1-4FFA-B1B6-F41C21DC6924}" type="datetimeFigureOut">
               <a:rPr lang="en-US" smtClean="0"/>
-              <a:t>22-Mar-19</a:t>
+              <a:t>02-Apr-19</a:t>
             </a:fld>
             <a:endParaRPr lang="en-US"/>
           </a:p>
@@ -654,7 +654,7 @@
           <a:p>
             <a:fld id="{78C97017-6FC3-485B-9764-EAC9E56C1D49}" type="datetimeFigureOut">
               <a:rPr lang="en-US" smtClean="0"/>
-              <a:t>22-Mar-19</a:t>
+              <a:t>02-Apr-19</a:t>
             </a:fld>
             <a:endParaRPr lang="en-US"/>
           </a:p>
@@ -822,7 +822,7 @@
           <a:p>
             <a:fld id="{78C97017-6FC3-485B-9764-EAC9E56C1D49}" type="datetimeFigureOut">
               <a:rPr lang="en-US" smtClean="0"/>
-              <a:t>22-Mar-19</a:t>
+              <a:t>02-Apr-19</a:t>
             </a:fld>
             <a:endParaRPr lang="en-US"/>
           </a:p>
@@ -1000,7 +1000,7 @@
           <a:p>
             <a:fld id="{78C97017-6FC3-485B-9764-EAC9E56C1D49}" type="datetimeFigureOut">
               <a:rPr lang="en-US" smtClean="0"/>
-              <a:t>22-Mar-19</a:t>
+              <a:t>02-Apr-19</a:t>
             </a:fld>
             <a:endParaRPr lang="en-US"/>
           </a:p>
@@ -1168,7 +1168,7 @@
           <a:p>
             <a:fld id="{78C97017-6FC3-485B-9764-EAC9E56C1D49}" type="datetimeFigureOut">
               <a:rPr lang="en-US" smtClean="0"/>
-              <a:t>22-Mar-19</a:t>
+              <a:t>02-Apr-19</a:t>
             </a:fld>
             <a:endParaRPr lang="en-US"/>
           </a:p>
@@ -1413,7 +1413,7 @@
           <a:p>
             <a:fld id="{78C97017-6FC3-485B-9764-EAC9E56C1D49}" type="datetimeFigureOut">
               <a:rPr lang="en-US" smtClean="0"/>
-              <a:t>22-Mar-19</a:t>
+              <a:t>02-Apr-19</a:t>
             </a:fld>
             <a:endParaRPr lang="en-US"/>
           </a:p>
@@ -1698,7 +1698,7 @@
           <a:p>
             <a:fld id="{78C97017-6FC3-485B-9764-EAC9E56C1D49}" type="datetimeFigureOut">
               <a:rPr lang="en-US" smtClean="0"/>
-              <a:t>22-Mar-19</a:t>
+              <a:t>02-Apr-19</a:t>
             </a:fld>
             <a:endParaRPr lang="en-US"/>
           </a:p>
@@ -2117,7 +2117,7 @@
           <a:p>
             <a:fld id="{78C97017-6FC3-485B-9764-EAC9E56C1D49}" type="datetimeFigureOut">
               <a:rPr lang="en-US" smtClean="0"/>
-              <a:t>22-Mar-19</a:t>
+              <a:t>02-Apr-19</a:t>
             </a:fld>
             <a:endParaRPr lang="en-US"/>
           </a:p>
@@ -2234,7 +2234,7 @@
           <a:p>
             <a:fld id="{78C97017-6FC3-485B-9764-EAC9E56C1D49}" type="datetimeFigureOut">
               <a:rPr lang="en-US" smtClean="0"/>
-              <a:t>22-Mar-19</a:t>
+              <a:t>02-Apr-19</a:t>
             </a:fld>
             <a:endParaRPr lang="en-US"/>
           </a:p>
@@ -2329,7 +2329,7 @@
           <a:p>
             <a:fld id="{78C97017-6FC3-485B-9764-EAC9E56C1D49}" type="datetimeFigureOut">
               <a:rPr lang="en-US" smtClean="0"/>
-              <a:t>22-Mar-19</a:t>
+              <a:t>02-Apr-19</a:t>
             </a:fld>
             <a:endParaRPr lang="en-US"/>
           </a:p>
@@ -2604,7 +2604,7 @@
           <a:p>
             <a:fld id="{78C97017-6FC3-485B-9764-EAC9E56C1D49}" type="datetimeFigureOut">
               <a:rPr lang="en-US" smtClean="0"/>
-              <a:t>22-Mar-19</a:t>
+              <a:t>02-Apr-19</a:t>
             </a:fld>
             <a:endParaRPr lang="en-US"/>
           </a:p>
@@ -2856,7 +2856,7 @@
           <a:p>
             <a:fld id="{78C97017-6FC3-485B-9764-EAC9E56C1D49}" type="datetimeFigureOut">
               <a:rPr lang="en-US" smtClean="0"/>
-              <a:t>22-Mar-19</a:t>
+              <a:t>02-Apr-19</a:t>
             </a:fld>
             <a:endParaRPr lang="en-US"/>
           </a:p>
@@ -3067,7 +3067,7 @@
           <a:p>
             <a:fld id="{78C97017-6FC3-485B-9764-EAC9E56C1D49}" type="datetimeFigureOut">
               <a:rPr lang="en-US" smtClean="0"/>
-              <a:t>22-Mar-19</a:t>
+              <a:t>02-Apr-19</a:t>
             </a:fld>
             <a:endParaRPr lang="en-US"/>
           </a:p>
@@ -3450,7 +3450,7 @@
         </p:nvSpPr>
         <p:spPr>
           <a:xfrm>
-            <a:off x="1111860" y="607926"/>
+            <a:off x="1111860" y="1186183"/>
             <a:ext cx="1093635" cy="346760"/>
           </a:xfrm>
           <a:prstGeom prst="rect">
@@ -3509,7 +3509,7 @@
         </p:nvCxnSpPr>
         <p:spPr>
           <a:xfrm>
-            <a:off x="1658677" y="971597"/>
+            <a:off x="1658677" y="1549854"/>
             <a:ext cx="0" cy="1723059"/>
           </a:xfrm>
           <a:prstGeom prst="line">
@@ -3546,7 +3546,7 @@
         </p:nvSpPr>
         <p:spPr>
           <a:xfrm>
-            <a:off x="1586669" y="1322292"/>
+            <a:off x="1586669" y="1900549"/>
             <a:ext cx="152400" cy="1019910"/>
           </a:xfrm>
           <a:prstGeom prst="rect">
@@ -3597,7 +3597,7 @@
         </p:nvGrpSpPr>
         <p:grpSpPr>
           <a:xfrm>
-            <a:off x="152400" y="533400"/>
+            <a:off x="152400" y="1111657"/>
             <a:ext cx="324036" cy="573410"/>
             <a:chOff x="3239901" y="4149080"/>
             <a:chExt cx="648072" cy="1146820"/>
@@ -3814,7 +3814,7 @@
         </p:nvSpPr>
         <p:spPr>
           <a:xfrm>
-            <a:off x="3335583" y="611613"/>
+            <a:off x="3335583" y="1189870"/>
             <a:ext cx="1093635" cy="346760"/>
           </a:xfrm>
           <a:prstGeom prst="rect">
@@ -3873,7 +3873,7 @@
         </p:nvCxnSpPr>
         <p:spPr>
           <a:xfrm>
-            <a:off x="3882400" y="975284"/>
+            <a:off x="3882400" y="1553541"/>
             <a:ext cx="0" cy="1723059"/>
           </a:xfrm>
           <a:prstGeom prst="line">
@@ -3910,7 +3910,7 @@
         </p:nvSpPr>
         <p:spPr>
           <a:xfrm>
-            <a:off x="3810392" y="1433477"/>
+            <a:off x="3810392" y="2011734"/>
             <a:ext cx="144016" cy="832525"/>
           </a:xfrm>
           <a:prstGeom prst="rect">
@@ -3961,7 +3961,7 @@
         </p:nvSpPr>
         <p:spPr>
           <a:xfrm>
-            <a:off x="5316783" y="607926"/>
+            <a:off x="5316783" y="1186183"/>
             <a:ext cx="1093635" cy="346760"/>
           </a:xfrm>
           <a:prstGeom prst="rect">
@@ -4020,7 +4020,7 @@
         </p:nvCxnSpPr>
         <p:spPr>
           <a:xfrm>
-            <a:off x="5863600" y="971597"/>
+            <a:off x="5863600" y="1549854"/>
             <a:ext cx="0" cy="1723059"/>
           </a:xfrm>
           <a:prstGeom prst="line">
@@ -4057,7 +4057,7 @@
         </p:nvSpPr>
         <p:spPr>
           <a:xfrm>
-            <a:off x="5791592" y="1538408"/>
+            <a:off x="5791592" y="2116665"/>
             <a:ext cx="142006" cy="651394"/>
           </a:xfrm>
           <a:prstGeom prst="rect">
@@ -4108,7 +4108,7 @@
         </p:nvCxnSpPr>
         <p:spPr>
           <a:xfrm>
-            <a:off x="466818" y="1325979"/>
+            <a:off x="466818" y="1904236"/>
             <a:ext cx="1119851" cy="0"/>
           </a:xfrm>
           <a:prstGeom prst="straightConnector1">
@@ -4144,7 +4144,7 @@
         </p:nvSpPr>
         <p:spPr>
           <a:xfrm>
-            <a:off x="466818" y="1345880"/>
+            <a:off x="466818" y="1924137"/>
             <a:ext cx="860170" cy="215444"/>
           </a:xfrm>
           <a:prstGeom prst="rect">
@@ -4173,7 +4173,7 @@
         </p:nvCxnSpPr>
         <p:spPr>
           <a:xfrm>
-            <a:off x="1739069" y="1433478"/>
+            <a:off x="1739069" y="2011735"/>
             <a:ext cx="2071323" cy="0"/>
           </a:xfrm>
           <a:prstGeom prst="straightConnector1">
@@ -4209,7 +4209,7 @@
         </p:nvSpPr>
         <p:spPr>
           <a:xfrm>
-            <a:off x="2166172" y="1453379"/>
+            <a:off x="2166172" y="2031636"/>
             <a:ext cx="1424846" cy="215444"/>
           </a:xfrm>
           <a:prstGeom prst="rect">
@@ -4242,7 +4242,7 @@
         </p:nvCxnSpPr>
         <p:spPr>
           <a:xfrm>
-            <a:off x="3954408" y="1538409"/>
+            <a:off x="3954408" y="2116666"/>
             <a:ext cx="1837184" cy="0"/>
           </a:xfrm>
           <a:prstGeom prst="straightConnector1">
@@ -4278,7 +4278,7 @@
         </p:nvSpPr>
         <p:spPr>
           <a:xfrm>
-            <a:off x="4299772" y="1542583"/>
+            <a:off x="4299772" y="2120840"/>
             <a:ext cx="1424846" cy="215444"/>
           </a:xfrm>
           <a:prstGeom prst="rect">
@@ -4319,7 +4319,7 @@
         </p:nvSpPr>
         <p:spPr>
           <a:xfrm>
-            <a:off x="6074030" y="1687656"/>
+            <a:off x="6074030" y="2265913"/>
             <a:ext cx="2438400" cy="215444"/>
           </a:xfrm>
           <a:prstGeom prst="rect">
@@ -4374,7 +4374,7 @@
         </p:nvCxnSpPr>
         <p:spPr>
           <a:xfrm>
-            <a:off x="3954408" y="2190681"/>
+            <a:off x="3954408" y="2768938"/>
             <a:ext cx="1837184" cy="0"/>
           </a:xfrm>
           <a:prstGeom prst="straightConnector1">
@@ -4412,7 +4412,7 @@
         </p:nvCxnSpPr>
         <p:spPr>
           <a:xfrm>
-            <a:off x="1739069" y="2266002"/>
+            <a:off x="1739069" y="2844259"/>
             <a:ext cx="2058118" cy="0"/>
           </a:xfrm>
           <a:prstGeom prst="straightConnector1">
@@ -4450,7 +4450,7 @@
         </p:nvCxnSpPr>
         <p:spPr>
           <a:xfrm>
-            <a:off x="390618" y="2342202"/>
+            <a:off x="390618" y="2920459"/>
             <a:ext cx="1196051" cy="0"/>
           </a:xfrm>
           <a:prstGeom prst="straightConnector1">
@@ -4488,7 +4488,7 @@
         </p:nvSpPr>
         <p:spPr>
           <a:xfrm>
-            <a:off x="7696200" y="591251"/>
+            <a:off x="7696200" y="1169508"/>
             <a:ext cx="1371600" cy="346760"/>
           </a:xfrm>
           <a:prstGeom prst="rect">
@@ -4559,7 +4559,7 @@
         </p:nvCxnSpPr>
         <p:spPr>
           <a:xfrm>
-            <a:off x="8616802" y="944305"/>
+            <a:off x="8616802" y="1522562"/>
             <a:ext cx="0" cy="1723059"/>
           </a:xfrm>
           <a:prstGeom prst="line">
@@ -4598,7 +4598,7 @@
         </p:nvSpPr>
         <p:spPr>
           <a:xfrm>
-            <a:off x="8544794" y="1961202"/>
+            <a:off x="8544794" y="2539459"/>
             <a:ext cx="142006" cy="176787"/>
           </a:xfrm>
           <a:prstGeom prst="rect">
@@ -4653,7 +4653,7 @@
         </p:nvCxnSpPr>
         <p:spPr>
           <a:xfrm>
-            <a:off x="5943992" y="1961202"/>
+            <a:off x="5943992" y="2539459"/>
             <a:ext cx="2568438" cy="0"/>
           </a:xfrm>
           <a:prstGeom prst="straightConnector1">
@@ -4689,7 +4689,7 @@
         </p:nvCxnSpPr>
         <p:spPr>
           <a:xfrm>
-            <a:off x="5943992" y="2137989"/>
+            <a:off x="5943992" y="2716246"/>
             <a:ext cx="2549946" cy="0"/>
           </a:xfrm>
           <a:prstGeom prst="straightConnector1">
@@ -4729,7 +4729,7 @@
         </p:nvSpPr>
         <p:spPr>
           <a:xfrm>
-            <a:off x="7370178" y="4278322"/>
+            <a:off x="7370178" y="3810000"/>
             <a:ext cx="1093635" cy="346760"/>
           </a:xfrm>
           <a:prstGeom prst="rect">
@@ -4792,7 +4792,7 @@
         </p:nvCxnSpPr>
         <p:spPr>
           <a:xfrm>
-            <a:off x="7916995" y="4641993"/>
+            <a:off x="7916995" y="4173671"/>
             <a:ext cx="0" cy="1723059"/>
           </a:xfrm>
           <a:prstGeom prst="line">
@@ -4831,7 +4831,7 @@
         </p:nvSpPr>
         <p:spPr>
           <a:xfrm>
-            <a:off x="7844987" y="5335662"/>
+            <a:off x="7844987" y="4867340"/>
             <a:ext cx="124478" cy="287409"/>
           </a:xfrm>
           <a:prstGeom prst="rect">
@@ -4886,7 +4886,7 @@
         </p:nvSpPr>
         <p:spPr>
           <a:xfrm>
-            <a:off x="1810094" y="4797674"/>
+            <a:off x="1810094" y="4329352"/>
             <a:ext cx="2716635" cy="215444"/>
           </a:xfrm>
           <a:prstGeom prst="rect">
@@ -4941,7 +4941,7 @@
         </p:nvCxnSpPr>
         <p:spPr>
           <a:xfrm flipH="1">
-            <a:off x="4526729" y="5623071"/>
+            <a:off x="4526729" y="5154749"/>
             <a:ext cx="3383941" cy="0"/>
           </a:xfrm>
           <a:prstGeom prst="straightConnector1">
@@ -4981,7 +4981,7 @@
         </p:nvSpPr>
         <p:spPr>
           <a:xfrm>
-            <a:off x="3791146" y="4295233"/>
+            <a:off x="3791146" y="3826911"/>
             <a:ext cx="1371600" cy="346760"/>
           </a:xfrm>
           <a:prstGeom prst="rect">
@@ -5052,7 +5052,7 @@
         </p:nvCxnSpPr>
         <p:spPr>
           <a:xfrm>
-            <a:off x="4456731" y="4648287"/>
+            <a:off x="4456731" y="4179965"/>
             <a:ext cx="0" cy="1723059"/>
           </a:xfrm>
           <a:prstGeom prst="line">
@@ -5091,7 +5091,7 @@
         </p:nvSpPr>
         <p:spPr>
           <a:xfrm>
-            <a:off x="4384723" y="5071220"/>
+            <a:off x="4384723" y="4602898"/>
             <a:ext cx="142006" cy="1036757"/>
           </a:xfrm>
           <a:prstGeom prst="rect">
@@ -5146,7 +5146,7 @@
         </p:nvCxnSpPr>
         <p:spPr>
           <a:xfrm>
-            <a:off x="3078929" y="5071220"/>
+            <a:off x="3078929" y="4602898"/>
             <a:ext cx="1295400" cy="0"/>
           </a:xfrm>
           <a:prstGeom prst="straightConnector1">
@@ -5182,7 +5182,7 @@
         </p:nvCxnSpPr>
         <p:spPr>
           <a:xfrm>
-            <a:off x="2975642" y="6107977"/>
+            <a:off x="2975642" y="5639655"/>
             <a:ext cx="1448755" cy="0"/>
           </a:xfrm>
           <a:prstGeom prst="straightConnector1">
@@ -5222,7 +5222,7 @@
         </p:nvCxnSpPr>
         <p:spPr>
           <a:xfrm>
-            <a:off x="4526729" y="5341014"/>
+            <a:off x="4526729" y="4872692"/>
             <a:ext cx="3318258" cy="0"/>
           </a:xfrm>
           <a:prstGeom prst="straightConnector1">
@@ -5261,7 +5261,7 @@
         </p:nvSpPr>
         <p:spPr>
           <a:xfrm>
-            <a:off x="5036330" y="5065911"/>
+            <a:off x="5036330" y="4597589"/>
             <a:ext cx="2659870" cy="215444"/>
           </a:xfrm>
           <a:prstGeom prst="rect">
@@ -5306,7 +5306,7 @@
         </p:nvCxnSpPr>
         <p:spPr>
           <a:xfrm flipH="1">
-            <a:off x="314394" y="1099672"/>
+            <a:off x="314394" y="1677929"/>
             <a:ext cx="24" cy="1598671"/>
           </a:xfrm>
           <a:prstGeom prst="line">
@@ -5343,7 +5343,7 @@
         </p:nvSpPr>
         <p:spPr>
           <a:xfrm>
-            <a:off x="721634" y="4278322"/>
+            <a:off x="721634" y="3810000"/>
             <a:ext cx="1093635" cy="346760"/>
           </a:xfrm>
           <a:prstGeom prst="rect">
@@ -5402,7 +5402,7 @@
         </p:nvCxnSpPr>
         <p:spPr>
           <a:xfrm>
-            <a:off x="1268451" y="4641993"/>
+            <a:off x="1268451" y="4173671"/>
             <a:ext cx="0" cy="1723059"/>
           </a:xfrm>
           <a:prstGeom prst="line">
@@ -5439,7 +5439,7 @@
         </p:nvSpPr>
         <p:spPr>
           <a:xfrm>
-            <a:off x="1196443" y="5670472"/>
+            <a:off x="1196443" y="5202150"/>
             <a:ext cx="130545" cy="273128"/>
           </a:xfrm>
           <a:prstGeom prst="rect">
@@ -5490,7 +5490,7 @@
         </p:nvCxnSpPr>
         <p:spPr>
           <a:xfrm flipH="1">
-            <a:off x="1348843" y="5943600"/>
+            <a:off x="1348843" y="5475278"/>
             <a:ext cx="3061842" cy="0"/>
           </a:xfrm>
           <a:prstGeom prst="straightConnector1">
@@ -5528,7 +5528,7 @@
         </p:nvCxnSpPr>
         <p:spPr>
           <a:xfrm>
-            <a:off x="1348843" y="5670472"/>
+            <a:off x="1348843" y="5202150"/>
             <a:ext cx="3061841" cy="0"/>
           </a:xfrm>
           <a:prstGeom prst="straightConnector1">
@@ -5567,7 +5567,7 @@
         </p:nvSpPr>
         <p:spPr>
           <a:xfrm>
-            <a:off x="1416276" y="5395369"/>
+            <a:off x="1416276" y="4927047"/>
             <a:ext cx="2659870" cy="215444"/>
           </a:xfrm>
           <a:prstGeom prst="rect">
@@ -5608,7 +5608,7 @@
         </p:nvGrpSpPr>
         <p:grpSpPr>
           <a:xfrm>
-            <a:off x="1028134" y="5612032"/>
+            <a:off x="1028134" y="5143710"/>
             <a:ext cx="217349" cy="270072"/>
             <a:chOff x="1028134" y="5612032"/>
             <a:chExt cx="217349" cy="270072"/>
@@ -5767,7 +5767,7 @@
         </p:nvSpPr>
         <p:spPr>
           <a:xfrm>
-            <a:off x="194562" y="5444571"/>
+            <a:off x="194562" y="4976249"/>
             <a:ext cx="794081" cy="430887"/>
           </a:xfrm>
           <a:prstGeom prst="rect">
@@ -5801,7 +5801,7 @@
         </p:nvGrpSpPr>
         <p:grpSpPr>
           <a:xfrm flipH="1">
-            <a:off x="7936842" y="5335662"/>
+            <a:off x="7936842" y="4867340"/>
             <a:ext cx="217349" cy="270072"/>
             <a:chOff x="1028134" y="5612032"/>
             <a:chExt cx="217349" cy="270072"/>
@@ -5964,7 +5964,7 @@
         </p:nvSpPr>
         <p:spPr>
           <a:xfrm>
-            <a:off x="8223953" y="5180992"/>
+            <a:off x="8223953" y="4712670"/>
             <a:ext cx="539047" cy="430887"/>
           </a:xfrm>
           <a:prstGeom prst="rect">

</xml_diff>

<commit_message>
Update diagrams for UG and DG
</commit_message>
<xml_diff>
--- a/docs/diagrams/HighLevelSequenceDiagrams.pptx
+++ b/docs/diagrams/HighLevelSequenceDiagrams.pptx
@@ -208,7 +208,7 @@
           <a:p>
             <a:fld id="{F5CC4B3F-88C1-4FFA-B1B6-F41C21DC6924}" type="datetimeFigureOut">
               <a:rPr lang="en-US" smtClean="0"/>
-              <a:t>02-Apr-19</a:t>
+              <a:t>4/15/2019</a:t>
             </a:fld>
             <a:endParaRPr lang="en-US"/>
           </a:p>
@@ -654,7 +654,7 @@
           <a:p>
             <a:fld id="{78C97017-6FC3-485B-9764-EAC9E56C1D49}" type="datetimeFigureOut">
               <a:rPr lang="en-US" smtClean="0"/>
-              <a:t>02-Apr-19</a:t>
+              <a:t>4/15/2019</a:t>
             </a:fld>
             <a:endParaRPr lang="en-US"/>
           </a:p>
@@ -822,7 +822,7 @@
           <a:p>
             <a:fld id="{78C97017-6FC3-485B-9764-EAC9E56C1D49}" type="datetimeFigureOut">
               <a:rPr lang="en-US" smtClean="0"/>
-              <a:t>02-Apr-19</a:t>
+              <a:t>4/15/2019</a:t>
             </a:fld>
             <a:endParaRPr lang="en-US"/>
           </a:p>
@@ -1000,7 +1000,7 @@
           <a:p>
             <a:fld id="{78C97017-6FC3-485B-9764-EAC9E56C1D49}" type="datetimeFigureOut">
               <a:rPr lang="en-US" smtClean="0"/>
-              <a:t>02-Apr-19</a:t>
+              <a:t>4/15/2019</a:t>
             </a:fld>
             <a:endParaRPr lang="en-US"/>
           </a:p>
@@ -1168,7 +1168,7 @@
           <a:p>
             <a:fld id="{78C97017-6FC3-485B-9764-EAC9E56C1D49}" type="datetimeFigureOut">
               <a:rPr lang="en-US" smtClean="0"/>
-              <a:t>02-Apr-19</a:t>
+              <a:t>4/15/2019</a:t>
             </a:fld>
             <a:endParaRPr lang="en-US"/>
           </a:p>
@@ -1413,7 +1413,7 @@
           <a:p>
             <a:fld id="{78C97017-6FC3-485B-9764-EAC9E56C1D49}" type="datetimeFigureOut">
               <a:rPr lang="en-US" smtClean="0"/>
-              <a:t>02-Apr-19</a:t>
+              <a:t>4/15/2019</a:t>
             </a:fld>
             <a:endParaRPr lang="en-US"/>
           </a:p>
@@ -1698,7 +1698,7 @@
           <a:p>
             <a:fld id="{78C97017-6FC3-485B-9764-EAC9E56C1D49}" type="datetimeFigureOut">
               <a:rPr lang="en-US" smtClean="0"/>
-              <a:t>02-Apr-19</a:t>
+              <a:t>4/15/2019</a:t>
             </a:fld>
             <a:endParaRPr lang="en-US"/>
           </a:p>
@@ -2117,7 +2117,7 @@
           <a:p>
             <a:fld id="{78C97017-6FC3-485B-9764-EAC9E56C1D49}" type="datetimeFigureOut">
               <a:rPr lang="en-US" smtClean="0"/>
-              <a:t>02-Apr-19</a:t>
+              <a:t>4/15/2019</a:t>
             </a:fld>
             <a:endParaRPr lang="en-US"/>
           </a:p>
@@ -2234,7 +2234,7 @@
           <a:p>
             <a:fld id="{78C97017-6FC3-485B-9764-EAC9E56C1D49}" type="datetimeFigureOut">
               <a:rPr lang="en-US" smtClean="0"/>
-              <a:t>02-Apr-19</a:t>
+              <a:t>4/15/2019</a:t>
             </a:fld>
             <a:endParaRPr lang="en-US"/>
           </a:p>
@@ -2329,7 +2329,7 @@
           <a:p>
             <a:fld id="{78C97017-6FC3-485B-9764-EAC9E56C1D49}" type="datetimeFigureOut">
               <a:rPr lang="en-US" smtClean="0"/>
-              <a:t>02-Apr-19</a:t>
+              <a:t>4/15/2019</a:t>
             </a:fld>
             <a:endParaRPr lang="en-US"/>
           </a:p>
@@ -2604,7 +2604,7 @@
           <a:p>
             <a:fld id="{78C97017-6FC3-485B-9764-EAC9E56C1D49}" type="datetimeFigureOut">
               <a:rPr lang="en-US" smtClean="0"/>
-              <a:t>02-Apr-19</a:t>
+              <a:t>4/15/2019</a:t>
             </a:fld>
             <a:endParaRPr lang="en-US"/>
           </a:p>
@@ -2856,7 +2856,7 @@
           <a:p>
             <a:fld id="{78C97017-6FC3-485B-9764-EAC9E56C1D49}" type="datetimeFigureOut">
               <a:rPr lang="en-US" smtClean="0"/>
-              <a:t>02-Apr-19</a:t>
+              <a:t>4/15/2019</a:t>
             </a:fld>
             <a:endParaRPr lang="en-US"/>
           </a:p>
@@ -3067,7 +3067,7 @@
           <a:p>
             <a:fld id="{78C97017-6FC3-485B-9764-EAC9E56C1D49}" type="datetimeFigureOut">
               <a:rPr lang="en-US" smtClean="0"/>
-              <a:t>02-Apr-19</a:t>
+              <a:t>4/15/2019</a:t>
             </a:fld>
             <a:endParaRPr lang="en-US"/>
           </a:p>
@@ -4319,8 +4319,8 @@
         </p:nvSpPr>
         <p:spPr>
           <a:xfrm>
-            <a:off x="6074030" y="2265913"/>
-            <a:ext cx="2438400" cy="215444"/>
+            <a:off x="6894285" y="2275417"/>
+            <a:ext cx="783962" cy="215444"/>
           </a:xfrm>
           <a:prstGeom prst="rect">
             <a:avLst/>
@@ -4341,27 +4341,7 @@
                   </a:schemeClr>
                 </a:solidFill>
               </a:rPr>
-              <a:t>post(</a:t>
-            </a:r>
-            <a:r>
-              <a:rPr lang="en-US" sz="1400" dirty="0" err="1">
-                <a:solidFill>
-                  <a:schemeClr val="accent5">
-                    <a:lumMod val="75000"/>
-                  </a:schemeClr>
-                </a:solidFill>
-              </a:rPr>
-              <a:t>TravelBuddyChangedEvent</a:t>
-            </a:r>
-            <a:r>
-              <a:rPr lang="en-US" sz="1400" dirty="0">
-                <a:solidFill>
-                  <a:schemeClr val="accent5">
-                    <a:lumMod val="75000"/>
-                  </a:schemeClr>
-                </a:solidFill>
-              </a:rPr>
-              <a:t>)</a:t>
+              <a:t>commit()</a:t>
             </a:r>
           </a:p>
         </p:txBody>
@@ -4488,8 +4468,8 @@
         </p:nvSpPr>
         <p:spPr>
           <a:xfrm>
-            <a:off x="7696200" y="1169508"/>
-            <a:ext cx="1371600" cy="346760"/>
+            <a:off x="6858000" y="1169508"/>
+            <a:ext cx="2209780" cy="346760"/>
           </a:xfrm>
           <a:prstGeom prst="rect">
             <a:avLst/>
@@ -4541,7 +4521,7 @@
                   <a:schemeClr val="bg1"/>
                 </a:solidFill>
               </a:rPr>
-              <a:t>EventsCenter</a:t>
+              <a:t>VersionedTravelBuddy</a:t>
             </a:r>
             <a:endParaRPr lang="en-SG" sz="1600" dirty="0">
               <a:solidFill>
@@ -4559,7 +4539,7 @@
         </p:nvCxnSpPr>
         <p:spPr>
           <a:xfrm>
-            <a:off x="8616802" y="1522562"/>
+            <a:off x="7920608" y="1524000"/>
             <a:ext cx="0" cy="1723059"/>
           </a:xfrm>
           <a:prstGeom prst="line">
@@ -4598,7 +4578,7 @@
         </p:nvSpPr>
         <p:spPr>
           <a:xfrm>
-            <a:off x="8544794" y="2539459"/>
+            <a:off x="7848600" y="2540897"/>
             <a:ext cx="142006" cy="176787"/>
           </a:xfrm>
           <a:prstGeom prst="rect">
@@ -4648,13 +4628,16 @@
       <p:cxnSp>
         <p:nvCxnSpPr>
           <p:cNvPr id="42" name="Straight Arrow Connector 41"/>
-          <p:cNvCxnSpPr/>
+          <p:cNvCxnSpPr>
+            <a:cxnSpLocks/>
+            <a:endCxn id="41" idx="0"/>
+          </p:cNvCxnSpPr>
           <p:nvPr/>
         </p:nvCxnSpPr>
         <p:spPr>
           <a:xfrm>
             <a:off x="5943992" y="2539459"/>
-            <a:ext cx="2568438" cy="0"/>
+            <a:ext cx="1975611" cy="1438"/>
           </a:xfrm>
           <a:prstGeom prst="straightConnector1">
             <a:avLst/>
@@ -4684,13 +4667,16 @@
       <p:cxnSp>
         <p:nvCxnSpPr>
           <p:cNvPr id="44" name="Straight Arrow Connector 43"/>
-          <p:cNvCxnSpPr/>
+          <p:cNvCxnSpPr>
+            <a:cxnSpLocks/>
+            <a:endCxn id="41" idx="2"/>
+          </p:cNvCxnSpPr>
           <p:nvPr/>
         </p:nvCxnSpPr>
         <p:spPr>
           <a:xfrm>
             <a:off x="5943992" y="2716246"/>
-            <a:ext cx="2549946" cy="0"/>
+            <a:ext cx="1975611" cy="1438"/>
           </a:xfrm>
           <a:prstGeom prst="straightConnector1">
             <a:avLst/>
@@ -4886,8 +4872,8 @@
         </p:nvSpPr>
         <p:spPr>
           <a:xfrm>
-            <a:off x="1810094" y="4329352"/>
-            <a:ext cx="2716635" cy="215444"/>
+            <a:off x="3447191" y="4339076"/>
+            <a:ext cx="759234" cy="215444"/>
           </a:xfrm>
           <a:prstGeom prst="rect">
             <a:avLst/>
@@ -4908,27 +4894,7 @@
                   </a:schemeClr>
                 </a:solidFill>
               </a:rPr>
-              <a:t>post(</a:t>
-            </a:r>
-            <a:r>
-              <a:rPr lang="en-US" sz="1400" dirty="0" err="1">
-                <a:solidFill>
-                  <a:schemeClr val="accent5">
-                    <a:lumMod val="75000"/>
-                  </a:schemeClr>
-                </a:solidFill>
-              </a:rPr>
-              <a:t>TravelBuddyChangedEvent</a:t>
-            </a:r>
-            <a:r>
-              <a:rPr lang="en-US" sz="1400" dirty="0">
-                <a:solidFill>
-                  <a:schemeClr val="accent5">
-                    <a:lumMod val="75000"/>
-                  </a:schemeClr>
-                </a:solidFill>
-              </a:rPr>
-              <a:t>)</a:t>
+              <a:t>commit()</a:t>
             </a:r>
           </a:p>
         </p:txBody>
@@ -4981,8 +4947,8 @@
         </p:nvSpPr>
         <p:spPr>
           <a:xfrm>
-            <a:off x="3791146" y="3826911"/>
-            <a:ext cx="1371600" cy="346760"/>
+            <a:off x="3429000" y="3826911"/>
+            <a:ext cx="2071319" cy="346760"/>
           </a:xfrm>
           <a:prstGeom prst="rect">
             <a:avLst/>
@@ -5034,7 +5000,7 @@
                   <a:schemeClr val="bg1"/>
                 </a:solidFill>
               </a:rPr>
-              <a:t>EventsCenter</a:t>
+              <a:t>VersionedTravelBuddy</a:t>
             </a:r>
             <a:endParaRPr lang="en-SG" sz="1600" dirty="0">
               <a:solidFill>
@@ -5261,7 +5227,7 @@
         </p:nvSpPr>
         <p:spPr>
           <a:xfrm>
-            <a:off x="5036330" y="4597589"/>
+            <a:off x="5276972" y="4599349"/>
             <a:ext cx="2659870" cy="215444"/>
           </a:xfrm>
           <a:prstGeom prst="rect">
@@ -5283,7 +5249,7 @@
                   </a:schemeClr>
                 </a:solidFill>
               </a:rPr>
-              <a:t>handleTravelBuddyChangedEvent</a:t>
+              <a:t>saveTravelBuddy</a:t>
             </a:r>
             <a:r>
               <a:rPr lang="en-US" sz="1400" dirty="0">
@@ -5567,7 +5533,7 @@
         </p:nvSpPr>
         <p:spPr>
           <a:xfrm>
-            <a:off x="1416276" y="4927047"/>
+            <a:off x="1957403" y="4917282"/>
             <a:ext cx="2659870" cy="215444"/>
           </a:xfrm>
           <a:prstGeom prst="rect">
@@ -5587,7 +5553,7 @@
                   <a:srgbClr val="00B050"/>
                 </a:solidFill>
               </a:rPr>
-              <a:t>handleTravelBuddyChangedEvent</a:t>
+              <a:t>indicateModified</a:t>
             </a:r>
             <a:r>
               <a:rPr lang="en-US" sz="1400" dirty="0">

</xml_diff>